<commit_message>
Further development on Specifications Program governance.
</commit_message>
<xml_diff>
--- a/files/openEHR_diagrams_sources.pptx
+++ b/files/openEHR_diagrams_sources.pptx
@@ -317,7 +317,7 @@
             <a:fld id="{C17C92CA-27BA-48D5-B9B9-4E9A3862C39B}" type="datetimeFigureOut">
               <a:rPr lang="en-US" smtClean="0"/>
               <a:pPr/>
-              <a:t>12/5/2014</a:t>
+              <a:t>12/6/2014</a:t>
             </a:fld>
             <a:endParaRPr lang="en-US"/>
           </a:p>
@@ -484,7 +484,7 @@
             <a:fld id="{C17C92CA-27BA-48D5-B9B9-4E9A3862C39B}" type="datetimeFigureOut">
               <a:rPr lang="en-US" smtClean="0"/>
               <a:pPr/>
-              <a:t>12/5/2014</a:t>
+              <a:t>12/6/2014</a:t>
             </a:fld>
             <a:endParaRPr lang="en-US"/>
           </a:p>
@@ -661,7 +661,7 @@
             <a:fld id="{C17C92CA-27BA-48D5-B9B9-4E9A3862C39B}" type="datetimeFigureOut">
               <a:rPr lang="en-US" smtClean="0"/>
               <a:pPr/>
-              <a:t>12/5/2014</a:t>
+              <a:t>12/6/2014</a:t>
             </a:fld>
             <a:endParaRPr lang="en-US"/>
           </a:p>
@@ -828,7 +828,7 @@
             <a:fld id="{C17C92CA-27BA-48D5-B9B9-4E9A3862C39B}" type="datetimeFigureOut">
               <a:rPr lang="en-US" smtClean="0"/>
               <a:pPr/>
-              <a:t>12/5/2014</a:t>
+              <a:t>12/6/2014</a:t>
             </a:fld>
             <a:endParaRPr lang="en-US"/>
           </a:p>
@@ -1071,7 +1071,7 @@
             <a:fld id="{C17C92CA-27BA-48D5-B9B9-4E9A3862C39B}" type="datetimeFigureOut">
               <a:rPr lang="en-US" smtClean="0"/>
               <a:pPr/>
-              <a:t>12/5/2014</a:t>
+              <a:t>12/6/2014</a:t>
             </a:fld>
             <a:endParaRPr lang="en-US"/>
           </a:p>
@@ -1356,7 +1356,7 @@
             <a:fld id="{C17C92CA-27BA-48D5-B9B9-4E9A3862C39B}" type="datetimeFigureOut">
               <a:rPr lang="en-US" smtClean="0"/>
               <a:pPr/>
-              <a:t>12/5/2014</a:t>
+              <a:t>12/6/2014</a:t>
             </a:fld>
             <a:endParaRPr lang="en-US"/>
           </a:p>
@@ -1775,7 +1775,7 @@
             <a:fld id="{C17C92CA-27BA-48D5-B9B9-4E9A3862C39B}" type="datetimeFigureOut">
               <a:rPr lang="en-US" smtClean="0"/>
               <a:pPr/>
-              <a:t>12/5/2014</a:t>
+              <a:t>12/6/2014</a:t>
             </a:fld>
             <a:endParaRPr lang="en-US"/>
           </a:p>
@@ -1890,7 +1890,7 @@
             <a:fld id="{C17C92CA-27BA-48D5-B9B9-4E9A3862C39B}" type="datetimeFigureOut">
               <a:rPr lang="en-US" smtClean="0"/>
               <a:pPr/>
-              <a:t>12/5/2014</a:t>
+              <a:t>12/6/2014</a:t>
             </a:fld>
             <a:endParaRPr lang="en-US"/>
           </a:p>
@@ -1982,7 +1982,7 @@
             <a:fld id="{C17C92CA-27BA-48D5-B9B9-4E9A3862C39B}" type="datetimeFigureOut">
               <a:rPr lang="en-US" smtClean="0"/>
               <a:pPr/>
-              <a:t>12/5/2014</a:t>
+              <a:t>12/6/2014</a:t>
             </a:fld>
             <a:endParaRPr lang="en-US"/>
           </a:p>
@@ -2256,7 +2256,7 @@
             <a:fld id="{C17C92CA-27BA-48D5-B9B9-4E9A3862C39B}" type="datetimeFigureOut">
               <a:rPr lang="en-US" smtClean="0"/>
               <a:pPr/>
-              <a:t>12/5/2014</a:t>
+              <a:t>12/6/2014</a:t>
             </a:fld>
             <a:endParaRPr lang="en-US"/>
           </a:p>
@@ -2506,7 +2506,7 @@
             <a:fld id="{C17C92CA-27BA-48D5-B9B9-4E9A3862C39B}" type="datetimeFigureOut">
               <a:rPr lang="en-US" smtClean="0"/>
               <a:pPr/>
-              <a:t>12/5/2014</a:t>
+              <a:t>12/6/2014</a:t>
             </a:fld>
             <a:endParaRPr lang="en-US"/>
           </a:p>
@@ -2716,7 +2716,7 @@
             <a:fld id="{C17C92CA-27BA-48D5-B9B9-4E9A3862C39B}" type="datetimeFigureOut">
               <a:rPr lang="en-US" smtClean="0"/>
               <a:pPr/>
-              <a:t>12/5/2014</a:t>
+              <a:t>12/6/2014</a:t>
             </a:fld>
             <a:endParaRPr lang="en-US"/>
           </a:p>
@@ -24144,23 +24144,7 @@
                   <a:srgbClr val="00335F"/>
                 </a:solidFill>
               </a:rPr>
-              <a:t>Qualified </a:t>
-            </a:r>
-            <a:r>
-              <a:rPr lang="en-US" b="1" dirty="0" smtClean="0">
-                <a:solidFill>
-                  <a:srgbClr val="00335F"/>
-                </a:solidFill>
-              </a:rPr>
-              <a:t>Members </a:t>
-            </a:r>
-            <a:r>
-              <a:rPr lang="en-US" b="1" dirty="0" smtClean="0">
-                <a:solidFill>
-                  <a:srgbClr val="00335F"/>
-                </a:solidFill>
-              </a:rPr>
-              <a:t>(QM)</a:t>
+              <a:t>Qualified Members (QM)</a:t>
             </a:r>
           </a:p>
         </p:txBody>
@@ -26691,8 +26675,8 @@
         </p:nvSpPr>
         <p:spPr>
           <a:xfrm>
-            <a:off x="3157921" y="1401474"/>
-            <a:ext cx="1800200" cy="792088"/>
+            <a:off x="2123729" y="908597"/>
+            <a:ext cx="2735106" cy="876762"/>
           </a:xfrm>
           <a:prstGeom prst="roundRect">
             <a:avLst/>
@@ -26749,7 +26733,7 @@
                   <a:srgbClr val="00335F"/>
                 </a:solidFill>
               </a:rPr>
-              <a:t>Editorial</a:t>
+              <a:t>Specifications Editorial</a:t>
             </a:r>
           </a:p>
           <a:p>
@@ -26760,7 +26744,7 @@
                   <a:srgbClr val="00335F"/>
                 </a:solidFill>
               </a:rPr>
-              <a:t>Committee</a:t>
+              <a:t>Committee (SEC)</a:t>
             </a:r>
           </a:p>
         </p:txBody>
@@ -26773,7 +26757,7 @@
         </p:nvSpPr>
         <p:spPr>
           <a:xfrm>
-            <a:off x="4142754" y="4746176"/>
+            <a:off x="2843808" y="5857294"/>
             <a:ext cx="2016224" cy="468052"/>
           </a:xfrm>
           <a:prstGeom prst="roundRect">
@@ -26877,8 +26861,8 @@
         </p:nvSpPr>
         <p:spPr>
           <a:xfrm>
-            <a:off x="5348926" y="1155391"/>
-            <a:ext cx="3528392" cy="1477328"/>
+            <a:off x="5950261" y="987750"/>
+            <a:ext cx="2507882" cy="1762021"/>
           </a:xfrm>
           <a:prstGeom prst="rect">
             <a:avLst/>
@@ -26895,20 +26879,10 @@
               <a:spcAft>
                 <a:spcPts val="300"/>
               </a:spcAft>
-              <a:buFont typeface="Arial" pitchFamily="34" charset="0"/>
-              <a:buChar char="•"/>
             </a:pPr>
             <a:r>
               <a:rPr lang="en-US" sz="1600" dirty="0" smtClean="0"/>
-              <a:t> </a:t>
-            </a:r>
-            <a:r>
-              <a:rPr lang="en-US" sz="1600" dirty="0" smtClean="0"/>
-              <a:t>2 elected </a:t>
-            </a:r>
-            <a:r>
-              <a:rPr lang="en-US" sz="1600" dirty="0" smtClean="0"/>
-              <a:t>co-chairs (2y)</a:t>
+              <a:t>= Elected co-chair</a:t>
             </a:r>
           </a:p>
           <a:p>
@@ -26916,16 +26890,10 @@
               <a:spcAft>
                 <a:spcPts val="300"/>
               </a:spcAft>
-              <a:buFont typeface="Arial" pitchFamily="34" charset="0"/>
-              <a:buChar char="•"/>
             </a:pPr>
             <a:r>
               <a:rPr lang="en-US" sz="1600" dirty="0" smtClean="0"/>
-              <a:t> </a:t>
-            </a:r>
-            <a:r>
-              <a:rPr lang="en-US" sz="1600" dirty="0" smtClean="0"/>
-              <a:t>Each Component has a maintainer</a:t>
+              <a:t>= Component maintainer</a:t>
             </a:r>
           </a:p>
           <a:p>
@@ -26933,34 +26901,25 @@
               <a:spcAft>
                 <a:spcPts val="300"/>
               </a:spcAft>
-              <a:buFont typeface="Arial" pitchFamily="34" charset="0"/>
-              <a:buChar char="•"/>
             </a:pPr>
             <a:r>
               <a:rPr lang="en-US" sz="1600" dirty="0" smtClean="0"/>
-              <a:t> Unlimited number of reviewers</a:t>
-            </a:r>
-            <a:endParaRPr lang="en-US" sz="1600" dirty="0" smtClean="0"/>
+              <a:t>= Other </a:t>
+            </a:r>
+            <a:r>
+              <a:rPr lang="en-US" sz="1600" dirty="0" smtClean="0"/>
+              <a:t>member</a:t>
+            </a:r>
           </a:p>
           <a:p>
             <a:pPr>
               <a:spcAft>
                 <a:spcPts val="300"/>
               </a:spcAft>
-              <a:buFont typeface="Arial" pitchFamily="34" charset="0"/>
-              <a:buChar char="•"/>
             </a:pPr>
             <a:r>
-              <a:rPr lang="en-US" sz="1600" dirty="0"/>
-              <a:t> </a:t>
-            </a:r>
-            <a:r>
               <a:rPr lang="en-US" sz="1600" dirty="0" smtClean="0"/>
-              <a:t>Minimum </a:t>
-            </a:r>
-            <a:r>
-              <a:rPr lang="en-US" sz="1600" dirty="0" smtClean="0"/>
-              <a:t>5 members</a:t>
+              <a:t>= Change Tracker</a:t>
             </a:r>
           </a:p>
           <a:p>
@@ -26968,22 +26927,23 @@
               <a:spcAft>
                 <a:spcPts val="300"/>
               </a:spcAft>
-              <a:buFont typeface="Arial" pitchFamily="34" charset="0"/>
-              <a:buChar char="•"/>
             </a:pPr>
             <a:r>
               <a:rPr lang="en-US" sz="1600" dirty="0" smtClean="0"/>
-              <a:t> Entry </a:t>
-            </a:r>
-            <a:r>
-              <a:rPr lang="en-US" sz="1600" dirty="0"/>
-              <a:t>by </a:t>
-            </a:r>
+              <a:t>= Problem Tracker</a:t>
+            </a:r>
+          </a:p>
+          <a:p>
+            <a:pPr>
+              <a:spcAft>
+                <a:spcPts val="300"/>
+              </a:spcAft>
+            </a:pPr>
             <a:r>
               <a:rPr lang="en-US" sz="1600" dirty="0" smtClean="0"/>
-              <a:t>Committee vote</a:t>
-            </a:r>
-            <a:endParaRPr lang="en-US" sz="1600" dirty="0"/>
+              <a:t>= Specifications Component</a:t>
+            </a:r>
+            <a:endParaRPr lang="en-US" sz="1600" dirty="0" smtClean="0"/>
           </a:p>
         </p:txBody>
       </p:sp>
@@ -26995,7 +26955,7 @@
         </p:nvSpPr>
         <p:spPr>
           <a:xfrm>
-            <a:off x="4139952" y="4188114"/>
+            <a:off x="2843808" y="5299232"/>
             <a:ext cx="2016224" cy="468052"/>
           </a:xfrm>
           <a:prstGeom prst="roundRect">
@@ -27068,7 +27028,7 @@
         </p:nvSpPr>
         <p:spPr>
           <a:xfrm>
-            <a:off x="4142754" y="3627021"/>
+            <a:off x="2843808" y="4738139"/>
             <a:ext cx="2016224" cy="468052"/>
           </a:xfrm>
           <a:prstGeom prst="roundRect">
@@ -27141,7 +27101,7 @@
         </p:nvSpPr>
         <p:spPr>
           <a:xfrm>
-            <a:off x="2051720" y="4746176"/>
+            <a:off x="2843808" y="3605554"/>
             <a:ext cx="2016224" cy="468052"/>
           </a:xfrm>
           <a:prstGeom prst="roundRect">
@@ -27214,7 +27174,7 @@
         </p:nvSpPr>
         <p:spPr>
           <a:xfrm>
-            <a:off x="2051720" y="4188114"/>
+            <a:off x="2843808" y="3047492"/>
             <a:ext cx="2016224" cy="468052"/>
           </a:xfrm>
           <a:prstGeom prst="roundRect">
@@ -27287,7 +27247,7 @@
         </p:nvSpPr>
         <p:spPr>
           <a:xfrm>
-            <a:off x="4139952" y="3068960"/>
+            <a:off x="2843808" y="4180078"/>
             <a:ext cx="2016224" cy="468052"/>
           </a:xfrm>
           <a:prstGeom prst="roundRect">
@@ -27360,7 +27320,7 @@
         </p:nvSpPr>
         <p:spPr>
           <a:xfrm>
-            <a:off x="2051720" y="3068960"/>
+            <a:off x="2843808" y="1928338"/>
             <a:ext cx="2016224" cy="468052"/>
           </a:xfrm>
           <a:prstGeom prst="roundRect">
@@ -27433,7 +27393,7 @@
         </p:nvSpPr>
         <p:spPr>
           <a:xfrm>
-            <a:off x="2041797" y="3628537"/>
+            <a:off x="2843808" y="2487915"/>
             <a:ext cx="2016224" cy="468052"/>
           </a:xfrm>
           <a:prstGeom prst="roundRect">
@@ -27498,120 +27458,6 @@
           </a:p>
         </p:txBody>
       </p:sp>
-      <p:cxnSp>
-        <p:nvCxnSpPr>
-          <p:cNvPr id="45" name="Elbow Connector 44"/>
-          <p:cNvCxnSpPr>
-            <a:stCxn id="8" idx="2"/>
-            <a:endCxn id="36" idx="0"/>
-          </p:cNvCxnSpPr>
-          <p:nvPr/>
-        </p:nvCxnSpPr>
-        <p:spPr>
-          <a:xfrm rot="16200000" flipH="1">
-            <a:off x="4165343" y="2086239"/>
-            <a:ext cx="875398" cy="1090043"/>
-          </a:xfrm>
-          <a:prstGeom prst="bentConnector3">
-            <a:avLst>
-              <a:gd name="adj1" fmla="val 50000"/>
-            </a:avLst>
-          </a:prstGeom>
-          <a:ln>
-            <a:solidFill>
-              <a:schemeClr val="bg1">
-                <a:lumMod val="65000"/>
-              </a:schemeClr>
-            </a:solidFill>
-          </a:ln>
-        </p:spPr>
-        <p:style>
-          <a:lnRef idx="1">
-            <a:schemeClr val="accent1"/>
-          </a:lnRef>
-          <a:fillRef idx="0">
-            <a:schemeClr val="accent1"/>
-          </a:fillRef>
-          <a:effectRef idx="0">
-            <a:schemeClr val="accent1"/>
-          </a:effectRef>
-          <a:fontRef idx="minor">
-            <a:schemeClr val="tx1"/>
-          </a:fontRef>
-        </p:style>
-      </p:cxnSp>
-      <p:cxnSp>
-        <p:nvCxnSpPr>
-          <p:cNvPr id="47" name="Elbow Connector 46"/>
-          <p:cNvCxnSpPr>
-            <a:stCxn id="8" idx="2"/>
-            <a:endCxn id="37" idx="0"/>
-          </p:cNvCxnSpPr>
-          <p:nvPr/>
-        </p:nvCxnSpPr>
-        <p:spPr>
-          <a:xfrm rot="5400000">
-            <a:off x="3121228" y="2132167"/>
-            <a:ext cx="875398" cy="998189"/>
-          </a:xfrm>
-          <a:prstGeom prst="bentConnector3">
-            <a:avLst>
-              <a:gd name="adj1" fmla="val 50000"/>
-            </a:avLst>
-          </a:prstGeom>
-          <a:ln>
-            <a:solidFill>
-              <a:schemeClr val="bg1">
-                <a:lumMod val="65000"/>
-              </a:schemeClr>
-            </a:solidFill>
-          </a:ln>
-        </p:spPr>
-        <p:style>
-          <a:lnRef idx="1">
-            <a:schemeClr val="accent1"/>
-          </a:lnRef>
-          <a:fillRef idx="0">
-            <a:schemeClr val="accent1"/>
-          </a:fillRef>
-          <a:effectRef idx="0">
-            <a:schemeClr val="accent1"/>
-          </a:effectRef>
-          <a:fontRef idx="minor">
-            <a:schemeClr val="tx1"/>
-          </a:fontRef>
-        </p:style>
-      </p:cxnSp>
-      <p:sp>
-        <p:nvSpPr>
-          <p:cNvPr id="5" name="TextBox 4"/>
-          <p:cNvSpPr txBox="1"/>
-          <p:nvPr/>
-        </p:nvSpPr>
-        <p:spPr>
-          <a:xfrm>
-            <a:off x="2784261" y="5359475"/>
-            <a:ext cx="2719271" cy="369332"/>
-          </a:xfrm>
-          <a:prstGeom prst="rect">
-            <a:avLst/>
-          </a:prstGeom>
-          <a:noFill/>
-        </p:spPr>
-        <p:txBody>
-          <a:bodyPr wrap="none" rtlCol="0">
-            <a:spAutoFit/>
-          </a:bodyPr>
-          <a:lstStyle/>
-          <a:p>
-            <a:r>
-              <a:rPr lang="en-GB" dirty="0" smtClean="0"/>
-              <a:t>Specifications Components</a:t>
-            </a:r>
-            <a:endParaRPr lang="en-GB" dirty="0"/>
-          </a:p>
-        </p:txBody>
-      </p:sp>
       <p:grpSp>
         <p:nvGrpSpPr>
           <p:cNvPr id="10" name="Group 9"/>
@@ -27620,7 +27466,7 @@
         </p:nvGrpSpPr>
         <p:grpSpPr>
           <a:xfrm>
-            <a:off x="2771800" y="1369443"/>
+            <a:off x="1751714" y="921127"/>
             <a:ext cx="216024" cy="382265"/>
             <a:chOff x="2771800" y="1369443"/>
             <a:chExt cx="216024" cy="382265"/>
@@ -27820,7 +27666,7 @@
         </p:nvGrpSpPr>
         <p:grpSpPr>
           <a:xfrm>
-            <a:off x="2768105" y="1841718"/>
+            <a:off x="1748019" y="1393402"/>
             <a:ext cx="216024" cy="382265"/>
             <a:chOff x="2771800" y="1369443"/>
             <a:chExt cx="216024" cy="382265"/>
@@ -28020,7 +27866,7 @@
         </p:nvGrpSpPr>
         <p:grpSpPr>
           <a:xfrm>
-            <a:off x="6300192" y="3111853"/>
+            <a:off x="1765071" y="4230885"/>
             <a:ext cx="216024" cy="382265"/>
             <a:chOff x="2771800" y="1369443"/>
             <a:chExt cx="216024" cy="382265"/>
@@ -28220,7 +28066,7 @@
         </p:nvGrpSpPr>
         <p:grpSpPr>
           <a:xfrm>
-            <a:off x="6300192" y="3627021"/>
+            <a:off x="1765071" y="4746053"/>
             <a:ext cx="216024" cy="382265"/>
             <a:chOff x="2771800" y="1369443"/>
             <a:chExt cx="216024" cy="382265"/>
@@ -28420,7 +28266,7 @@
         </p:nvGrpSpPr>
         <p:grpSpPr>
           <a:xfrm>
-            <a:off x="6300192" y="4216012"/>
+            <a:off x="1765071" y="5335044"/>
             <a:ext cx="216024" cy="382265"/>
             <a:chOff x="2771800" y="1369443"/>
             <a:chExt cx="216024" cy="382265"/>
@@ -28620,7 +28466,7 @@
         </p:nvGrpSpPr>
         <p:grpSpPr>
           <a:xfrm>
-            <a:off x="6300192" y="4731180"/>
+            <a:off x="1765071" y="5850212"/>
             <a:ext cx="216024" cy="382265"/>
             <a:chOff x="2771800" y="1369443"/>
             <a:chExt cx="216024" cy="382265"/>
@@ -28820,7 +28666,7 @@
         </p:nvGrpSpPr>
         <p:grpSpPr>
           <a:xfrm>
-            <a:off x="1680262" y="3142779"/>
+            <a:off x="1771308" y="2002157"/>
             <a:ext cx="216024" cy="382265"/>
             <a:chOff x="2771800" y="1369443"/>
             <a:chExt cx="216024" cy="382265"/>
@@ -29020,7 +28866,7 @@
         </p:nvGrpSpPr>
         <p:grpSpPr>
           <a:xfrm>
-            <a:off x="1680262" y="3657947"/>
+            <a:off x="1771308" y="2517325"/>
             <a:ext cx="216024" cy="382265"/>
             <a:chOff x="2771800" y="1369443"/>
             <a:chExt cx="216024" cy="382265"/>
@@ -29220,7 +29066,7 @@
         </p:nvGrpSpPr>
         <p:grpSpPr>
           <a:xfrm>
-            <a:off x="1680262" y="4246938"/>
+            <a:off x="1771308" y="3106316"/>
             <a:ext cx="216024" cy="382265"/>
             <a:chOff x="2771800" y="1369443"/>
             <a:chExt cx="216024" cy="382265"/>
@@ -29420,7 +29266,7 @@
         </p:nvGrpSpPr>
         <p:grpSpPr>
           <a:xfrm>
-            <a:off x="1680262" y="4762106"/>
+            <a:off x="1771308" y="3621484"/>
             <a:ext cx="216024" cy="382265"/>
             <a:chOff x="2771800" y="1369443"/>
             <a:chExt cx="216024" cy="382265"/>
@@ -29620,7 +29466,7 @@
         </p:nvGrpSpPr>
         <p:grpSpPr>
           <a:xfrm>
-            <a:off x="2480486" y="1373175"/>
+            <a:off x="1460400" y="924859"/>
             <a:ext cx="216024" cy="382265"/>
             <a:chOff x="2771800" y="1369443"/>
             <a:chExt cx="216024" cy="382265"/>
@@ -29822,7 +29668,7 @@
         </p:nvGrpSpPr>
         <p:grpSpPr>
           <a:xfrm>
-            <a:off x="2476791" y="1845450"/>
+            <a:off x="1456705" y="1397134"/>
             <a:ext cx="216024" cy="382265"/>
             <a:chOff x="2771800" y="1369443"/>
             <a:chExt cx="216024" cy="382265"/>
@@ -30024,7 +29870,7 @@
         </p:nvGrpSpPr>
         <p:grpSpPr>
           <a:xfrm>
-            <a:off x="2205907" y="1378076"/>
+            <a:off x="1185821" y="929760"/>
             <a:ext cx="216024" cy="382265"/>
             <a:chOff x="2771800" y="1369443"/>
             <a:chExt cx="216024" cy="382265"/>
@@ -30226,7 +30072,7 @@
         </p:nvGrpSpPr>
         <p:grpSpPr>
           <a:xfrm>
-            <a:off x="2202212" y="1850351"/>
+            <a:off x="1182126" y="1402035"/>
             <a:ext cx="216024" cy="382265"/>
             <a:chOff x="2771800" y="1369443"/>
             <a:chExt cx="216024" cy="382265"/>
@@ -30428,7 +30274,7 @@
         </p:nvGrpSpPr>
         <p:grpSpPr>
           <a:xfrm>
-            <a:off x="1920989" y="1369443"/>
+            <a:off x="900903" y="921127"/>
             <a:ext cx="216024" cy="382265"/>
             <a:chOff x="2771800" y="1369443"/>
             <a:chExt cx="216024" cy="382265"/>
@@ -30630,7 +30476,7 @@
         </p:nvGrpSpPr>
         <p:grpSpPr>
           <a:xfrm>
-            <a:off x="1917294" y="1841718"/>
+            <a:off x="897208" y="1393402"/>
             <a:ext cx="216024" cy="382265"/>
             <a:chOff x="2771800" y="1369443"/>
             <a:chExt cx="216024" cy="382265"/>
@@ -30832,14 +30678,15 @@
         </p:nvGrpSpPr>
         <p:grpSpPr>
           <a:xfrm>
-            <a:off x="1635341" y="1373313"/>
+            <a:off x="615255" y="924997"/>
             <a:ext cx="216024" cy="382265"/>
             <a:chOff x="2771800" y="1369443"/>
             <a:chExt cx="216024" cy="382265"/>
           </a:xfrm>
           <a:solidFill>
-            <a:schemeClr val="bg1">
-              <a:lumMod val="85000"/>
+            <a:schemeClr val="accent3">
+              <a:lumMod val="40000"/>
+              <a:lumOff val="60000"/>
             </a:schemeClr>
           </a:solidFill>
         </p:grpSpPr>
@@ -31034,14 +30881,15 @@
         </p:nvGrpSpPr>
         <p:grpSpPr>
           <a:xfrm>
-            <a:off x="1631646" y="1845588"/>
+            <a:off x="611560" y="1397272"/>
             <a:ext cx="216024" cy="382265"/>
             <a:chOff x="2771800" y="1369443"/>
             <a:chExt cx="216024" cy="382265"/>
           </a:xfrm>
           <a:solidFill>
-            <a:schemeClr val="bg1">
-              <a:lumMod val="85000"/>
+            <a:schemeClr val="accent3">
+              <a:lumMod val="40000"/>
+              <a:lumOff val="60000"/>
             </a:schemeClr>
           </a:solidFill>
         </p:grpSpPr>
@@ -31230,606 +31078,1387 @@
       </p:grpSp>
       <p:grpSp>
         <p:nvGrpSpPr>
-          <p:cNvPr id="332" name="Group 331"/>
+          <p:cNvPr id="24" name="Group 23"/>
           <p:cNvGrpSpPr/>
           <p:nvPr/>
         </p:nvGrpSpPr>
         <p:grpSpPr>
           <a:xfrm>
-            <a:off x="7538529" y="1196752"/>
-            <a:ext cx="138283" cy="244699"/>
-            <a:chOff x="2771800" y="1369443"/>
-            <a:chExt cx="216024" cy="382265"/>
-          </a:xfrm>
-          <a:solidFill>
-            <a:srgbClr val="EDC87A"/>
-          </a:solidFill>
+            <a:off x="5810470" y="1012965"/>
+            <a:ext cx="138283" cy="827504"/>
+            <a:chOff x="7294414" y="1077704"/>
+            <a:chExt cx="138283" cy="827504"/>
+          </a:xfrm>
         </p:grpSpPr>
-        <p:sp>
-          <p:nvSpPr>
-            <p:cNvPr id="333" name="Oval 332"/>
-            <p:cNvSpPr/>
+        <p:grpSp>
+          <p:nvGrpSpPr>
+            <p:cNvPr id="332" name="Group 331"/>
+            <p:cNvGrpSpPr/>
             <p:nvPr/>
-          </p:nvSpPr>
-          <p:spPr>
+          </p:nvGrpSpPr>
+          <p:grpSpPr>
             <a:xfrm>
-              <a:off x="2807804" y="1369443"/>
-              <a:ext cx="144016" cy="144016"/>
+              <a:off x="7294414" y="1077704"/>
+              <a:ext cx="138283" cy="244699"/>
+              <a:chOff x="2771800" y="1369443"/>
+              <a:chExt cx="216024" cy="382265"/>
             </a:xfrm>
-            <a:prstGeom prst="ellipse">
-              <a:avLst/>
-            </a:prstGeom>
-            <a:grpFill/>
-            <a:ln>
-              <a:solidFill>
-                <a:srgbClr val="0070C0"/>
-              </a:solidFill>
-            </a:ln>
-          </p:spPr>
-          <p:style>
-            <a:lnRef idx="2">
-              <a:schemeClr val="accent1">
-                <a:shade val="50000"/>
-              </a:schemeClr>
-            </a:lnRef>
-            <a:fillRef idx="1">
-              <a:schemeClr val="accent1"/>
-            </a:fillRef>
-            <a:effectRef idx="0">
-              <a:schemeClr val="accent1"/>
-            </a:effectRef>
-            <a:fontRef idx="minor">
-              <a:schemeClr val="lt1"/>
-            </a:fontRef>
-          </p:style>
-          <p:txBody>
-            <a:bodyPr rtlCol="0" anchor="ctr"/>
-            <a:lstStyle/>
-            <a:p>
-              <a:pPr algn="ctr"/>
-              <a:endParaRPr lang="en-GB"/>
-            </a:p>
-          </p:txBody>
-        </p:sp>
-        <p:sp>
-          <p:nvSpPr>
-            <p:cNvPr id="334" name="Oval 333"/>
-            <p:cNvSpPr/>
+            <a:solidFill>
+              <a:srgbClr val="EDC87A"/>
+            </a:solidFill>
+          </p:grpSpPr>
+          <p:sp>
+            <p:nvSpPr>
+              <p:cNvPr id="333" name="Oval 332"/>
+              <p:cNvSpPr/>
+              <p:nvPr/>
+            </p:nvSpPr>
+            <p:spPr>
+              <a:xfrm>
+                <a:off x="2807804" y="1369443"/>
+                <a:ext cx="144016" cy="144016"/>
+              </a:xfrm>
+              <a:prstGeom prst="ellipse">
+                <a:avLst/>
+              </a:prstGeom>
+              <a:grpFill/>
+              <a:ln>
+                <a:solidFill>
+                  <a:srgbClr val="0070C0"/>
+                </a:solidFill>
+              </a:ln>
+            </p:spPr>
+            <p:style>
+              <a:lnRef idx="2">
+                <a:schemeClr val="accent1">
+                  <a:shade val="50000"/>
+                </a:schemeClr>
+              </a:lnRef>
+              <a:fillRef idx="1">
+                <a:schemeClr val="accent1"/>
+              </a:fillRef>
+              <a:effectRef idx="0">
+                <a:schemeClr val="accent1"/>
+              </a:effectRef>
+              <a:fontRef idx="minor">
+                <a:schemeClr val="lt1"/>
+              </a:fontRef>
+            </p:style>
+            <p:txBody>
+              <a:bodyPr rtlCol="0" anchor="ctr"/>
+              <a:lstStyle/>
+              <a:p>
+                <a:pPr algn="ctr"/>
+                <a:endParaRPr lang="en-GB"/>
+              </a:p>
+            </p:txBody>
+          </p:sp>
+          <p:sp>
+            <p:nvSpPr>
+              <p:cNvPr id="334" name="Oval 333"/>
+              <p:cNvSpPr/>
+              <p:nvPr/>
+            </p:nvSpPr>
+            <p:spPr>
+              <a:xfrm>
+                <a:off x="2771800" y="1535684"/>
+                <a:ext cx="216024" cy="144016"/>
+              </a:xfrm>
+              <a:prstGeom prst="ellipse">
+                <a:avLst/>
+              </a:prstGeom>
+              <a:grpFill/>
+              <a:ln>
+                <a:solidFill>
+                  <a:srgbClr val="0070C0"/>
+                </a:solidFill>
+              </a:ln>
+            </p:spPr>
+            <p:style>
+              <a:lnRef idx="2">
+                <a:schemeClr val="accent1">
+                  <a:shade val="50000"/>
+                </a:schemeClr>
+              </a:lnRef>
+              <a:fillRef idx="1">
+                <a:schemeClr val="accent1"/>
+              </a:fillRef>
+              <a:effectRef idx="0">
+                <a:schemeClr val="accent1"/>
+              </a:effectRef>
+              <a:fontRef idx="minor">
+                <a:schemeClr val="lt1"/>
+              </a:fontRef>
+            </p:style>
+            <p:txBody>
+              <a:bodyPr rtlCol="0" anchor="ctr"/>
+              <a:lstStyle/>
+              <a:p>
+                <a:pPr algn="ctr"/>
+                <a:endParaRPr lang="en-GB"/>
+              </a:p>
+            </p:txBody>
+          </p:sp>
+          <p:sp>
+            <p:nvSpPr>
+              <p:cNvPr id="335" name="Rectangle 334"/>
+              <p:cNvSpPr/>
+              <p:nvPr/>
+            </p:nvSpPr>
+            <p:spPr>
+              <a:xfrm>
+                <a:off x="2771800" y="1607692"/>
+                <a:ext cx="216024" cy="144016"/>
+              </a:xfrm>
+              <a:prstGeom prst="rect">
+                <a:avLst/>
+              </a:prstGeom>
+              <a:grpFill/>
+              <a:ln>
+                <a:solidFill>
+                  <a:srgbClr val="0070C0"/>
+                </a:solidFill>
+              </a:ln>
+            </p:spPr>
+            <p:style>
+              <a:lnRef idx="2">
+                <a:schemeClr val="accent1">
+                  <a:shade val="50000"/>
+                </a:schemeClr>
+              </a:lnRef>
+              <a:fillRef idx="1">
+                <a:schemeClr val="accent1"/>
+              </a:fillRef>
+              <a:effectRef idx="0">
+                <a:schemeClr val="accent1"/>
+              </a:effectRef>
+              <a:fontRef idx="minor">
+                <a:schemeClr val="lt1"/>
+              </a:fontRef>
+            </p:style>
+            <p:txBody>
+              <a:bodyPr rtlCol="0" anchor="ctr"/>
+              <a:lstStyle/>
+              <a:p>
+                <a:pPr algn="ctr"/>
+                <a:endParaRPr lang="en-GB"/>
+              </a:p>
+            </p:txBody>
+          </p:sp>
+          <p:sp>
+            <p:nvSpPr>
+              <p:cNvPr id="336" name="Rectangle 335"/>
+              <p:cNvSpPr/>
+              <p:nvPr/>
+            </p:nvSpPr>
+            <p:spPr>
+              <a:xfrm>
+                <a:off x="2788948" y="1591577"/>
+                <a:ext cx="183641" cy="45719"/>
+              </a:xfrm>
+              <a:prstGeom prst="rect">
+                <a:avLst/>
+              </a:prstGeom>
+              <a:grpFill/>
+              <a:ln>
+                <a:noFill/>
+              </a:ln>
+            </p:spPr>
+            <p:style>
+              <a:lnRef idx="2">
+                <a:schemeClr val="accent1">
+                  <a:shade val="50000"/>
+                </a:schemeClr>
+              </a:lnRef>
+              <a:fillRef idx="1">
+                <a:schemeClr val="accent1"/>
+              </a:fillRef>
+              <a:effectRef idx="0">
+                <a:schemeClr val="accent1"/>
+              </a:effectRef>
+              <a:fontRef idx="minor">
+                <a:schemeClr val="lt1"/>
+              </a:fontRef>
+            </p:style>
+            <p:txBody>
+              <a:bodyPr rtlCol="0" anchor="ctr"/>
+              <a:lstStyle/>
+              <a:p>
+                <a:pPr algn="ctr"/>
+                <a:endParaRPr lang="en-GB"/>
+              </a:p>
+            </p:txBody>
+          </p:sp>
+        </p:grpSp>
+        <p:grpSp>
+          <p:nvGrpSpPr>
+            <p:cNvPr id="337" name="Group 336"/>
+            <p:cNvGrpSpPr/>
             <p:nvPr/>
-          </p:nvSpPr>
-          <p:spPr>
+          </p:nvGrpSpPr>
+          <p:grpSpPr>
             <a:xfrm>
-              <a:off x="2771800" y="1535684"/>
-              <a:ext cx="216024" cy="144016"/>
+              <a:off x="7300606" y="1361316"/>
+              <a:ext cx="125898" cy="272533"/>
+              <a:chOff x="2771800" y="1369443"/>
+              <a:chExt cx="216024" cy="382265"/>
             </a:xfrm>
-            <a:prstGeom prst="ellipse">
-              <a:avLst/>
-            </a:prstGeom>
-            <a:grpFill/>
-            <a:ln>
-              <a:solidFill>
-                <a:srgbClr val="0070C0"/>
-              </a:solidFill>
-            </a:ln>
-          </p:spPr>
-          <p:style>
-            <a:lnRef idx="2">
-              <a:schemeClr val="accent1">
-                <a:shade val="50000"/>
-              </a:schemeClr>
-            </a:lnRef>
-            <a:fillRef idx="1">
-              <a:schemeClr val="accent1"/>
-            </a:fillRef>
-            <a:effectRef idx="0">
-              <a:schemeClr val="accent1"/>
-            </a:effectRef>
-            <a:fontRef idx="minor">
-              <a:schemeClr val="lt1"/>
-            </a:fontRef>
-          </p:style>
-          <p:txBody>
-            <a:bodyPr rtlCol="0" anchor="ctr"/>
-            <a:lstStyle/>
-            <a:p>
-              <a:pPr algn="ctr"/>
-              <a:endParaRPr lang="en-GB"/>
-            </a:p>
-          </p:txBody>
-        </p:sp>
-        <p:sp>
-          <p:nvSpPr>
-            <p:cNvPr id="335" name="Rectangle 334"/>
-            <p:cNvSpPr/>
+            <a:solidFill>
+              <a:srgbClr val="94C9E4"/>
+            </a:solidFill>
+          </p:grpSpPr>
+          <p:sp>
+            <p:nvSpPr>
+              <p:cNvPr id="338" name="Oval 337"/>
+              <p:cNvSpPr/>
+              <p:nvPr/>
+            </p:nvSpPr>
+            <p:spPr>
+              <a:xfrm>
+                <a:off x="2807804" y="1369443"/>
+                <a:ext cx="144016" cy="144016"/>
+              </a:xfrm>
+              <a:prstGeom prst="ellipse">
+                <a:avLst/>
+              </a:prstGeom>
+              <a:grpFill/>
+              <a:ln>
+                <a:solidFill>
+                  <a:srgbClr val="0070C0"/>
+                </a:solidFill>
+              </a:ln>
+            </p:spPr>
+            <p:style>
+              <a:lnRef idx="2">
+                <a:schemeClr val="accent1">
+                  <a:shade val="50000"/>
+                </a:schemeClr>
+              </a:lnRef>
+              <a:fillRef idx="1">
+                <a:schemeClr val="accent1"/>
+              </a:fillRef>
+              <a:effectRef idx="0">
+                <a:schemeClr val="accent1"/>
+              </a:effectRef>
+              <a:fontRef idx="minor">
+                <a:schemeClr val="lt1"/>
+              </a:fontRef>
+            </p:style>
+            <p:txBody>
+              <a:bodyPr rtlCol="0" anchor="ctr"/>
+              <a:lstStyle/>
+              <a:p>
+                <a:pPr algn="ctr"/>
+                <a:endParaRPr lang="en-GB"/>
+              </a:p>
+            </p:txBody>
+          </p:sp>
+          <p:sp>
+            <p:nvSpPr>
+              <p:cNvPr id="339" name="Oval 338"/>
+              <p:cNvSpPr/>
+              <p:nvPr/>
+            </p:nvSpPr>
+            <p:spPr>
+              <a:xfrm>
+                <a:off x="2771800" y="1535684"/>
+                <a:ext cx="216024" cy="144016"/>
+              </a:xfrm>
+              <a:prstGeom prst="ellipse">
+                <a:avLst/>
+              </a:prstGeom>
+              <a:grpFill/>
+              <a:ln>
+                <a:solidFill>
+                  <a:srgbClr val="0070C0"/>
+                </a:solidFill>
+              </a:ln>
+            </p:spPr>
+            <p:style>
+              <a:lnRef idx="2">
+                <a:schemeClr val="accent1">
+                  <a:shade val="50000"/>
+                </a:schemeClr>
+              </a:lnRef>
+              <a:fillRef idx="1">
+                <a:schemeClr val="accent1"/>
+              </a:fillRef>
+              <a:effectRef idx="0">
+                <a:schemeClr val="accent1"/>
+              </a:effectRef>
+              <a:fontRef idx="minor">
+                <a:schemeClr val="lt1"/>
+              </a:fontRef>
+            </p:style>
+            <p:txBody>
+              <a:bodyPr rtlCol="0" anchor="ctr"/>
+              <a:lstStyle/>
+              <a:p>
+                <a:pPr algn="ctr"/>
+                <a:endParaRPr lang="en-GB"/>
+              </a:p>
+            </p:txBody>
+          </p:sp>
+          <p:sp>
+            <p:nvSpPr>
+              <p:cNvPr id="340" name="Rectangle 339"/>
+              <p:cNvSpPr/>
+              <p:nvPr/>
+            </p:nvSpPr>
+            <p:spPr>
+              <a:xfrm>
+                <a:off x="2771800" y="1607692"/>
+                <a:ext cx="216024" cy="144016"/>
+              </a:xfrm>
+              <a:prstGeom prst="rect">
+                <a:avLst/>
+              </a:prstGeom>
+              <a:grpFill/>
+              <a:ln>
+                <a:solidFill>
+                  <a:srgbClr val="0070C0"/>
+                </a:solidFill>
+              </a:ln>
+            </p:spPr>
+            <p:style>
+              <a:lnRef idx="2">
+                <a:schemeClr val="accent1">
+                  <a:shade val="50000"/>
+                </a:schemeClr>
+              </a:lnRef>
+              <a:fillRef idx="1">
+                <a:schemeClr val="accent1"/>
+              </a:fillRef>
+              <a:effectRef idx="0">
+                <a:schemeClr val="accent1"/>
+              </a:effectRef>
+              <a:fontRef idx="minor">
+                <a:schemeClr val="lt1"/>
+              </a:fontRef>
+            </p:style>
+            <p:txBody>
+              <a:bodyPr rtlCol="0" anchor="ctr"/>
+              <a:lstStyle/>
+              <a:p>
+                <a:pPr algn="ctr"/>
+                <a:endParaRPr lang="en-GB"/>
+              </a:p>
+            </p:txBody>
+          </p:sp>
+          <p:sp>
+            <p:nvSpPr>
+              <p:cNvPr id="341" name="Rectangle 340"/>
+              <p:cNvSpPr/>
+              <p:nvPr/>
+            </p:nvSpPr>
+            <p:spPr>
+              <a:xfrm>
+                <a:off x="2788948" y="1591577"/>
+                <a:ext cx="183641" cy="45719"/>
+              </a:xfrm>
+              <a:prstGeom prst="rect">
+                <a:avLst/>
+              </a:prstGeom>
+              <a:grpFill/>
+              <a:ln>
+                <a:noFill/>
+              </a:ln>
+            </p:spPr>
+            <p:style>
+              <a:lnRef idx="2">
+                <a:schemeClr val="accent1">
+                  <a:shade val="50000"/>
+                </a:schemeClr>
+              </a:lnRef>
+              <a:fillRef idx="1">
+                <a:schemeClr val="accent1"/>
+              </a:fillRef>
+              <a:effectRef idx="0">
+                <a:schemeClr val="accent1"/>
+              </a:effectRef>
+              <a:fontRef idx="minor">
+                <a:schemeClr val="lt1"/>
+              </a:fontRef>
+            </p:style>
+            <p:txBody>
+              <a:bodyPr rtlCol="0" anchor="ctr"/>
+              <a:lstStyle/>
+              <a:p>
+                <a:pPr algn="ctr"/>
+                <a:endParaRPr lang="en-GB"/>
+              </a:p>
+            </p:txBody>
+          </p:sp>
+        </p:grpSp>
+        <p:grpSp>
+          <p:nvGrpSpPr>
+            <p:cNvPr id="127" name="Group 126"/>
+            <p:cNvGrpSpPr/>
             <p:nvPr/>
-          </p:nvSpPr>
-          <p:spPr>
+          </p:nvGrpSpPr>
+          <p:grpSpPr>
             <a:xfrm>
-              <a:off x="2771800" y="1607692"/>
-              <a:ext cx="216024" cy="144016"/>
+              <a:off x="7294414" y="1660509"/>
+              <a:ext cx="138283" cy="244699"/>
+              <a:chOff x="2771800" y="1369443"/>
+              <a:chExt cx="216024" cy="382265"/>
             </a:xfrm>
-            <a:prstGeom prst="rect">
-              <a:avLst/>
-            </a:prstGeom>
-            <a:grpFill/>
-            <a:ln>
-              <a:solidFill>
-                <a:srgbClr val="0070C0"/>
-              </a:solidFill>
-            </a:ln>
-          </p:spPr>
-          <p:style>
-            <a:lnRef idx="2">
-              <a:schemeClr val="accent1">
-                <a:shade val="50000"/>
-              </a:schemeClr>
-            </a:lnRef>
-            <a:fillRef idx="1">
-              <a:schemeClr val="accent1"/>
-            </a:fillRef>
-            <a:effectRef idx="0">
-              <a:schemeClr val="accent1"/>
-            </a:effectRef>
-            <a:fontRef idx="minor">
-              <a:schemeClr val="lt1"/>
-            </a:fontRef>
-          </p:style>
-          <p:txBody>
-            <a:bodyPr rtlCol="0" anchor="ctr"/>
-            <a:lstStyle/>
-            <a:p>
-              <a:pPr algn="ctr"/>
-              <a:endParaRPr lang="en-GB"/>
-            </a:p>
-          </p:txBody>
-        </p:sp>
-        <p:sp>
-          <p:nvSpPr>
-            <p:cNvPr id="336" name="Rectangle 335"/>
-            <p:cNvSpPr/>
-            <p:nvPr/>
-          </p:nvSpPr>
-          <p:spPr>
-            <a:xfrm>
-              <a:off x="2788948" y="1591577"/>
-              <a:ext cx="183641" cy="45719"/>
-            </a:xfrm>
-            <a:prstGeom prst="rect">
-              <a:avLst/>
-            </a:prstGeom>
-            <a:grpFill/>
-            <a:ln>
-              <a:noFill/>
-            </a:ln>
-          </p:spPr>
-          <p:style>
-            <a:lnRef idx="2">
-              <a:schemeClr val="accent1">
-                <a:shade val="50000"/>
-              </a:schemeClr>
-            </a:lnRef>
-            <a:fillRef idx="1">
-              <a:schemeClr val="accent1"/>
-            </a:fillRef>
-            <a:effectRef idx="0">
-              <a:schemeClr val="accent1"/>
-            </a:effectRef>
-            <a:fontRef idx="minor">
-              <a:schemeClr val="lt1"/>
-            </a:fontRef>
-          </p:style>
-          <p:txBody>
-            <a:bodyPr rtlCol="0" anchor="ctr"/>
-            <a:lstStyle/>
-            <a:p>
-              <a:pPr algn="ctr"/>
-              <a:endParaRPr lang="en-GB"/>
-            </a:p>
-          </p:txBody>
-        </p:sp>
+            <a:solidFill>
+              <a:schemeClr val="bg1">
+                <a:lumMod val="85000"/>
+              </a:schemeClr>
+            </a:solidFill>
+          </p:grpSpPr>
+          <p:sp>
+            <p:nvSpPr>
+              <p:cNvPr id="128" name="Oval 127"/>
+              <p:cNvSpPr/>
+              <p:nvPr/>
+            </p:nvSpPr>
+            <p:spPr>
+              <a:xfrm>
+                <a:off x="2807804" y="1369443"/>
+                <a:ext cx="144016" cy="144016"/>
+              </a:xfrm>
+              <a:prstGeom prst="ellipse">
+                <a:avLst/>
+              </a:prstGeom>
+              <a:grpFill/>
+              <a:ln>
+                <a:solidFill>
+                  <a:srgbClr val="0070C0"/>
+                </a:solidFill>
+              </a:ln>
+            </p:spPr>
+            <p:style>
+              <a:lnRef idx="2">
+                <a:schemeClr val="accent1">
+                  <a:shade val="50000"/>
+                </a:schemeClr>
+              </a:lnRef>
+              <a:fillRef idx="1">
+                <a:schemeClr val="accent1"/>
+              </a:fillRef>
+              <a:effectRef idx="0">
+                <a:schemeClr val="accent1"/>
+              </a:effectRef>
+              <a:fontRef idx="minor">
+                <a:schemeClr val="lt1"/>
+              </a:fontRef>
+            </p:style>
+            <p:txBody>
+              <a:bodyPr rtlCol="0" anchor="ctr"/>
+              <a:lstStyle/>
+              <a:p>
+                <a:pPr algn="ctr"/>
+                <a:endParaRPr lang="en-GB"/>
+              </a:p>
+            </p:txBody>
+          </p:sp>
+          <p:sp>
+            <p:nvSpPr>
+              <p:cNvPr id="129" name="Oval 128"/>
+              <p:cNvSpPr/>
+              <p:nvPr/>
+            </p:nvSpPr>
+            <p:spPr>
+              <a:xfrm>
+                <a:off x="2771800" y="1535684"/>
+                <a:ext cx="216024" cy="144016"/>
+              </a:xfrm>
+              <a:prstGeom prst="ellipse">
+                <a:avLst/>
+              </a:prstGeom>
+              <a:grpFill/>
+              <a:ln>
+                <a:solidFill>
+                  <a:srgbClr val="0070C0"/>
+                </a:solidFill>
+              </a:ln>
+            </p:spPr>
+            <p:style>
+              <a:lnRef idx="2">
+                <a:schemeClr val="accent1">
+                  <a:shade val="50000"/>
+                </a:schemeClr>
+              </a:lnRef>
+              <a:fillRef idx="1">
+                <a:schemeClr val="accent1"/>
+              </a:fillRef>
+              <a:effectRef idx="0">
+                <a:schemeClr val="accent1"/>
+              </a:effectRef>
+              <a:fontRef idx="minor">
+                <a:schemeClr val="lt1"/>
+              </a:fontRef>
+            </p:style>
+            <p:txBody>
+              <a:bodyPr rtlCol="0" anchor="ctr"/>
+              <a:lstStyle/>
+              <a:p>
+                <a:pPr algn="ctr"/>
+                <a:endParaRPr lang="en-GB"/>
+              </a:p>
+            </p:txBody>
+          </p:sp>
+          <p:sp>
+            <p:nvSpPr>
+              <p:cNvPr id="130" name="Rectangle 129"/>
+              <p:cNvSpPr/>
+              <p:nvPr/>
+            </p:nvSpPr>
+            <p:spPr>
+              <a:xfrm>
+                <a:off x="2771800" y="1607692"/>
+                <a:ext cx="216024" cy="144016"/>
+              </a:xfrm>
+              <a:prstGeom prst="rect">
+                <a:avLst/>
+              </a:prstGeom>
+              <a:grpFill/>
+              <a:ln>
+                <a:solidFill>
+                  <a:srgbClr val="0070C0"/>
+                </a:solidFill>
+              </a:ln>
+            </p:spPr>
+            <p:style>
+              <a:lnRef idx="2">
+                <a:schemeClr val="accent1">
+                  <a:shade val="50000"/>
+                </a:schemeClr>
+              </a:lnRef>
+              <a:fillRef idx="1">
+                <a:schemeClr val="accent1"/>
+              </a:fillRef>
+              <a:effectRef idx="0">
+                <a:schemeClr val="accent1"/>
+              </a:effectRef>
+              <a:fontRef idx="minor">
+                <a:schemeClr val="lt1"/>
+              </a:fontRef>
+            </p:style>
+            <p:txBody>
+              <a:bodyPr rtlCol="0" anchor="ctr"/>
+              <a:lstStyle/>
+              <a:p>
+                <a:pPr algn="ctr"/>
+                <a:endParaRPr lang="en-GB"/>
+              </a:p>
+            </p:txBody>
+          </p:sp>
+          <p:sp>
+            <p:nvSpPr>
+              <p:cNvPr id="131" name="Rectangle 130"/>
+              <p:cNvSpPr/>
+              <p:nvPr/>
+            </p:nvSpPr>
+            <p:spPr>
+              <a:xfrm>
+                <a:off x="2788948" y="1591577"/>
+                <a:ext cx="183641" cy="45719"/>
+              </a:xfrm>
+              <a:prstGeom prst="rect">
+                <a:avLst/>
+              </a:prstGeom>
+              <a:grpFill/>
+              <a:ln>
+                <a:noFill/>
+              </a:ln>
+            </p:spPr>
+            <p:style>
+              <a:lnRef idx="2">
+                <a:schemeClr val="accent1">
+                  <a:shade val="50000"/>
+                </a:schemeClr>
+              </a:lnRef>
+              <a:fillRef idx="1">
+                <a:schemeClr val="accent1"/>
+              </a:fillRef>
+              <a:effectRef idx="0">
+                <a:schemeClr val="accent1"/>
+              </a:effectRef>
+              <a:fontRef idx="minor">
+                <a:schemeClr val="lt1"/>
+              </a:fontRef>
+            </p:style>
+            <p:txBody>
+              <a:bodyPr rtlCol="0" anchor="ctr"/>
+              <a:lstStyle/>
+              <a:p>
+                <a:pPr algn="ctr"/>
+                <a:endParaRPr lang="en-GB"/>
+              </a:p>
+            </p:txBody>
+          </p:sp>
+        </p:grpSp>
       </p:grpSp>
-      <p:grpSp>
-        <p:nvGrpSpPr>
-          <p:cNvPr id="337" name="Group 336"/>
-          <p:cNvGrpSpPr/>
-          <p:nvPr/>
-        </p:nvGrpSpPr>
-        <p:grpSpPr>
-          <a:xfrm>
-            <a:off x="8406542" y="1441451"/>
-            <a:ext cx="125898" cy="272533"/>
-            <a:chOff x="2771800" y="1369443"/>
-            <a:chExt cx="216024" cy="382265"/>
-          </a:xfrm>
+      <p:sp>
+        <p:nvSpPr>
+          <p:cNvPr id="4" name="Can 3"/>
+          <p:cNvSpPr/>
+          <p:nvPr/>
+        </p:nvSpPr>
+        <p:spPr>
+          <a:xfrm>
+            <a:off x="2133946" y="1927702"/>
+            <a:ext cx="562822" cy="468052"/>
+          </a:xfrm>
+          <a:prstGeom prst="can">
+            <a:avLst/>
+          </a:prstGeom>
           <a:solidFill>
             <a:srgbClr val="94C9E4"/>
           </a:solidFill>
-        </p:grpSpPr>
-        <p:sp>
-          <p:nvSpPr>
-            <p:cNvPr id="338" name="Oval 337"/>
-            <p:cNvSpPr/>
-            <p:nvPr/>
-          </p:nvSpPr>
-          <p:spPr>
-            <a:xfrm>
-              <a:off x="2807804" y="1369443"/>
-              <a:ext cx="144016" cy="144016"/>
-            </a:xfrm>
-            <a:prstGeom prst="ellipse">
-              <a:avLst/>
-            </a:prstGeom>
-            <a:grpFill/>
-            <a:ln>
+          <a:ln>
+            <a:solidFill>
+              <a:srgbClr val="94C9E4"/>
+            </a:solidFill>
+          </a:ln>
+        </p:spPr>
+        <p:style>
+          <a:lnRef idx="2">
+            <a:schemeClr val="accent1">
+              <a:shade val="50000"/>
+            </a:schemeClr>
+          </a:lnRef>
+          <a:fillRef idx="1">
+            <a:schemeClr val="accent1"/>
+          </a:fillRef>
+          <a:effectRef idx="0">
+            <a:schemeClr val="accent1"/>
+          </a:effectRef>
+          <a:fontRef idx="minor">
+            <a:schemeClr val="lt1"/>
+          </a:fontRef>
+        </p:style>
+        <p:txBody>
+          <a:bodyPr rtlCol="0" anchor="ctr"/>
+          <a:lstStyle/>
+          <a:p>
+            <a:pPr algn="ctr"/>
+            <a:r>
+              <a:rPr lang="en-GB" dirty="0" smtClean="0">
+                <a:solidFill>
+                  <a:srgbClr val="002060"/>
+                </a:solidFill>
+              </a:rPr>
+              <a:t>CT</a:t>
+            </a:r>
+            <a:endParaRPr lang="en-GB" dirty="0">
               <a:solidFill>
-                <a:srgbClr val="0070C0"/>
+                <a:srgbClr val="002060"/>
               </a:solidFill>
-            </a:ln>
-          </p:spPr>
-          <p:style>
-            <a:lnRef idx="2">
-              <a:schemeClr val="accent1">
-                <a:shade val="50000"/>
-              </a:schemeClr>
-            </a:lnRef>
-            <a:fillRef idx="1">
-              <a:schemeClr val="accent1"/>
-            </a:fillRef>
-            <a:effectRef idx="0">
-              <a:schemeClr val="accent1"/>
-            </a:effectRef>
-            <a:fontRef idx="minor">
-              <a:schemeClr val="lt1"/>
-            </a:fontRef>
-          </p:style>
-          <p:txBody>
-            <a:bodyPr rtlCol="0" anchor="ctr"/>
-            <a:lstStyle/>
-            <a:p>
-              <a:pPr algn="ctr"/>
-              <a:endParaRPr lang="en-GB"/>
-            </a:p>
-          </p:txBody>
-        </p:sp>
-        <p:sp>
-          <p:nvSpPr>
-            <p:cNvPr id="339" name="Oval 338"/>
-            <p:cNvSpPr/>
-            <p:nvPr/>
-          </p:nvSpPr>
-          <p:spPr>
-            <a:xfrm>
-              <a:off x="2771800" y="1535684"/>
-              <a:ext cx="216024" cy="144016"/>
-            </a:xfrm>
-            <a:prstGeom prst="ellipse">
-              <a:avLst/>
-            </a:prstGeom>
-            <a:grpFill/>
-            <a:ln>
+            </a:endParaRPr>
+          </a:p>
+        </p:txBody>
+      </p:sp>
+      <p:sp>
+        <p:nvSpPr>
+          <p:cNvPr id="125" name="Can 124"/>
+          <p:cNvSpPr/>
+          <p:nvPr/>
+        </p:nvSpPr>
+        <p:spPr>
+          <a:xfrm>
+            <a:off x="2133946" y="2487915"/>
+            <a:ext cx="562822" cy="468052"/>
+          </a:xfrm>
+          <a:prstGeom prst="can">
+            <a:avLst/>
+          </a:prstGeom>
+          <a:solidFill>
+            <a:srgbClr val="94C9E4"/>
+          </a:solidFill>
+          <a:ln>
+            <a:solidFill>
+              <a:srgbClr val="94C9E4"/>
+            </a:solidFill>
+          </a:ln>
+        </p:spPr>
+        <p:style>
+          <a:lnRef idx="2">
+            <a:schemeClr val="accent1">
+              <a:shade val="50000"/>
+            </a:schemeClr>
+          </a:lnRef>
+          <a:fillRef idx="1">
+            <a:schemeClr val="accent1"/>
+          </a:fillRef>
+          <a:effectRef idx="0">
+            <a:schemeClr val="accent1"/>
+          </a:effectRef>
+          <a:fontRef idx="minor">
+            <a:schemeClr val="lt1"/>
+          </a:fontRef>
+        </p:style>
+        <p:txBody>
+          <a:bodyPr rtlCol="0" anchor="ctr"/>
+          <a:lstStyle/>
+          <a:p>
+            <a:pPr algn="ctr"/>
+            <a:r>
+              <a:rPr lang="en-GB" dirty="0" smtClean="0">
+                <a:solidFill>
+                  <a:srgbClr val="002060"/>
+                </a:solidFill>
+              </a:rPr>
+              <a:t>CT</a:t>
+            </a:r>
+            <a:endParaRPr lang="en-GB" dirty="0">
               <a:solidFill>
-                <a:srgbClr val="0070C0"/>
+                <a:srgbClr val="002060"/>
               </a:solidFill>
-            </a:ln>
-          </p:spPr>
-          <p:style>
-            <a:lnRef idx="2">
-              <a:schemeClr val="accent1">
-                <a:shade val="50000"/>
-              </a:schemeClr>
-            </a:lnRef>
-            <a:fillRef idx="1">
-              <a:schemeClr val="accent1"/>
-            </a:fillRef>
-            <a:effectRef idx="0">
-              <a:schemeClr val="accent1"/>
-            </a:effectRef>
-            <a:fontRef idx="minor">
-              <a:schemeClr val="lt1"/>
-            </a:fontRef>
-          </p:style>
-          <p:txBody>
-            <a:bodyPr rtlCol="0" anchor="ctr"/>
-            <a:lstStyle/>
-            <a:p>
-              <a:pPr algn="ctr"/>
-              <a:endParaRPr lang="en-GB"/>
-            </a:p>
-          </p:txBody>
-        </p:sp>
-        <p:sp>
-          <p:nvSpPr>
-            <p:cNvPr id="340" name="Rectangle 339"/>
-            <p:cNvSpPr/>
-            <p:nvPr/>
-          </p:nvSpPr>
-          <p:spPr>
-            <a:xfrm>
-              <a:off x="2771800" y="1607692"/>
-              <a:ext cx="216024" cy="144016"/>
-            </a:xfrm>
-            <a:prstGeom prst="rect">
-              <a:avLst/>
-            </a:prstGeom>
-            <a:grpFill/>
-            <a:ln>
+            </a:endParaRPr>
+          </a:p>
+        </p:txBody>
+      </p:sp>
+      <p:sp>
+        <p:nvSpPr>
+          <p:cNvPr id="126" name="Can 125"/>
+          <p:cNvSpPr/>
+          <p:nvPr/>
+        </p:nvSpPr>
+        <p:spPr>
+          <a:xfrm>
+            <a:off x="2133946" y="3048128"/>
+            <a:ext cx="562822" cy="468052"/>
+          </a:xfrm>
+          <a:prstGeom prst="can">
+            <a:avLst/>
+          </a:prstGeom>
+          <a:solidFill>
+            <a:srgbClr val="94C9E4"/>
+          </a:solidFill>
+          <a:ln>
+            <a:solidFill>
+              <a:srgbClr val="94C9E4"/>
+            </a:solidFill>
+          </a:ln>
+        </p:spPr>
+        <p:style>
+          <a:lnRef idx="2">
+            <a:schemeClr val="accent1">
+              <a:shade val="50000"/>
+            </a:schemeClr>
+          </a:lnRef>
+          <a:fillRef idx="1">
+            <a:schemeClr val="accent1"/>
+          </a:fillRef>
+          <a:effectRef idx="0">
+            <a:schemeClr val="accent1"/>
+          </a:effectRef>
+          <a:fontRef idx="minor">
+            <a:schemeClr val="lt1"/>
+          </a:fontRef>
+        </p:style>
+        <p:txBody>
+          <a:bodyPr rtlCol="0" anchor="ctr"/>
+          <a:lstStyle/>
+          <a:p>
+            <a:pPr algn="ctr"/>
+            <a:r>
+              <a:rPr lang="en-GB" dirty="0" smtClean="0">
+                <a:solidFill>
+                  <a:srgbClr val="002060"/>
+                </a:solidFill>
+              </a:rPr>
+              <a:t>CT</a:t>
+            </a:r>
+            <a:endParaRPr lang="en-GB" dirty="0">
               <a:solidFill>
-                <a:srgbClr val="0070C0"/>
+                <a:srgbClr val="002060"/>
               </a:solidFill>
-            </a:ln>
-          </p:spPr>
-          <p:style>
-            <a:lnRef idx="2">
-              <a:schemeClr val="accent1">
-                <a:shade val="50000"/>
-              </a:schemeClr>
-            </a:lnRef>
-            <a:fillRef idx="1">
-              <a:schemeClr val="accent1"/>
-            </a:fillRef>
-            <a:effectRef idx="0">
-              <a:schemeClr val="accent1"/>
-            </a:effectRef>
-            <a:fontRef idx="minor">
-              <a:schemeClr val="lt1"/>
-            </a:fontRef>
-          </p:style>
-          <p:txBody>
-            <a:bodyPr rtlCol="0" anchor="ctr"/>
-            <a:lstStyle/>
-            <a:p>
-              <a:pPr algn="ctr"/>
-              <a:endParaRPr lang="en-GB"/>
-            </a:p>
-          </p:txBody>
-        </p:sp>
-        <p:sp>
-          <p:nvSpPr>
-            <p:cNvPr id="341" name="Rectangle 340"/>
-            <p:cNvSpPr/>
-            <p:nvPr/>
-          </p:nvSpPr>
-          <p:spPr>
-            <a:xfrm>
-              <a:off x="2788948" y="1591577"/>
-              <a:ext cx="183641" cy="45719"/>
-            </a:xfrm>
-            <a:prstGeom prst="rect">
-              <a:avLst/>
-            </a:prstGeom>
-            <a:grpFill/>
-            <a:ln>
-              <a:noFill/>
-            </a:ln>
-          </p:spPr>
-          <p:style>
-            <a:lnRef idx="2">
-              <a:schemeClr val="accent1">
-                <a:shade val="50000"/>
-              </a:schemeClr>
-            </a:lnRef>
-            <a:fillRef idx="1">
-              <a:schemeClr val="accent1"/>
-            </a:fillRef>
-            <a:effectRef idx="0">
-              <a:schemeClr val="accent1"/>
-            </a:effectRef>
-            <a:fontRef idx="minor">
-              <a:schemeClr val="lt1"/>
-            </a:fontRef>
-          </p:style>
-          <p:txBody>
-            <a:bodyPr rtlCol="0" anchor="ctr"/>
-            <a:lstStyle/>
-            <a:p>
-              <a:pPr algn="ctr"/>
-              <a:endParaRPr lang="en-GB"/>
-            </a:p>
-          </p:txBody>
-        </p:sp>
-      </p:grpSp>
-      <p:grpSp>
-        <p:nvGrpSpPr>
-          <p:cNvPr id="347" name="Group 346"/>
-          <p:cNvGrpSpPr/>
-          <p:nvPr/>
-        </p:nvGrpSpPr>
-        <p:grpSpPr>
-          <a:xfrm>
-            <a:off x="8200512" y="1739585"/>
-            <a:ext cx="125898" cy="272533"/>
-            <a:chOff x="2771800" y="1369443"/>
-            <a:chExt cx="216024" cy="382265"/>
-          </a:xfrm>
+            </a:endParaRPr>
+          </a:p>
+        </p:txBody>
+      </p:sp>
+      <p:sp>
+        <p:nvSpPr>
+          <p:cNvPr id="132" name="Can 131"/>
+          <p:cNvSpPr/>
+          <p:nvPr/>
+        </p:nvSpPr>
+        <p:spPr>
+          <a:xfrm>
+            <a:off x="2133946" y="3608341"/>
+            <a:ext cx="562822" cy="468052"/>
+          </a:xfrm>
+          <a:prstGeom prst="can">
+            <a:avLst/>
+          </a:prstGeom>
           <a:solidFill>
-            <a:schemeClr val="bg1">
-              <a:lumMod val="85000"/>
+            <a:srgbClr val="94C9E4"/>
+          </a:solidFill>
+          <a:ln>
+            <a:solidFill>
+              <a:srgbClr val="94C9E4"/>
+            </a:solidFill>
+          </a:ln>
+        </p:spPr>
+        <p:style>
+          <a:lnRef idx="2">
+            <a:schemeClr val="accent1">
+              <a:shade val="50000"/>
+            </a:schemeClr>
+          </a:lnRef>
+          <a:fillRef idx="1">
+            <a:schemeClr val="accent1"/>
+          </a:fillRef>
+          <a:effectRef idx="0">
+            <a:schemeClr val="accent1"/>
+          </a:effectRef>
+          <a:fontRef idx="minor">
+            <a:schemeClr val="lt1"/>
+          </a:fontRef>
+        </p:style>
+        <p:txBody>
+          <a:bodyPr rtlCol="0" anchor="ctr"/>
+          <a:lstStyle/>
+          <a:p>
+            <a:pPr algn="ctr"/>
+            <a:r>
+              <a:rPr lang="en-GB" dirty="0" smtClean="0">
+                <a:solidFill>
+                  <a:srgbClr val="002060"/>
+                </a:solidFill>
+              </a:rPr>
+              <a:t>CT</a:t>
+            </a:r>
+            <a:endParaRPr lang="en-GB" dirty="0">
+              <a:solidFill>
+                <a:srgbClr val="002060"/>
+              </a:solidFill>
+            </a:endParaRPr>
+          </a:p>
+        </p:txBody>
+      </p:sp>
+      <p:sp>
+        <p:nvSpPr>
+          <p:cNvPr id="133" name="Can 132"/>
+          <p:cNvSpPr/>
+          <p:nvPr/>
+        </p:nvSpPr>
+        <p:spPr>
+          <a:xfrm>
+            <a:off x="2133946" y="4168554"/>
+            <a:ext cx="562822" cy="468052"/>
+          </a:xfrm>
+          <a:prstGeom prst="can">
+            <a:avLst/>
+          </a:prstGeom>
+          <a:solidFill>
+            <a:srgbClr val="94C9E4"/>
+          </a:solidFill>
+          <a:ln>
+            <a:solidFill>
+              <a:srgbClr val="94C9E4"/>
+            </a:solidFill>
+          </a:ln>
+        </p:spPr>
+        <p:style>
+          <a:lnRef idx="2">
+            <a:schemeClr val="accent1">
+              <a:shade val="50000"/>
+            </a:schemeClr>
+          </a:lnRef>
+          <a:fillRef idx="1">
+            <a:schemeClr val="accent1"/>
+          </a:fillRef>
+          <a:effectRef idx="0">
+            <a:schemeClr val="accent1"/>
+          </a:effectRef>
+          <a:fontRef idx="minor">
+            <a:schemeClr val="lt1"/>
+          </a:fontRef>
+        </p:style>
+        <p:txBody>
+          <a:bodyPr rtlCol="0" anchor="ctr"/>
+          <a:lstStyle/>
+          <a:p>
+            <a:pPr algn="ctr"/>
+            <a:r>
+              <a:rPr lang="en-GB" dirty="0" smtClean="0">
+                <a:solidFill>
+                  <a:srgbClr val="002060"/>
+                </a:solidFill>
+              </a:rPr>
+              <a:t>CT</a:t>
+            </a:r>
+            <a:endParaRPr lang="en-GB" dirty="0">
+              <a:solidFill>
+                <a:srgbClr val="002060"/>
+              </a:solidFill>
+            </a:endParaRPr>
+          </a:p>
+        </p:txBody>
+      </p:sp>
+      <p:sp>
+        <p:nvSpPr>
+          <p:cNvPr id="134" name="Can 133"/>
+          <p:cNvSpPr/>
+          <p:nvPr/>
+        </p:nvSpPr>
+        <p:spPr>
+          <a:xfrm>
+            <a:off x="2133946" y="4728767"/>
+            <a:ext cx="562822" cy="468052"/>
+          </a:xfrm>
+          <a:prstGeom prst="can">
+            <a:avLst/>
+          </a:prstGeom>
+          <a:solidFill>
+            <a:srgbClr val="94C9E4"/>
+          </a:solidFill>
+          <a:ln>
+            <a:solidFill>
+              <a:srgbClr val="94C9E4"/>
+            </a:solidFill>
+          </a:ln>
+        </p:spPr>
+        <p:style>
+          <a:lnRef idx="2">
+            <a:schemeClr val="accent1">
+              <a:shade val="50000"/>
+            </a:schemeClr>
+          </a:lnRef>
+          <a:fillRef idx="1">
+            <a:schemeClr val="accent1"/>
+          </a:fillRef>
+          <a:effectRef idx="0">
+            <a:schemeClr val="accent1"/>
+          </a:effectRef>
+          <a:fontRef idx="minor">
+            <a:schemeClr val="lt1"/>
+          </a:fontRef>
+        </p:style>
+        <p:txBody>
+          <a:bodyPr rtlCol="0" anchor="ctr"/>
+          <a:lstStyle/>
+          <a:p>
+            <a:pPr algn="ctr"/>
+            <a:r>
+              <a:rPr lang="en-GB" dirty="0" smtClean="0">
+                <a:solidFill>
+                  <a:srgbClr val="002060"/>
+                </a:solidFill>
+              </a:rPr>
+              <a:t>CT</a:t>
+            </a:r>
+            <a:endParaRPr lang="en-GB" dirty="0">
+              <a:solidFill>
+                <a:srgbClr val="002060"/>
+              </a:solidFill>
+            </a:endParaRPr>
+          </a:p>
+        </p:txBody>
+      </p:sp>
+      <p:sp>
+        <p:nvSpPr>
+          <p:cNvPr id="135" name="Can 134"/>
+          <p:cNvSpPr/>
+          <p:nvPr/>
+        </p:nvSpPr>
+        <p:spPr>
+          <a:xfrm>
+            <a:off x="2133946" y="5288980"/>
+            <a:ext cx="562822" cy="468052"/>
+          </a:xfrm>
+          <a:prstGeom prst="can">
+            <a:avLst/>
+          </a:prstGeom>
+          <a:solidFill>
+            <a:srgbClr val="94C9E4"/>
+          </a:solidFill>
+          <a:ln>
+            <a:solidFill>
+              <a:srgbClr val="94C9E4"/>
+            </a:solidFill>
+          </a:ln>
+        </p:spPr>
+        <p:style>
+          <a:lnRef idx="2">
+            <a:schemeClr val="accent1">
+              <a:shade val="50000"/>
+            </a:schemeClr>
+          </a:lnRef>
+          <a:fillRef idx="1">
+            <a:schemeClr val="accent1"/>
+          </a:fillRef>
+          <a:effectRef idx="0">
+            <a:schemeClr val="accent1"/>
+          </a:effectRef>
+          <a:fontRef idx="minor">
+            <a:schemeClr val="lt1"/>
+          </a:fontRef>
+        </p:style>
+        <p:txBody>
+          <a:bodyPr rtlCol="0" anchor="ctr"/>
+          <a:lstStyle/>
+          <a:p>
+            <a:pPr algn="ctr"/>
+            <a:r>
+              <a:rPr lang="en-GB" dirty="0" smtClean="0">
+                <a:solidFill>
+                  <a:srgbClr val="002060"/>
+                </a:solidFill>
+              </a:rPr>
+              <a:t>CT</a:t>
+            </a:r>
+            <a:endParaRPr lang="en-GB" dirty="0">
+              <a:solidFill>
+                <a:srgbClr val="002060"/>
+              </a:solidFill>
+            </a:endParaRPr>
+          </a:p>
+        </p:txBody>
+      </p:sp>
+      <p:sp>
+        <p:nvSpPr>
+          <p:cNvPr id="136" name="Can 135"/>
+          <p:cNvSpPr/>
+          <p:nvPr/>
+        </p:nvSpPr>
+        <p:spPr>
+          <a:xfrm>
+            <a:off x="2133946" y="5849190"/>
+            <a:ext cx="562822" cy="468052"/>
+          </a:xfrm>
+          <a:prstGeom prst="can">
+            <a:avLst/>
+          </a:prstGeom>
+          <a:solidFill>
+            <a:srgbClr val="94C9E4"/>
+          </a:solidFill>
+          <a:ln>
+            <a:solidFill>
+              <a:srgbClr val="94C9E4"/>
+            </a:solidFill>
+          </a:ln>
+        </p:spPr>
+        <p:style>
+          <a:lnRef idx="2">
+            <a:schemeClr val="accent1">
+              <a:shade val="50000"/>
+            </a:schemeClr>
+          </a:lnRef>
+          <a:fillRef idx="1">
+            <a:schemeClr val="accent1"/>
+          </a:fillRef>
+          <a:effectRef idx="0">
+            <a:schemeClr val="accent1"/>
+          </a:effectRef>
+          <a:fontRef idx="minor">
+            <a:schemeClr val="lt1"/>
+          </a:fontRef>
+        </p:style>
+        <p:txBody>
+          <a:bodyPr rtlCol="0" anchor="ctr"/>
+          <a:lstStyle/>
+          <a:p>
+            <a:pPr algn="ctr"/>
+            <a:r>
+              <a:rPr lang="en-GB" dirty="0" smtClean="0">
+                <a:solidFill>
+                  <a:srgbClr val="002060"/>
+                </a:solidFill>
+              </a:rPr>
+              <a:t>CT</a:t>
+            </a:r>
+            <a:endParaRPr lang="en-GB" dirty="0">
+              <a:solidFill>
+                <a:srgbClr val="002060"/>
+              </a:solidFill>
+            </a:endParaRPr>
+          </a:p>
+        </p:txBody>
+      </p:sp>
+      <p:sp>
+        <p:nvSpPr>
+          <p:cNvPr id="137" name="Can 136"/>
+          <p:cNvSpPr/>
+          <p:nvPr/>
+        </p:nvSpPr>
+        <p:spPr>
+          <a:xfrm>
+            <a:off x="5047366" y="3877054"/>
+            <a:ext cx="562822" cy="468052"/>
+          </a:xfrm>
+          <a:prstGeom prst="can">
+            <a:avLst/>
+          </a:prstGeom>
+          <a:solidFill>
+            <a:schemeClr val="accent2">
+              <a:lumMod val="40000"/>
+              <a:lumOff val="60000"/>
             </a:schemeClr>
           </a:solidFill>
-        </p:grpSpPr>
-        <p:sp>
-          <p:nvSpPr>
-            <p:cNvPr id="348" name="Oval 347"/>
-            <p:cNvSpPr/>
-            <p:nvPr/>
-          </p:nvSpPr>
-          <p:spPr>
-            <a:xfrm>
-              <a:off x="2807804" y="1369443"/>
-              <a:ext cx="144016" cy="144016"/>
-            </a:xfrm>
-            <a:prstGeom prst="ellipse">
-              <a:avLst/>
-            </a:prstGeom>
-            <a:grpFill/>
-            <a:ln>
+          <a:ln>
+            <a:solidFill>
+              <a:schemeClr val="accent2">
+                <a:lumMod val="40000"/>
+                <a:lumOff val="60000"/>
+              </a:schemeClr>
+            </a:solidFill>
+          </a:ln>
+        </p:spPr>
+        <p:style>
+          <a:lnRef idx="2">
+            <a:schemeClr val="accent1">
+              <a:shade val="50000"/>
+            </a:schemeClr>
+          </a:lnRef>
+          <a:fillRef idx="1">
+            <a:schemeClr val="accent1"/>
+          </a:fillRef>
+          <a:effectRef idx="0">
+            <a:schemeClr val="accent1"/>
+          </a:effectRef>
+          <a:fontRef idx="minor">
+            <a:schemeClr val="lt1"/>
+          </a:fontRef>
+        </p:style>
+        <p:txBody>
+          <a:bodyPr rtlCol="0" anchor="ctr"/>
+          <a:lstStyle/>
+          <a:p>
+            <a:pPr algn="ctr"/>
+            <a:r>
+              <a:rPr lang="en-GB" dirty="0">
+                <a:solidFill>
+                  <a:srgbClr val="002060"/>
+                </a:solidFill>
+              </a:rPr>
+              <a:t>P</a:t>
+            </a:r>
+            <a:r>
+              <a:rPr lang="en-GB" dirty="0" smtClean="0">
+                <a:solidFill>
+                  <a:srgbClr val="002060"/>
+                </a:solidFill>
+              </a:rPr>
+              <a:t>T</a:t>
+            </a:r>
+            <a:endParaRPr lang="en-GB" dirty="0">
               <a:solidFill>
-                <a:srgbClr val="0070C0"/>
+                <a:srgbClr val="002060"/>
               </a:solidFill>
-            </a:ln>
-          </p:spPr>
-          <p:style>
-            <a:lnRef idx="2">
-              <a:schemeClr val="accent1">
-                <a:shade val="50000"/>
-              </a:schemeClr>
-            </a:lnRef>
-            <a:fillRef idx="1">
-              <a:schemeClr val="accent1"/>
-            </a:fillRef>
-            <a:effectRef idx="0">
-              <a:schemeClr val="accent1"/>
-            </a:effectRef>
-            <a:fontRef idx="minor">
-              <a:schemeClr val="lt1"/>
-            </a:fontRef>
-          </p:style>
-          <p:txBody>
-            <a:bodyPr rtlCol="0" anchor="ctr"/>
-            <a:lstStyle/>
-            <a:p>
-              <a:pPr algn="ctr"/>
-              <a:endParaRPr lang="en-GB"/>
-            </a:p>
-          </p:txBody>
-        </p:sp>
-        <p:sp>
-          <p:nvSpPr>
-            <p:cNvPr id="349" name="Oval 348"/>
-            <p:cNvSpPr/>
-            <p:nvPr/>
-          </p:nvSpPr>
-          <p:spPr>
-            <a:xfrm>
-              <a:off x="2771800" y="1535684"/>
-              <a:ext cx="216024" cy="144016"/>
-            </a:xfrm>
-            <a:prstGeom prst="ellipse">
-              <a:avLst/>
-            </a:prstGeom>
-            <a:grpFill/>
-            <a:ln>
+            </a:endParaRPr>
+          </a:p>
+        </p:txBody>
+      </p:sp>
+      <p:sp>
+        <p:nvSpPr>
+          <p:cNvPr id="138" name="Can 137"/>
+          <p:cNvSpPr/>
+          <p:nvPr/>
+        </p:nvSpPr>
+        <p:spPr>
+          <a:xfrm>
+            <a:off x="5765491" y="1881663"/>
+            <a:ext cx="243385" cy="224088"/>
+          </a:xfrm>
+          <a:prstGeom prst="can">
+            <a:avLst/>
+          </a:prstGeom>
+          <a:solidFill>
+            <a:srgbClr val="94C9E4"/>
+          </a:solidFill>
+          <a:ln>
+            <a:solidFill>
+              <a:srgbClr val="94C9E4"/>
+            </a:solidFill>
+          </a:ln>
+        </p:spPr>
+        <p:style>
+          <a:lnRef idx="2">
+            <a:schemeClr val="accent1">
+              <a:shade val="50000"/>
+            </a:schemeClr>
+          </a:lnRef>
+          <a:fillRef idx="1">
+            <a:schemeClr val="accent1"/>
+          </a:fillRef>
+          <a:effectRef idx="0">
+            <a:schemeClr val="accent1"/>
+          </a:effectRef>
+          <a:fontRef idx="minor">
+            <a:schemeClr val="lt1"/>
+          </a:fontRef>
+        </p:style>
+        <p:txBody>
+          <a:bodyPr lIns="0" tIns="0" rIns="0" bIns="0" rtlCol="0" anchor="ctr"/>
+          <a:lstStyle/>
+          <a:p>
+            <a:pPr algn="ctr"/>
+            <a:r>
+              <a:rPr lang="en-GB" sz="1200" dirty="0" smtClean="0">
+                <a:solidFill>
+                  <a:srgbClr val="002060"/>
+                </a:solidFill>
+              </a:rPr>
+              <a:t>CT</a:t>
+            </a:r>
+            <a:endParaRPr lang="en-GB" sz="1200" dirty="0">
               <a:solidFill>
-                <a:srgbClr val="0070C0"/>
+                <a:srgbClr val="002060"/>
               </a:solidFill>
-            </a:ln>
-          </p:spPr>
-          <p:style>
-            <a:lnRef idx="2">
-              <a:schemeClr val="accent1">
-                <a:shade val="50000"/>
-              </a:schemeClr>
-            </a:lnRef>
-            <a:fillRef idx="1">
-              <a:schemeClr val="accent1"/>
-            </a:fillRef>
-            <a:effectRef idx="0">
-              <a:schemeClr val="accent1"/>
-            </a:effectRef>
-            <a:fontRef idx="minor">
-              <a:schemeClr val="lt1"/>
-            </a:fontRef>
-          </p:style>
-          <p:txBody>
-            <a:bodyPr rtlCol="0" anchor="ctr"/>
-            <a:lstStyle/>
-            <a:p>
-              <a:pPr algn="ctr"/>
-              <a:endParaRPr lang="en-GB"/>
-            </a:p>
-          </p:txBody>
-        </p:sp>
-        <p:sp>
-          <p:nvSpPr>
-            <p:cNvPr id="350" name="Rectangle 349"/>
-            <p:cNvSpPr/>
-            <p:nvPr/>
-          </p:nvSpPr>
-          <p:spPr>
-            <a:xfrm>
-              <a:off x="2771800" y="1607692"/>
-              <a:ext cx="216024" cy="144016"/>
-            </a:xfrm>
-            <a:prstGeom prst="rect">
-              <a:avLst/>
-            </a:prstGeom>
-            <a:grpFill/>
-            <a:ln>
+            </a:endParaRPr>
+          </a:p>
+        </p:txBody>
+      </p:sp>
+      <p:sp>
+        <p:nvSpPr>
+          <p:cNvPr id="139" name="Can 138"/>
+          <p:cNvSpPr/>
+          <p:nvPr/>
+        </p:nvSpPr>
+        <p:spPr>
+          <a:xfrm>
+            <a:off x="5763442" y="2163016"/>
+            <a:ext cx="243385" cy="224088"/>
+          </a:xfrm>
+          <a:prstGeom prst="can">
+            <a:avLst/>
+          </a:prstGeom>
+          <a:solidFill>
+            <a:schemeClr val="accent2">
+              <a:lumMod val="40000"/>
+              <a:lumOff val="60000"/>
+            </a:schemeClr>
+          </a:solidFill>
+          <a:ln>
+            <a:solidFill>
+              <a:schemeClr val="accent2">
+                <a:lumMod val="40000"/>
+                <a:lumOff val="60000"/>
+              </a:schemeClr>
+            </a:solidFill>
+          </a:ln>
+        </p:spPr>
+        <p:style>
+          <a:lnRef idx="2">
+            <a:schemeClr val="accent1">
+              <a:shade val="50000"/>
+            </a:schemeClr>
+          </a:lnRef>
+          <a:fillRef idx="1">
+            <a:schemeClr val="accent1"/>
+          </a:fillRef>
+          <a:effectRef idx="0">
+            <a:schemeClr val="accent1"/>
+          </a:effectRef>
+          <a:fontRef idx="minor">
+            <a:schemeClr val="lt1"/>
+          </a:fontRef>
+        </p:style>
+        <p:txBody>
+          <a:bodyPr lIns="0" tIns="0" rIns="0" bIns="0" rtlCol="0" anchor="ctr"/>
+          <a:lstStyle/>
+          <a:p>
+            <a:pPr algn="ctr"/>
+            <a:r>
+              <a:rPr lang="en-GB" sz="1200" dirty="0">
+                <a:solidFill>
+                  <a:srgbClr val="002060"/>
+                </a:solidFill>
+              </a:rPr>
+              <a:t>P</a:t>
+            </a:r>
+            <a:r>
+              <a:rPr lang="en-GB" sz="1200" dirty="0" smtClean="0">
+                <a:solidFill>
+                  <a:srgbClr val="002060"/>
+                </a:solidFill>
+              </a:rPr>
+              <a:t>T</a:t>
+            </a:r>
+            <a:endParaRPr lang="en-GB" sz="1200" dirty="0">
               <a:solidFill>
-                <a:srgbClr val="0070C0"/>
+                <a:srgbClr val="002060"/>
               </a:solidFill>
-            </a:ln>
-          </p:spPr>
-          <p:style>
-            <a:lnRef idx="2">
-              <a:schemeClr val="accent1">
-                <a:shade val="50000"/>
-              </a:schemeClr>
-            </a:lnRef>
-            <a:fillRef idx="1">
-              <a:schemeClr val="accent1"/>
-            </a:fillRef>
-            <a:effectRef idx="0">
-              <a:schemeClr val="accent1"/>
-            </a:effectRef>
-            <a:fontRef idx="minor">
-              <a:schemeClr val="lt1"/>
-            </a:fontRef>
-          </p:style>
-          <p:txBody>
-            <a:bodyPr rtlCol="0" anchor="ctr"/>
-            <a:lstStyle/>
-            <a:p>
-              <a:pPr algn="ctr"/>
-              <a:endParaRPr lang="en-GB"/>
-            </a:p>
-          </p:txBody>
-        </p:sp>
-        <p:sp>
-          <p:nvSpPr>
-            <p:cNvPr id="351" name="Rectangle 350"/>
-            <p:cNvSpPr/>
-            <p:nvPr/>
-          </p:nvSpPr>
-          <p:spPr>
-            <a:xfrm>
-              <a:off x="2788948" y="1591577"/>
-              <a:ext cx="183641" cy="45719"/>
-            </a:xfrm>
-            <a:prstGeom prst="rect">
-              <a:avLst/>
-            </a:prstGeom>
-            <a:grpFill/>
-            <a:ln>
-              <a:noFill/>
-            </a:ln>
-          </p:spPr>
-          <p:style>
-            <a:lnRef idx="2">
-              <a:schemeClr val="accent1">
-                <a:shade val="50000"/>
-              </a:schemeClr>
-            </a:lnRef>
-            <a:fillRef idx="1">
-              <a:schemeClr val="accent1"/>
-            </a:fillRef>
-            <a:effectRef idx="0">
-              <a:schemeClr val="accent1"/>
-            </a:effectRef>
-            <a:fontRef idx="minor">
-              <a:schemeClr val="lt1"/>
-            </a:fontRef>
-          </p:style>
-          <p:txBody>
-            <a:bodyPr rtlCol="0" anchor="ctr"/>
-            <a:lstStyle/>
-            <a:p>
-              <a:pPr algn="ctr"/>
-              <a:endParaRPr lang="en-GB"/>
-            </a:p>
-          </p:txBody>
-        </p:sp>
-      </p:grpSp>
+            </a:endParaRPr>
+          </a:p>
+        </p:txBody>
+      </p:sp>
+      <p:sp>
+        <p:nvSpPr>
+          <p:cNvPr id="140" name="Rounded Rectangle 139"/>
+          <p:cNvSpPr/>
+          <p:nvPr/>
+        </p:nvSpPr>
+        <p:spPr>
+          <a:xfrm>
+            <a:off x="5604855" y="2492080"/>
+            <a:ext cx="410431" cy="144017"/>
+          </a:xfrm>
+          <a:prstGeom prst="roundRect">
+            <a:avLst/>
+          </a:prstGeom>
+          <a:solidFill>
+            <a:srgbClr val="BADDEE"/>
+          </a:solidFill>
+          <a:ln>
+            <a:solidFill>
+              <a:srgbClr val="BADDEE"/>
+            </a:solidFill>
+          </a:ln>
+          <a:effectLst>
+            <a:outerShdw blurRad="44450" dist="27940" dir="5400000" algn="ctr">
+              <a:srgbClr val="000000">
+                <a:alpha val="32000"/>
+              </a:srgbClr>
+            </a:outerShdw>
+          </a:effectLst>
+          <a:scene3d>
+            <a:camera prst="orthographicFront">
+              <a:rot lat="0" lon="0" rev="0"/>
+            </a:camera>
+            <a:lightRig rig="balanced" dir="t">
+              <a:rot lat="0" lon="0" rev="8700000"/>
+            </a:lightRig>
+          </a:scene3d>
+          <a:sp3d>
+            <a:bevelT w="190500" h="38100"/>
+          </a:sp3d>
+        </p:spPr>
+        <p:style>
+          <a:lnRef idx="2">
+            <a:schemeClr val="accent1">
+              <a:shade val="50000"/>
+            </a:schemeClr>
+          </a:lnRef>
+          <a:fillRef idx="1">
+            <a:schemeClr val="accent1"/>
+          </a:fillRef>
+          <a:effectRef idx="0">
+            <a:schemeClr val="accent1"/>
+          </a:effectRef>
+          <a:fontRef idx="minor">
+            <a:schemeClr val="lt1"/>
+          </a:fontRef>
+        </p:style>
+        <p:txBody>
+          <a:bodyPr lIns="0" tIns="0" rIns="0" bIns="0" rtlCol="0" anchor="ctr"/>
+          <a:lstStyle/>
+          <a:p>
+            <a:pPr algn="ctr"/>
+            <a:r>
+              <a:rPr lang="en-US" sz="1050" b="1" dirty="0" err="1" smtClean="0">
+                <a:solidFill>
+                  <a:srgbClr val="00335F"/>
+                </a:solidFill>
+              </a:rPr>
+              <a:t>aaa</a:t>
+            </a:r>
+            <a:endParaRPr lang="en-US" sz="1050" b="1" dirty="0" smtClean="0">
+              <a:solidFill>
+                <a:srgbClr val="00335F"/>
+              </a:solidFill>
+            </a:endParaRPr>
+          </a:p>
+        </p:txBody>
+      </p:sp>
     </p:spTree>
     <p:extLst>
       <p:ext uri="{BB962C8B-B14F-4D97-AF65-F5344CB8AC3E}">

</xml_diff>

<commit_message>
Updates to Specification Program governance based on Koray Atalag comments.
</commit_message>
<xml_diff>
--- a/files/openEHR_diagrams_sources.pptx
+++ b/files/openEHR_diagrams_sources.pptx
@@ -317,7 +317,7 @@
             <a:fld id="{C17C92CA-27BA-48D5-B9B9-4E9A3862C39B}" type="datetimeFigureOut">
               <a:rPr lang="en-US" smtClean="0"/>
               <a:pPr/>
-              <a:t>12/6/2014</a:t>
+              <a:t>12/12/2014</a:t>
             </a:fld>
             <a:endParaRPr lang="en-US"/>
           </a:p>
@@ -484,7 +484,7 @@
             <a:fld id="{C17C92CA-27BA-48D5-B9B9-4E9A3862C39B}" type="datetimeFigureOut">
               <a:rPr lang="en-US" smtClean="0"/>
               <a:pPr/>
-              <a:t>12/6/2014</a:t>
+              <a:t>12/12/2014</a:t>
             </a:fld>
             <a:endParaRPr lang="en-US"/>
           </a:p>
@@ -661,7 +661,7 @@
             <a:fld id="{C17C92CA-27BA-48D5-B9B9-4E9A3862C39B}" type="datetimeFigureOut">
               <a:rPr lang="en-US" smtClean="0"/>
               <a:pPr/>
-              <a:t>12/6/2014</a:t>
+              <a:t>12/12/2014</a:t>
             </a:fld>
             <a:endParaRPr lang="en-US"/>
           </a:p>
@@ -828,7 +828,7 @@
             <a:fld id="{C17C92CA-27BA-48D5-B9B9-4E9A3862C39B}" type="datetimeFigureOut">
               <a:rPr lang="en-US" smtClean="0"/>
               <a:pPr/>
-              <a:t>12/6/2014</a:t>
+              <a:t>12/12/2014</a:t>
             </a:fld>
             <a:endParaRPr lang="en-US"/>
           </a:p>
@@ -1071,7 +1071,7 @@
             <a:fld id="{C17C92CA-27BA-48D5-B9B9-4E9A3862C39B}" type="datetimeFigureOut">
               <a:rPr lang="en-US" smtClean="0"/>
               <a:pPr/>
-              <a:t>12/6/2014</a:t>
+              <a:t>12/12/2014</a:t>
             </a:fld>
             <a:endParaRPr lang="en-US"/>
           </a:p>
@@ -1356,7 +1356,7 @@
             <a:fld id="{C17C92CA-27BA-48D5-B9B9-4E9A3862C39B}" type="datetimeFigureOut">
               <a:rPr lang="en-US" smtClean="0"/>
               <a:pPr/>
-              <a:t>12/6/2014</a:t>
+              <a:t>12/12/2014</a:t>
             </a:fld>
             <a:endParaRPr lang="en-US"/>
           </a:p>
@@ -1775,7 +1775,7 @@
             <a:fld id="{C17C92CA-27BA-48D5-B9B9-4E9A3862C39B}" type="datetimeFigureOut">
               <a:rPr lang="en-US" smtClean="0"/>
               <a:pPr/>
-              <a:t>12/6/2014</a:t>
+              <a:t>12/12/2014</a:t>
             </a:fld>
             <a:endParaRPr lang="en-US"/>
           </a:p>
@@ -1890,7 +1890,7 @@
             <a:fld id="{C17C92CA-27BA-48D5-B9B9-4E9A3862C39B}" type="datetimeFigureOut">
               <a:rPr lang="en-US" smtClean="0"/>
               <a:pPr/>
-              <a:t>12/6/2014</a:t>
+              <a:t>12/12/2014</a:t>
             </a:fld>
             <a:endParaRPr lang="en-US"/>
           </a:p>
@@ -1982,7 +1982,7 @@
             <a:fld id="{C17C92CA-27BA-48D5-B9B9-4E9A3862C39B}" type="datetimeFigureOut">
               <a:rPr lang="en-US" smtClean="0"/>
               <a:pPr/>
-              <a:t>12/6/2014</a:t>
+              <a:t>12/12/2014</a:t>
             </a:fld>
             <a:endParaRPr lang="en-US"/>
           </a:p>
@@ -2256,7 +2256,7 @@
             <a:fld id="{C17C92CA-27BA-48D5-B9B9-4E9A3862C39B}" type="datetimeFigureOut">
               <a:rPr lang="en-US" smtClean="0"/>
               <a:pPr/>
-              <a:t>12/6/2014</a:t>
+              <a:t>12/12/2014</a:t>
             </a:fld>
             <a:endParaRPr lang="en-US"/>
           </a:p>
@@ -2506,7 +2506,7 @@
             <a:fld id="{C17C92CA-27BA-48D5-B9B9-4E9A3862C39B}" type="datetimeFigureOut">
               <a:rPr lang="en-US" smtClean="0"/>
               <a:pPr/>
-              <a:t>12/6/2014</a:t>
+              <a:t>12/12/2014</a:t>
             </a:fld>
             <a:endParaRPr lang="en-US"/>
           </a:p>
@@ -2716,7 +2716,7 @@
             <a:fld id="{C17C92CA-27BA-48D5-B9B9-4E9A3862C39B}" type="datetimeFigureOut">
               <a:rPr lang="en-US" smtClean="0"/>
               <a:pPr/>
-              <a:t>12/6/2014</a:t>
+              <a:t>12/12/2014</a:t>
             </a:fld>
             <a:endParaRPr lang="en-US"/>
           </a:p>
@@ -26675,8 +26675,8 @@
         </p:nvSpPr>
         <p:spPr>
           <a:xfrm>
-            <a:off x="2123729" y="908597"/>
-            <a:ext cx="2735106" cy="876762"/>
+            <a:off x="417052" y="1182076"/>
+            <a:ext cx="1985008" cy="4590083"/>
           </a:xfrm>
           <a:prstGeom prst="roundRect">
             <a:avLst/>
@@ -26723,7 +26723,7 @@
           </a:fontRef>
         </p:style>
         <p:txBody>
-          <a:bodyPr rtlCol="0" anchor="ctr"/>
+          <a:bodyPr rtlCol="0" anchor="t" anchorCtr="0"/>
           <a:lstStyle/>
           <a:p>
             <a:pPr algn="ctr"/>
@@ -26744,7 +26744,38 @@
                   <a:srgbClr val="00335F"/>
                 </a:solidFill>
               </a:rPr>
-              <a:t>Committee (SEC)</a:t>
+              <a:t>Committee </a:t>
+            </a:r>
+            <a:r>
+              <a:rPr lang="en-US" b="1" dirty="0" smtClean="0">
+                <a:solidFill>
+                  <a:srgbClr val="00335F"/>
+                </a:solidFill>
+              </a:rPr>
+              <a:t/>
+            </a:r>
+            <a:br>
+              <a:rPr lang="en-US" b="1" dirty="0" smtClean="0">
+                <a:solidFill>
+                  <a:srgbClr val="00335F"/>
+                </a:solidFill>
+              </a:rPr>
+            </a:br>
+            <a:r>
+              <a:rPr lang="en-US" b="1" dirty="0" smtClean="0">
+                <a:solidFill>
+                  <a:srgbClr val="00335F"/>
+                </a:solidFill>
+              </a:rPr>
+              <a:t>(</a:t>
+            </a:r>
+            <a:r>
+              <a:rPr lang="en-US" b="1" dirty="0" smtClean="0">
+                <a:solidFill>
+                  <a:srgbClr val="00335F"/>
+                </a:solidFill>
+              </a:rPr>
+              <a:t>SEC)</a:t>
             </a:r>
           </a:p>
         </p:txBody>
@@ -26757,7 +26788,7 @@
         </p:nvSpPr>
         <p:spPr>
           <a:xfrm>
-            <a:off x="2843808" y="5857294"/>
+            <a:off x="3200182" y="5214282"/>
             <a:ext cx="2016224" cy="468052"/>
           </a:xfrm>
           <a:prstGeom prst="roundRect">
@@ -26847,7 +26878,11 @@
             <a:pPr algn="ctr"/>
             <a:r>
               <a:rPr lang="en-US" sz="2400" dirty="0" smtClean="0"/>
-              <a:t>Specification Program</a:t>
+              <a:t>Specification </a:t>
+            </a:r>
+            <a:r>
+              <a:rPr lang="en-US" sz="2400" dirty="0" smtClean="0"/>
+              <a:t>Program</a:t>
             </a:r>
             <a:endParaRPr lang="en-US" sz="2400" dirty="0"/>
           </a:p>
@@ -26861,7 +26896,7 @@
         </p:nvSpPr>
         <p:spPr>
           <a:xfrm>
-            <a:off x="5950261" y="987750"/>
+            <a:off x="6325462" y="4909698"/>
             <a:ext cx="2507882" cy="1762021"/>
           </a:xfrm>
           <a:prstGeom prst="rect">
@@ -26904,11 +26939,7 @@
             </a:pPr>
             <a:r>
               <a:rPr lang="en-US" sz="1600" dirty="0" smtClean="0"/>
-              <a:t>= Other </a:t>
-            </a:r>
-            <a:r>
-              <a:rPr lang="en-US" sz="1600" dirty="0" smtClean="0"/>
-              <a:t>member</a:t>
+              <a:t>= Other member</a:t>
             </a:r>
           </a:p>
           <a:p>
@@ -26943,7 +26974,6 @@
               <a:rPr lang="en-US" sz="1600" dirty="0" smtClean="0"/>
               <a:t>= Specifications Component</a:t>
             </a:r>
-            <a:endParaRPr lang="en-US" sz="1600" dirty="0" smtClean="0"/>
           </a:p>
         </p:txBody>
       </p:sp>
@@ -26955,7 +26985,7 @@
         </p:nvSpPr>
         <p:spPr>
           <a:xfrm>
-            <a:off x="2843808" y="5299232"/>
+            <a:off x="3200182" y="4656220"/>
             <a:ext cx="2016224" cy="468052"/>
           </a:xfrm>
           <a:prstGeom prst="roundRect">
@@ -27028,7 +27058,7 @@
         </p:nvSpPr>
         <p:spPr>
           <a:xfrm>
-            <a:off x="2843808" y="4738139"/>
+            <a:off x="3200182" y="4095127"/>
             <a:ext cx="2016224" cy="468052"/>
           </a:xfrm>
           <a:prstGeom prst="roundRect">
@@ -27101,7 +27131,7 @@
         </p:nvSpPr>
         <p:spPr>
           <a:xfrm>
-            <a:off x="2843808" y="3605554"/>
+            <a:off x="3200182" y="2962542"/>
             <a:ext cx="2016224" cy="468052"/>
           </a:xfrm>
           <a:prstGeom prst="roundRect">
@@ -27174,7 +27204,7 @@
         </p:nvSpPr>
         <p:spPr>
           <a:xfrm>
-            <a:off x="2843808" y="3047492"/>
+            <a:off x="3200182" y="2404480"/>
             <a:ext cx="2016224" cy="468052"/>
           </a:xfrm>
           <a:prstGeom prst="roundRect">
@@ -27247,7 +27277,7 @@
         </p:nvSpPr>
         <p:spPr>
           <a:xfrm>
-            <a:off x="2843808" y="4180078"/>
+            <a:off x="3200182" y="3537066"/>
             <a:ext cx="2016224" cy="468052"/>
           </a:xfrm>
           <a:prstGeom prst="roundRect">
@@ -27320,7 +27350,7 @@
         </p:nvSpPr>
         <p:spPr>
           <a:xfrm>
-            <a:off x="2843808" y="1928338"/>
+            <a:off x="3200182" y="1285326"/>
             <a:ext cx="2016224" cy="468052"/>
           </a:xfrm>
           <a:prstGeom prst="roundRect">
@@ -27393,7 +27423,7 @@
         </p:nvSpPr>
         <p:spPr>
           <a:xfrm>
-            <a:off x="2843808" y="2487915"/>
+            <a:off x="3200182" y="1844903"/>
             <a:ext cx="2016224" cy="468052"/>
           </a:xfrm>
           <a:prstGeom prst="roundRect">
@@ -27466,13 +27496,13 @@
         </p:nvGrpSpPr>
         <p:grpSpPr>
           <a:xfrm>
-            <a:off x="1751714" y="921127"/>
+            <a:off x="771409" y="3579140"/>
             <a:ext cx="216024" cy="382265"/>
             <a:chOff x="2771800" y="1369443"/>
             <a:chExt cx="216024" cy="382265"/>
           </a:xfrm>
           <a:solidFill>
-            <a:srgbClr val="EDC87A"/>
+            <a:srgbClr val="FFFF00"/>
           </a:solidFill>
         </p:grpSpPr>
         <p:sp>
@@ -27666,13 +27696,13 @@
         </p:nvGrpSpPr>
         <p:grpSpPr>
           <a:xfrm>
-            <a:off x="1748019" y="1393402"/>
+            <a:off x="783797" y="3037763"/>
             <a:ext cx="216024" cy="382265"/>
             <a:chOff x="2771800" y="1369443"/>
             <a:chExt cx="216024" cy="382265"/>
           </a:xfrm>
           <a:solidFill>
-            <a:srgbClr val="EDC87A"/>
+            <a:srgbClr val="FFFF00"/>
           </a:solidFill>
         </p:grpSpPr>
         <p:sp>
@@ -27866,13 +27896,13 @@
         </p:nvGrpSpPr>
         <p:grpSpPr>
           <a:xfrm>
-            <a:off x="1765071" y="4230885"/>
+            <a:off x="2121445" y="3587873"/>
             <a:ext cx="216024" cy="382265"/>
             <a:chOff x="2771800" y="1369443"/>
             <a:chExt cx="216024" cy="382265"/>
           </a:xfrm>
           <a:solidFill>
-            <a:srgbClr val="94C9E4"/>
+            <a:srgbClr val="00B0F0"/>
           </a:solidFill>
         </p:grpSpPr>
         <p:sp>
@@ -28066,13 +28096,13 @@
         </p:nvGrpSpPr>
         <p:grpSpPr>
           <a:xfrm>
-            <a:off x="1765071" y="4746053"/>
+            <a:off x="2121445" y="4103041"/>
             <a:ext cx="216024" cy="382265"/>
             <a:chOff x="2771800" y="1369443"/>
             <a:chExt cx="216024" cy="382265"/>
           </a:xfrm>
           <a:solidFill>
-            <a:srgbClr val="94C9E4"/>
+            <a:srgbClr val="00B0F0"/>
           </a:solidFill>
         </p:grpSpPr>
         <p:sp>
@@ -28266,13 +28296,13 @@
         </p:nvGrpSpPr>
         <p:grpSpPr>
           <a:xfrm>
-            <a:off x="1765071" y="5335044"/>
+            <a:off x="2121445" y="4692032"/>
             <a:ext cx="216024" cy="382265"/>
             <a:chOff x="2771800" y="1369443"/>
             <a:chExt cx="216024" cy="382265"/>
           </a:xfrm>
           <a:solidFill>
-            <a:srgbClr val="94C9E4"/>
+            <a:srgbClr val="00B0F0"/>
           </a:solidFill>
         </p:grpSpPr>
         <p:sp>
@@ -28466,13 +28496,13 @@
         </p:nvGrpSpPr>
         <p:grpSpPr>
           <a:xfrm>
-            <a:off x="1765071" y="5850212"/>
+            <a:off x="2121445" y="5207200"/>
             <a:ext cx="216024" cy="382265"/>
             <a:chOff x="2771800" y="1369443"/>
             <a:chExt cx="216024" cy="382265"/>
           </a:xfrm>
           <a:solidFill>
-            <a:srgbClr val="94C9E4"/>
+            <a:srgbClr val="00B0F0"/>
           </a:solidFill>
         </p:grpSpPr>
         <p:sp>
@@ -28666,13 +28696,13 @@
         </p:nvGrpSpPr>
         <p:grpSpPr>
           <a:xfrm>
-            <a:off x="1771308" y="2002157"/>
+            <a:off x="2127682" y="1359145"/>
             <a:ext cx="216024" cy="382265"/>
             <a:chOff x="2771800" y="1369443"/>
             <a:chExt cx="216024" cy="382265"/>
           </a:xfrm>
           <a:solidFill>
-            <a:srgbClr val="94C9E4"/>
+            <a:srgbClr val="00B0F0"/>
           </a:solidFill>
         </p:grpSpPr>
         <p:sp>
@@ -28866,13 +28896,13 @@
         </p:nvGrpSpPr>
         <p:grpSpPr>
           <a:xfrm>
-            <a:off x="1771308" y="2517325"/>
+            <a:off x="2127682" y="1874313"/>
             <a:ext cx="216024" cy="382265"/>
             <a:chOff x="2771800" y="1369443"/>
             <a:chExt cx="216024" cy="382265"/>
           </a:xfrm>
           <a:solidFill>
-            <a:srgbClr val="94C9E4"/>
+            <a:srgbClr val="00B0F0"/>
           </a:solidFill>
         </p:grpSpPr>
         <p:sp>
@@ -29066,13 +29096,13 @@
         </p:nvGrpSpPr>
         <p:grpSpPr>
           <a:xfrm>
-            <a:off x="1771308" y="3106316"/>
+            <a:off x="2127682" y="2463304"/>
             <a:ext cx="216024" cy="382265"/>
             <a:chOff x="2771800" y="1369443"/>
             <a:chExt cx="216024" cy="382265"/>
           </a:xfrm>
           <a:solidFill>
-            <a:srgbClr val="94C9E4"/>
+            <a:srgbClr val="00B0F0"/>
           </a:solidFill>
         </p:grpSpPr>
         <p:sp>
@@ -29266,13 +29296,13 @@
         </p:nvGrpSpPr>
         <p:grpSpPr>
           <a:xfrm>
-            <a:off x="1771308" y="3621484"/>
+            <a:off x="2127682" y="2978472"/>
             <a:ext cx="216024" cy="382265"/>
             <a:chOff x="2771800" y="1369443"/>
             <a:chExt cx="216024" cy="382265"/>
           </a:xfrm>
           <a:solidFill>
-            <a:srgbClr val="94C9E4"/>
+            <a:srgbClr val="00B0F0"/>
           </a:solidFill>
         </p:grpSpPr>
         <p:sp>
@@ -29466,15 +29496,13 @@
         </p:nvGrpSpPr>
         <p:grpSpPr>
           <a:xfrm>
-            <a:off x="1460400" y="924859"/>
+            <a:off x="1554157" y="3351213"/>
             <a:ext cx="216024" cy="382265"/>
             <a:chOff x="2771800" y="1369443"/>
             <a:chExt cx="216024" cy="382265"/>
           </a:xfrm>
           <a:solidFill>
-            <a:schemeClr val="bg1">
-              <a:lumMod val="85000"/>
-            </a:schemeClr>
+            <a:srgbClr val="94C9E4"/>
           </a:solidFill>
         </p:grpSpPr>
         <p:sp>
@@ -29668,15 +29696,13 @@
         </p:nvGrpSpPr>
         <p:grpSpPr>
           <a:xfrm>
-            <a:off x="1456705" y="1397134"/>
+            <a:off x="1550462" y="3823488"/>
             <a:ext cx="216024" cy="382265"/>
             <a:chOff x="2771800" y="1369443"/>
             <a:chExt cx="216024" cy="382265"/>
           </a:xfrm>
           <a:solidFill>
-            <a:schemeClr val="bg1">
-              <a:lumMod val="85000"/>
-            </a:schemeClr>
+            <a:srgbClr val="94C9E4"/>
           </a:solidFill>
         </p:grpSpPr>
         <p:sp>
@@ -29870,15 +29896,13 @@
         </p:nvGrpSpPr>
         <p:grpSpPr>
           <a:xfrm>
-            <a:off x="1185821" y="929760"/>
+            <a:off x="1279578" y="3356114"/>
             <a:ext cx="216024" cy="382265"/>
             <a:chOff x="2771800" y="1369443"/>
             <a:chExt cx="216024" cy="382265"/>
           </a:xfrm>
           <a:solidFill>
-            <a:schemeClr val="bg1">
-              <a:lumMod val="85000"/>
-            </a:schemeClr>
+            <a:srgbClr val="94C9E4"/>
           </a:solidFill>
         </p:grpSpPr>
         <p:sp>
@@ -30072,15 +30096,13 @@
         </p:nvGrpSpPr>
         <p:grpSpPr>
           <a:xfrm>
-            <a:off x="1182126" y="1402035"/>
+            <a:off x="1275883" y="3828389"/>
             <a:ext cx="216024" cy="382265"/>
             <a:chOff x="2771800" y="1369443"/>
             <a:chExt cx="216024" cy="382265"/>
           </a:xfrm>
           <a:solidFill>
-            <a:schemeClr val="bg1">
-              <a:lumMod val="85000"/>
-            </a:schemeClr>
+            <a:srgbClr val="94C9E4"/>
           </a:solidFill>
         </p:grpSpPr>
         <p:sp>
@@ -30274,15 +30296,13 @@
         </p:nvGrpSpPr>
         <p:grpSpPr>
           <a:xfrm>
-            <a:off x="900903" y="921127"/>
+            <a:off x="1583341" y="4414887"/>
             <a:ext cx="216024" cy="382265"/>
             <a:chOff x="2771800" y="1369443"/>
             <a:chExt cx="216024" cy="382265"/>
           </a:xfrm>
           <a:solidFill>
-            <a:schemeClr val="bg1">
-              <a:lumMod val="85000"/>
-            </a:schemeClr>
+            <a:srgbClr val="94C9E4"/>
           </a:solidFill>
         </p:grpSpPr>
         <p:sp>
@@ -30476,15 +30496,13 @@
         </p:nvGrpSpPr>
         <p:grpSpPr>
           <a:xfrm>
-            <a:off x="897208" y="1393402"/>
+            <a:off x="1287995" y="4404277"/>
             <a:ext cx="216024" cy="382265"/>
             <a:chOff x="2771800" y="1369443"/>
             <a:chExt cx="216024" cy="382265"/>
           </a:xfrm>
           <a:solidFill>
-            <a:schemeClr val="bg1">
-              <a:lumMod val="85000"/>
-            </a:schemeClr>
+            <a:srgbClr val="94C9E4"/>
           </a:solidFill>
         </p:grpSpPr>
         <p:sp>
@@ -30672,27 +30690,24 @@
       </p:grpSp>
       <p:grpSp>
         <p:nvGrpSpPr>
-          <p:cNvPr id="322" name="Group 321"/>
+          <p:cNvPr id="332" name="Group 331"/>
           <p:cNvGrpSpPr/>
           <p:nvPr/>
         </p:nvGrpSpPr>
         <p:grpSpPr>
           <a:xfrm>
-            <a:off x="615255" y="924997"/>
-            <a:ext cx="216024" cy="382265"/>
+            <a:off x="6185671" y="4934913"/>
+            <a:ext cx="138283" cy="244699"/>
             <a:chOff x="2771800" y="1369443"/>
             <a:chExt cx="216024" cy="382265"/>
           </a:xfrm>
           <a:solidFill>
-            <a:schemeClr val="accent3">
-              <a:lumMod val="40000"/>
-              <a:lumOff val="60000"/>
-            </a:schemeClr>
+            <a:srgbClr val="FFFF00"/>
           </a:solidFill>
         </p:grpSpPr>
         <p:sp>
           <p:nvSpPr>
-            <p:cNvPr id="323" name="Oval 322"/>
+            <p:cNvPr id="333" name="Oval 332"/>
             <p:cNvSpPr/>
             <p:nvPr/>
           </p:nvSpPr>
@@ -30738,7 +30753,7 @@
         </p:sp>
         <p:sp>
           <p:nvSpPr>
-            <p:cNvPr id="324" name="Oval 323"/>
+            <p:cNvPr id="334" name="Oval 333"/>
             <p:cNvSpPr/>
             <p:nvPr/>
           </p:nvSpPr>
@@ -30784,7 +30799,7 @@
         </p:sp>
         <p:sp>
           <p:nvSpPr>
-            <p:cNvPr id="325" name="Rectangle 324"/>
+            <p:cNvPr id="335" name="Rectangle 334"/>
             <p:cNvSpPr/>
             <p:nvPr/>
           </p:nvSpPr>
@@ -30830,7 +30845,7 @@
         </p:sp>
         <p:sp>
           <p:nvSpPr>
-            <p:cNvPr id="326" name="Rectangle 325"/>
+            <p:cNvPr id="336" name="Rectangle 335"/>
             <p:cNvSpPr/>
             <p:nvPr/>
           </p:nvSpPr>
@@ -30875,27 +30890,24 @@
       </p:grpSp>
       <p:grpSp>
         <p:nvGrpSpPr>
-          <p:cNvPr id="327" name="Group 326"/>
+          <p:cNvPr id="337" name="Group 336"/>
           <p:cNvGrpSpPr/>
           <p:nvPr/>
         </p:nvGrpSpPr>
         <p:grpSpPr>
           <a:xfrm>
-            <a:off x="611560" y="1397272"/>
-            <a:ext cx="216024" cy="382265"/>
+            <a:off x="6191863" y="5218525"/>
+            <a:ext cx="125898" cy="272533"/>
             <a:chOff x="2771800" y="1369443"/>
             <a:chExt cx="216024" cy="382265"/>
           </a:xfrm>
           <a:solidFill>
-            <a:schemeClr val="accent3">
-              <a:lumMod val="40000"/>
-              <a:lumOff val="60000"/>
-            </a:schemeClr>
+            <a:srgbClr val="00B0F0"/>
           </a:solidFill>
         </p:grpSpPr>
         <p:sp>
           <p:nvSpPr>
-            <p:cNvPr id="328" name="Oval 327"/>
+            <p:cNvPr id="338" name="Oval 337"/>
             <p:cNvSpPr/>
             <p:nvPr/>
           </p:nvSpPr>
@@ -30941,7 +30953,7 @@
         </p:sp>
         <p:sp>
           <p:nvSpPr>
-            <p:cNvPr id="329" name="Oval 328"/>
+            <p:cNvPr id="339" name="Oval 338"/>
             <p:cNvSpPr/>
             <p:nvPr/>
           </p:nvSpPr>
@@ -30987,7 +30999,7 @@
         </p:sp>
         <p:sp>
           <p:nvSpPr>
-            <p:cNvPr id="330" name="Rectangle 329"/>
+            <p:cNvPr id="340" name="Rectangle 339"/>
             <p:cNvSpPr/>
             <p:nvPr/>
           </p:nvSpPr>
@@ -31033,7 +31045,7 @@
         </p:sp>
         <p:sp>
           <p:nvSpPr>
-            <p:cNvPr id="331" name="Rectangle 330"/>
+            <p:cNvPr id="341" name="Rectangle 340"/>
             <p:cNvSpPr/>
             <p:nvPr/>
           </p:nvSpPr>
@@ -31078,620 +31090,203 @@
       </p:grpSp>
       <p:grpSp>
         <p:nvGrpSpPr>
-          <p:cNvPr id="24" name="Group 23"/>
+          <p:cNvPr id="127" name="Group 126"/>
           <p:cNvGrpSpPr/>
           <p:nvPr/>
         </p:nvGrpSpPr>
         <p:grpSpPr>
           <a:xfrm>
-            <a:off x="5810470" y="1012965"/>
-            <a:ext cx="138283" cy="827504"/>
-            <a:chOff x="7294414" y="1077704"/>
-            <a:chExt cx="138283" cy="827504"/>
-          </a:xfrm>
+            <a:off x="6185671" y="5517718"/>
+            <a:ext cx="138283" cy="244699"/>
+            <a:chOff x="2771800" y="1369443"/>
+            <a:chExt cx="216024" cy="382265"/>
+          </a:xfrm>
+          <a:solidFill>
+            <a:srgbClr val="94C9E4"/>
+          </a:solidFill>
         </p:grpSpPr>
-        <p:grpSp>
-          <p:nvGrpSpPr>
-            <p:cNvPr id="332" name="Group 331"/>
-            <p:cNvGrpSpPr/>
+        <p:sp>
+          <p:nvSpPr>
+            <p:cNvPr id="128" name="Oval 127"/>
+            <p:cNvSpPr/>
             <p:nvPr/>
-          </p:nvGrpSpPr>
-          <p:grpSpPr>
+          </p:nvSpPr>
+          <p:spPr>
             <a:xfrm>
-              <a:off x="7294414" y="1077704"/>
-              <a:ext cx="138283" cy="244699"/>
-              <a:chOff x="2771800" y="1369443"/>
-              <a:chExt cx="216024" cy="382265"/>
+              <a:off x="2807804" y="1369443"/>
+              <a:ext cx="144016" cy="144016"/>
             </a:xfrm>
-            <a:solidFill>
-              <a:srgbClr val="EDC87A"/>
-            </a:solidFill>
-          </p:grpSpPr>
-          <p:sp>
-            <p:nvSpPr>
-              <p:cNvPr id="333" name="Oval 332"/>
-              <p:cNvSpPr/>
-              <p:nvPr/>
-            </p:nvSpPr>
-            <p:spPr>
-              <a:xfrm>
-                <a:off x="2807804" y="1369443"/>
-                <a:ext cx="144016" cy="144016"/>
-              </a:xfrm>
-              <a:prstGeom prst="ellipse">
-                <a:avLst/>
-              </a:prstGeom>
-              <a:grpFill/>
-              <a:ln>
-                <a:solidFill>
-                  <a:srgbClr val="0070C0"/>
-                </a:solidFill>
-              </a:ln>
-            </p:spPr>
-            <p:style>
-              <a:lnRef idx="2">
-                <a:schemeClr val="accent1">
-                  <a:shade val="50000"/>
-                </a:schemeClr>
-              </a:lnRef>
-              <a:fillRef idx="1">
-                <a:schemeClr val="accent1"/>
-              </a:fillRef>
-              <a:effectRef idx="0">
-                <a:schemeClr val="accent1"/>
-              </a:effectRef>
-              <a:fontRef idx="minor">
-                <a:schemeClr val="lt1"/>
-              </a:fontRef>
-            </p:style>
-            <p:txBody>
-              <a:bodyPr rtlCol="0" anchor="ctr"/>
-              <a:lstStyle/>
-              <a:p>
-                <a:pPr algn="ctr"/>
-                <a:endParaRPr lang="en-GB"/>
-              </a:p>
-            </p:txBody>
-          </p:sp>
-          <p:sp>
-            <p:nvSpPr>
-              <p:cNvPr id="334" name="Oval 333"/>
-              <p:cNvSpPr/>
-              <p:nvPr/>
-            </p:nvSpPr>
-            <p:spPr>
-              <a:xfrm>
-                <a:off x="2771800" y="1535684"/>
-                <a:ext cx="216024" cy="144016"/>
-              </a:xfrm>
-              <a:prstGeom prst="ellipse">
-                <a:avLst/>
-              </a:prstGeom>
-              <a:grpFill/>
-              <a:ln>
-                <a:solidFill>
-                  <a:srgbClr val="0070C0"/>
-                </a:solidFill>
-              </a:ln>
-            </p:spPr>
-            <p:style>
-              <a:lnRef idx="2">
-                <a:schemeClr val="accent1">
-                  <a:shade val="50000"/>
-                </a:schemeClr>
-              </a:lnRef>
-              <a:fillRef idx="1">
-                <a:schemeClr val="accent1"/>
-              </a:fillRef>
-              <a:effectRef idx="0">
-                <a:schemeClr val="accent1"/>
-              </a:effectRef>
-              <a:fontRef idx="minor">
-                <a:schemeClr val="lt1"/>
-              </a:fontRef>
-            </p:style>
-            <p:txBody>
-              <a:bodyPr rtlCol="0" anchor="ctr"/>
-              <a:lstStyle/>
-              <a:p>
-                <a:pPr algn="ctr"/>
-                <a:endParaRPr lang="en-GB"/>
-              </a:p>
-            </p:txBody>
-          </p:sp>
-          <p:sp>
-            <p:nvSpPr>
-              <p:cNvPr id="335" name="Rectangle 334"/>
-              <p:cNvSpPr/>
-              <p:nvPr/>
-            </p:nvSpPr>
-            <p:spPr>
-              <a:xfrm>
-                <a:off x="2771800" y="1607692"/>
-                <a:ext cx="216024" cy="144016"/>
-              </a:xfrm>
-              <a:prstGeom prst="rect">
-                <a:avLst/>
-              </a:prstGeom>
-              <a:grpFill/>
-              <a:ln>
-                <a:solidFill>
-                  <a:srgbClr val="0070C0"/>
-                </a:solidFill>
-              </a:ln>
-            </p:spPr>
-            <p:style>
-              <a:lnRef idx="2">
-                <a:schemeClr val="accent1">
-                  <a:shade val="50000"/>
-                </a:schemeClr>
-              </a:lnRef>
-              <a:fillRef idx="1">
-                <a:schemeClr val="accent1"/>
-              </a:fillRef>
-              <a:effectRef idx="0">
-                <a:schemeClr val="accent1"/>
-              </a:effectRef>
-              <a:fontRef idx="minor">
-                <a:schemeClr val="lt1"/>
-              </a:fontRef>
-            </p:style>
-            <p:txBody>
-              <a:bodyPr rtlCol="0" anchor="ctr"/>
-              <a:lstStyle/>
-              <a:p>
-                <a:pPr algn="ctr"/>
-                <a:endParaRPr lang="en-GB"/>
-              </a:p>
-            </p:txBody>
-          </p:sp>
-          <p:sp>
-            <p:nvSpPr>
-              <p:cNvPr id="336" name="Rectangle 335"/>
-              <p:cNvSpPr/>
-              <p:nvPr/>
-            </p:nvSpPr>
-            <p:spPr>
-              <a:xfrm>
-                <a:off x="2788948" y="1591577"/>
-                <a:ext cx="183641" cy="45719"/>
-              </a:xfrm>
-              <a:prstGeom prst="rect">
-                <a:avLst/>
-              </a:prstGeom>
-              <a:grpFill/>
-              <a:ln>
-                <a:noFill/>
-              </a:ln>
-            </p:spPr>
-            <p:style>
-              <a:lnRef idx="2">
-                <a:schemeClr val="accent1">
-                  <a:shade val="50000"/>
-                </a:schemeClr>
-              </a:lnRef>
-              <a:fillRef idx="1">
-                <a:schemeClr val="accent1"/>
-              </a:fillRef>
-              <a:effectRef idx="0">
-                <a:schemeClr val="accent1"/>
-              </a:effectRef>
-              <a:fontRef idx="minor">
-                <a:schemeClr val="lt1"/>
-              </a:fontRef>
-            </p:style>
-            <p:txBody>
-              <a:bodyPr rtlCol="0" anchor="ctr"/>
-              <a:lstStyle/>
-              <a:p>
-                <a:pPr algn="ctr"/>
-                <a:endParaRPr lang="en-GB"/>
-              </a:p>
-            </p:txBody>
-          </p:sp>
-        </p:grpSp>
-        <p:grpSp>
-          <p:nvGrpSpPr>
-            <p:cNvPr id="337" name="Group 336"/>
-            <p:cNvGrpSpPr/>
+            <a:prstGeom prst="ellipse">
+              <a:avLst/>
+            </a:prstGeom>
+            <a:grpFill/>
+            <a:ln>
+              <a:solidFill>
+                <a:srgbClr val="0070C0"/>
+              </a:solidFill>
+            </a:ln>
+          </p:spPr>
+          <p:style>
+            <a:lnRef idx="2">
+              <a:schemeClr val="accent1">
+                <a:shade val="50000"/>
+              </a:schemeClr>
+            </a:lnRef>
+            <a:fillRef idx="1">
+              <a:schemeClr val="accent1"/>
+            </a:fillRef>
+            <a:effectRef idx="0">
+              <a:schemeClr val="accent1"/>
+            </a:effectRef>
+            <a:fontRef idx="minor">
+              <a:schemeClr val="lt1"/>
+            </a:fontRef>
+          </p:style>
+          <p:txBody>
+            <a:bodyPr rtlCol="0" anchor="ctr"/>
+            <a:lstStyle/>
+            <a:p>
+              <a:pPr algn="ctr"/>
+              <a:endParaRPr lang="en-GB"/>
+            </a:p>
+          </p:txBody>
+        </p:sp>
+        <p:sp>
+          <p:nvSpPr>
+            <p:cNvPr id="129" name="Oval 128"/>
+            <p:cNvSpPr/>
             <p:nvPr/>
-          </p:nvGrpSpPr>
-          <p:grpSpPr>
+          </p:nvSpPr>
+          <p:spPr>
             <a:xfrm>
-              <a:off x="7300606" y="1361316"/>
-              <a:ext cx="125898" cy="272533"/>
-              <a:chOff x="2771800" y="1369443"/>
-              <a:chExt cx="216024" cy="382265"/>
+              <a:off x="2771800" y="1535684"/>
+              <a:ext cx="216024" cy="144016"/>
             </a:xfrm>
-            <a:solidFill>
-              <a:srgbClr val="94C9E4"/>
-            </a:solidFill>
-          </p:grpSpPr>
-          <p:sp>
-            <p:nvSpPr>
-              <p:cNvPr id="338" name="Oval 337"/>
-              <p:cNvSpPr/>
-              <p:nvPr/>
-            </p:nvSpPr>
-            <p:spPr>
-              <a:xfrm>
-                <a:off x="2807804" y="1369443"/>
-                <a:ext cx="144016" cy="144016"/>
-              </a:xfrm>
-              <a:prstGeom prst="ellipse">
-                <a:avLst/>
-              </a:prstGeom>
-              <a:grpFill/>
-              <a:ln>
-                <a:solidFill>
-                  <a:srgbClr val="0070C0"/>
-                </a:solidFill>
-              </a:ln>
-            </p:spPr>
-            <p:style>
-              <a:lnRef idx="2">
-                <a:schemeClr val="accent1">
-                  <a:shade val="50000"/>
-                </a:schemeClr>
-              </a:lnRef>
-              <a:fillRef idx="1">
-                <a:schemeClr val="accent1"/>
-              </a:fillRef>
-              <a:effectRef idx="0">
-                <a:schemeClr val="accent1"/>
-              </a:effectRef>
-              <a:fontRef idx="minor">
-                <a:schemeClr val="lt1"/>
-              </a:fontRef>
-            </p:style>
-            <p:txBody>
-              <a:bodyPr rtlCol="0" anchor="ctr"/>
-              <a:lstStyle/>
-              <a:p>
-                <a:pPr algn="ctr"/>
-                <a:endParaRPr lang="en-GB"/>
-              </a:p>
-            </p:txBody>
-          </p:sp>
-          <p:sp>
-            <p:nvSpPr>
-              <p:cNvPr id="339" name="Oval 338"/>
-              <p:cNvSpPr/>
-              <p:nvPr/>
-            </p:nvSpPr>
-            <p:spPr>
-              <a:xfrm>
-                <a:off x="2771800" y="1535684"/>
-                <a:ext cx="216024" cy="144016"/>
-              </a:xfrm>
-              <a:prstGeom prst="ellipse">
-                <a:avLst/>
-              </a:prstGeom>
-              <a:grpFill/>
-              <a:ln>
-                <a:solidFill>
-                  <a:srgbClr val="0070C0"/>
-                </a:solidFill>
-              </a:ln>
-            </p:spPr>
-            <p:style>
-              <a:lnRef idx="2">
-                <a:schemeClr val="accent1">
-                  <a:shade val="50000"/>
-                </a:schemeClr>
-              </a:lnRef>
-              <a:fillRef idx="1">
-                <a:schemeClr val="accent1"/>
-              </a:fillRef>
-              <a:effectRef idx="0">
-                <a:schemeClr val="accent1"/>
-              </a:effectRef>
-              <a:fontRef idx="minor">
-                <a:schemeClr val="lt1"/>
-              </a:fontRef>
-            </p:style>
-            <p:txBody>
-              <a:bodyPr rtlCol="0" anchor="ctr"/>
-              <a:lstStyle/>
-              <a:p>
-                <a:pPr algn="ctr"/>
-                <a:endParaRPr lang="en-GB"/>
-              </a:p>
-            </p:txBody>
-          </p:sp>
-          <p:sp>
-            <p:nvSpPr>
-              <p:cNvPr id="340" name="Rectangle 339"/>
-              <p:cNvSpPr/>
-              <p:nvPr/>
-            </p:nvSpPr>
-            <p:spPr>
-              <a:xfrm>
-                <a:off x="2771800" y="1607692"/>
-                <a:ext cx="216024" cy="144016"/>
-              </a:xfrm>
-              <a:prstGeom prst="rect">
-                <a:avLst/>
-              </a:prstGeom>
-              <a:grpFill/>
-              <a:ln>
-                <a:solidFill>
-                  <a:srgbClr val="0070C0"/>
-                </a:solidFill>
-              </a:ln>
-            </p:spPr>
-            <p:style>
-              <a:lnRef idx="2">
-                <a:schemeClr val="accent1">
-                  <a:shade val="50000"/>
-                </a:schemeClr>
-              </a:lnRef>
-              <a:fillRef idx="1">
-                <a:schemeClr val="accent1"/>
-              </a:fillRef>
-              <a:effectRef idx="0">
-                <a:schemeClr val="accent1"/>
-              </a:effectRef>
-              <a:fontRef idx="minor">
-                <a:schemeClr val="lt1"/>
-              </a:fontRef>
-            </p:style>
-            <p:txBody>
-              <a:bodyPr rtlCol="0" anchor="ctr"/>
-              <a:lstStyle/>
-              <a:p>
-                <a:pPr algn="ctr"/>
-                <a:endParaRPr lang="en-GB"/>
-              </a:p>
-            </p:txBody>
-          </p:sp>
-          <p:sp>
-            <p:nvSpPr>
-              <p:cNvPr id="341" name="Rectangle 340"/>
-              <p:cNvSpPr/>
-              <p:nvPr/>
-            </p:nvSpPr>
-            <p:spPr>
-              <a:xfrm>
-                <a:off x="2788948" y="1591577"/>
-                <a:ext cx="183641" cy="45719"/>
-              </a:xfrm>
-              <a:prstGeom prst="rect">
-                <a:avLst/>
-              </a:prstGeom>
-              <a:grpFill/>
-              <a:ln>
-                <a:noFill/>
-              </a:ln>
-            </p:spPr>
-            <p:style>
-              <a:lnRef idx="2">
-                <a:schemeClr val="accent1">
-                  <a:shade val="50000"/>
-                </a:schemeClr>
-              </a:lnRef>
-              <a:fillRef idx="1">
-                <a:schemeClr val="accent1"/>
-              </a:fillRef>
-              <a:effectRef idx="0">
-                <a:schemeClr val="accent1"/>
-              </a:effectRef>
-              <a:fontRef idx="minor">
-                <a:schemeClr val="lt1"/>
-              </a:fontRef>
-            </p:style>
-            <p:txBody>
-              <a:bodyPr rtlCol="0" anchor="ctr"/>
-              <a:lstStyle/>
-              <a:p>
-                <a:pPr algn="ctr"/>
-                <a:endParaRPr lang="en-GB"/>
-              </a:p>
-            </p:txBody>
-          </p:sp>
-        </p:grpSp>
-        <p:grpSp>
-          <p:nvGrpSpPr>
-            <p:cNvPr id="127" name="Group 126"/>
-            <p:cNvGrpSpPr/>
+            <a:prstGeom prst="ellipse">
+              <a:avLst/>
+            </a:prstGeom>
+            <a:grpFill/>
+            <a:ln>
+              <a:solidFill>
+                <a:srgbClr val="0070C0"/>
+              </a:solidFill>
+            </a:ln>
+          </p:spPr>
+          <p:style>
+            <a:lnRef idx="2">
+              <a:schemeClr val="accent1">
+                <a:shade val="50000"/>
+              </a:schemeClr>
+            </a:lnRef>
+            <a:fillRef idx="1">
+              <a:schemeClr val="accent1"/>
+            </a:fillRef>
+            <a:effectRef idx="0">
+              <a:schemeClr val="accent1"/>
+            </a:effectRef>
+            <a:fontRef idx="minor">
+              <a:schemeClr val="lt1"/>
+            </a:fontRef>
+          </p:style>
+          <p:txBody>
+            <a:bodyPr rtlCol="0" anchor="ctr"/>
+            <a:lstStyle/>
+            <a:p>
+              <a:pPr algn="ctr"/>
+              <a:endParaRPr lang="en-GB"/>
+            </a:p>
+          </p:txBody>
+        </p:sp>
+        <p:sp>
+          <p:nvSpPr>
+            <p:cNvPr id="130" name="Rectangle 129"/>
+            <p:cNvSpPr/>
             <p:nvPr/>
-          </p:nvGrpSpPr>
-          <p:grpSpPr>
+          </p:nvSpPr>
+          <p:spPr>
             <a:xfrm>
-              <a:off x="7294414" y="1660509"/>
-              <a:ext cx="138283" cy="244699"/>
-              <a:chOff x="2771800" y="1369443"/>
-              <a:chExt cx="216024" cy="382265"/>
+              <a:off x="2771800" y="1607692"/>
+              <a:ext cx="216024" cy="144016"/>
             </a:xfrm>
-            <a:solidFill>
-              <a:schemeClr val="bg1">
-                <a:lumMod val="85000"/>
-              </a:schemeClr>
-            </a:solidFill>
-          </p:grpSpPr>
-          <p:sp>
-            <p:nvSpPr>
-              <p:cNvPr id="128" name="Oval 127"/>
-              <p:cNvSpPr/>
-              <p:nvPr/>
-            </p:nvSpPr>
-            <p:spPr>
-              <a:xfrm>
-                <a:off x="2807804" y="1369443"/>
-                <a:ext cx="144016" cy="144016"/>
-              </a:xfrm>
-              <a:prstGeom prst="ellipse">
-                <a:avLst/>
-              </a:prstGeom>
-              <a:grpFill/>
-              <a:ln>
-                <a:solidFill>
-                  <a:srgbClr val="0070C0"/>
-                </a:solidFill>
-              </a:ln>
-            </p:spPr>
-            <p:style>
-              <a:lnRef idx="2">
-                <a:schemeClr val="accent1">
-                  <a:shade val="50000"/>
-                </a:schemeClr>
-              </a:lnRef>
-              <a:fillRef idx="1">
-                <a:schemeClr val="accent1"/>
-              </a:fillRef>
-              <a:effectRef idx="0">
-                <a:schemeClr val="accent1"/>
-              </a:effectRef>
-              <a:fontRef idx="minor">
-                <a:schemeClr val="lt1"/>
-              </a:fontRef>
-            </p:style>
-            <p:txBody>
-              <a:bodyPr rtlCol="0" anchor="ctr"/>
-              <a:lstStyle/>
-              <a:p>
-                <a:pPr algn="ctr"/>
-                <a:endParaRPr lang="en-GB"/>
-              </a:p>
-            </p:txBody>
-          </p:sp>
-          <p:sp>
-            <p:nvSpPr>
-              <p:cNvPr id="129" name="Oval 128"/>
-              <p:cNvSpPr/>
-              <p:nvPr/>
-            </p:nvSpPr>
-            <p:spPr>
-              <a:xfrm>
-                <a:off x="2771800" y="1535684"/>
-                <a:ext cx="216024" cy="144016"/>
-              </a:xfrm>
-              <a:prstGeom prst="ellipse">
-                <a:avLst/>
-              </a:prstGeom>
-              <a:grpFill/>
-              <a:ln>
-                <a:solidFill>
-                  <a:srgbClr val="0070C0"/>
-                </a:solidFill>
-              </a:ln>
-            </p:spPr>
-            <p:style>
-              <a:lnRef idx="2">
-                <a:schemeClr val="accent1">
-                  <a:shade val="50000"/>
-                </a:schemeClr>
-              </a:lnRef>
-              <a:fillRef idx="1">
-                <a:schemeClr val="accent1"/>
-              </a:fillRef>
-              <a:effectRef idx="0">
-                <a:schemeClr val="accent1"/>
-              </a:effectRef>
-              <a:fontRef idx="minor">
-                <a:schemeClr val="lt1"/>
-              </a:fontRef>
-            </p:style>
-            <p:txBody>
-              <a:bodyPr rtlCol="0" anchor="ctr"/>
-              <a:lstStyle/>
-              <a:p>
-                <a:pPr algn="ctr"/>
-                <a:endParaRPr lang="en-GB"/>
-              </a:p>
-            </p:txBody>
-          </p:sp>
-          <p:sp>
-            <p:nvSpPr>
-              <p:cNvPr id="130" name="Rectangle 129"/>
-              <p:cNvSpPr/>
-              <p:nvPr/>
-            </p:nvSpPr>
-            <p:spPr>
-              <a:xfrm>
-                <a:off x="2771800" y="1607692"/>
-                <a:ext cx="216024" cy="144016"/>
-              </a:xfrm>
-              <a:prstGeom prst="rect">
-                <a:avLst/>
-              </a:prstGeom>
-              <a:grpFill/>
-              <a:ln>
-                <a:solidFill>
-                  <a:srgbClr val="0070C0"/>
-                </a:solidFill>
-              </a:ln>
-            </p:spPr>
-            <p:style>
-              <a:lnRef idx="2">
-                <a:schemeClr val="accent1">
-                  <a:shade val="50000"/>
-                </a:schemeClr>
-              </a:lnRef>
-              <a:fillRef idx="1">
-                <a:schemeClr val="accent1"/>
-              </a:fillRef>
-              <a:effectRef idx="0">
-                <a:schemeClr val="accent1"/>
-              </a:effectRef>
-              <a:fontRef idx="minor">
-                <a:schemeClr val="lt1"/>
-              </a:fontRef>
-            </p:style>
-            <p:txBody>
-              <a:bodyPr rtlCol="0" anchor="ctr"/>
-              <a:lstStyle/>
-              <a:p>
-                <a:pPr algn="ctr"/>
-                <a:endParaRPr lang="en-GB"/>
-              </a:p>
-            </p:txBody>
-          </p:sp>
-          <p:sp>
-            <p:nvSpPr>
-              <p:cNvPr id="131" name="Rectangle 130"/>
-              <p:cNvSpPr/>
-              <p:nvPr/>
-            </p:nvSpPr>
-            <p:spPr>
-              <a:xfrm>
-                <a:off x="2788948" y="1591577"/>
-                <a:ext cx="183641" cy="45719"/>
-              </a:xfrm>
-              <a:prstGeom prst="rect">
-                <a:avLst/>
-              </a:prstGeom>
-              <a:grpFill/>
-              <a:ln>
-                <a:noFill/>
-              </a:ln>
-            </p:spPr>
-            <p:style>
-              <a:lnRef idx="2">
-                <a:schemeClr val="accent1">
-                  <a:shade val="50000"/>
-                </a:schemeClr>
-              </a:lnRef>
-              <a:fillRef idx="1">
-                <a:schemeClr val="accent1"/>
-              </a:fillRef>
-              <a:effectRef idx="0">
-                <a:schemeClr val="accent1"/>
-              </a:effectRef>
-              <a:fontRef idx="minor">
-                <a:schemeClr val="lt1"/>
-              </a:fontRef>
-            </p:style>
-            <p:txBody>
-              <a:bodyPr rtlCol="0" anchor="ctr"/>
-              <a:lstStyle/>
-              <a:p>
-                <a:pPr algn="ctr"/>
-                <a:endParaRPr lang="en-GB"/>
-              </a:p>
-            </p:txBody>
-          </p:sp>
-        </p:grpSp>
+            <a:prstGeom prst="rect">
+              <a:avLst/>
+            </a:prstGeom>
+            <a:grpFill/>
+            <a:ln>
+              <a:solidFill>
+                <a:srgbClr val="0070C0"/>
+              </a:solidFill>
+            </a:ln>
+          </p:spPr>
+          <p:style>
+            <a:lnRef idx="2">
+              <a:schemeClr val="accent1">
+                <a:shade val="50000"/>
+              </a:schemeClr>
+            </a:lnRef>
+            <a:fillRef idx="1">
+              <a:schemeClr val="accent1"/>
+            </a:fillRef>
+            <a:effectRef idx="0">
+              <a:schemeClr val="accent1"/>
+            </a:effectRef>
+            <a:fontRef idx="minor">
+              <a:schemeClr val="lt1"/>
+            </a:fontRef>
+          </p:style>
+          <p:txBody>
+            <a:bodyPr rtlCol="0" anchor="ctr"/>
+            <a:lstStyle/>
+            <a:p>
+              <a:pPr algn="ctr"/>
+              <a:endParaRPr lang="en-GB"/>
+            </a:p>
+          </p:txBody>
+        </p:sp>
+        <p:sp>
+          <p:nvSpPr>
+            <p:cNvPr id="131" name="Rectangle 130"/>
+            <p:cNvSpPr/>
+            <p:nvPr/>
+          </p:nvSpPr>
+          <p:spPr>
+            <a:xfrm>
+              <a:off x="2788948" y="1591577"/>
+              <a:ext cx="183641" cy="45719"/>
+            </a:xfrm>
+            <a:prstGeom prst="rect">
+              <a:avLst/>
+            </a:prstGeom>
+            <a:grpFill/>
+            <a:ln>
+              <a:noFill/>
+            </a:ln>
+          </p:spPr>
+          <p:style>
+            <a:lnRef idx="2">
+              <a:schemeClr val="accent1">
+                <a:shade val="50000"/>
+              </a:schemeClr>
+            </a:lnRef>
+            <a:fillRef idx="1">
+              <a:schemeClr val="accent1"/>
+            </a:fillRef>
+            <a:effectRef idx="0">
+              <a:schemeClr val="accent1"/>
+            </a:effectRef>
+            <a:fontRef idx="minor">
+              <a:schemeClr val="lt1"/>
+            </a:fontRef>
+          </p:style>
+          <p:txBody>
+            <a:bodyPr rtlCol="0" anchor="ctr"/>
+            <a:lstStyle/>
+            <a:p>
+              <a:pPr algn="ctr"/>
+              <a:endParaRPr lang="en-GB"/>
+            </a:p>
+          </p:txBody>
+        </p:sp>
       </p:grpSp>
       <p:sp>
         <p:nvSpPr>
@@ -31701,7 +31296,7 @@
         </p:nvSpPr>
         <p:spPr>
           <a:xfrm>
-            <a:off x="2133946" y="1927702"/>
+            <a:off x="2490320" y="1284690"/>
             <a:ext cx="562822" cy="468052"/>
           </a:xfrm>
           <a:prstGeom prst="can">
@@ -31761,7 +31356,7 @@
         </p:nvSpPr>
         <p:spPr>
           <a:xfrm>
-            <a:off x="2133946" y="2487915"/>
+            <a:off x="2490320" y="1844903"/>
             <a:ext cx="562822" cy="468052"/>
           </a:xfrm>
           <a:prstGeom prst="can">
@@ -31821,7 +31416,7 @@
         </p:nvSpPr>
         <p:spPr>
           <a:xfrm>
-            <a:off x="2133946" y="3048128"/>
+            <a:off x="2490320" y="2405116"/>
             <a:ext cx="562822" cy="468052"/>
           </a:xfrm>
           <a:prstGeom prst="can">
@@ -31881,7 +31476,7 @@
         </p:nvSpPr>
         <p:spPr>
           <a:xfrm>
-            <a:off x="2133946" y="3608341"/>
+            <a:off x="2490320" y="2965329"/>
             <a:ext cx="562822" cy="468052"/>
           </a:xfrm>
           <a:prstGeom prst="can">
@@ -31941,7 +31536,7 @@
         </p:nvSpPr>
         <p:spPr>
           <a:xfrm>
-            <a:off x="2133946" y="4168554"/>
+            <a:off x="2490320" y="3525542"/>
             <a:ext cx="562822" cy="468052"/>
           </a:xfrm>
           <a:prstGeom prst="can">
@@ -32001,7 +31596,7 @@
         </p:nvSpPr>
         <p:spPr>
           <a:xfrm>
-            <a:off x="2133946" y="4728767"/>
+            <a:off x="2490320" y="4085755"/>
             <a:ext cx="562822" cy="468052"/>
           </a:xfrm>
           <a:prstGeom prst="can">
@@ -32061,7 +31656,7 @@
         </p:nvSpPr>
         <p:spPr>
           <a:xfrm>
-            <a:off x="2133946" y="5288980"/>
+            <a:off x="2490320" y="4645968"/>
             <a:ext cx="562822" cy="468052"/>
           </a:xfrm>
           <a:prstGeom prst="can">
@@ -32121,7 +31716,7 @@
         </p:nvSpPr>
         <p:spPr>
           <a:xfrm>
-            <a:off x="2133946" y="5849190"/>
+            <a:off x="2490320" y="5206178"/>
             <a:ext cx="562822" cy="468052"/>
           </a:xfrm>
           <a:prstGeom prst="can">
@@ -32181,7 +31776,7 @@
         </p:nvSpPr>
         <p:spPr>
           <a:xfrm>
-            <a:off x="5047366" y="3877054"/>
+            <a:off x="5403740" y="3234042"/>
             <a:ext cx="562822" cy="468052"/>
           </a:xfrm>
           <a:prstGeom prst="can">
@@ -32255,7 +31850,7 @@
         </p:nvSpPr>
         <p:spPr>
           <a:xfrm>
-            <a:off x="5765491" y="1881663"/>
+            <a:off x="6140692" y="5803611"/>
             <a:ext cx="243385" cy="224088"/>
           </a:xfrm>
           <a:prstGeom prst="can">
@@ -32315,7 +31910,7 @@
         </p:nvSpPr>
         <p:spPr>
           <a:xfrm>
-            <a:off x="5763442" y="2163016"/>
+            <a:off x="6138643" y="6084964"/>
             <a:ext cx="243385" cy="224088"/>
           </a:xfrm>
           <a:prstGeom prst="can">
@@ -32389,7 +31984,7 @@
         </p:nvSpPr>
         <p:spPr>
           <a:xfrm>
-            <a:off x="5604855" y="2492080"/>
+            <a:off x="5980056" y="6414028"/>
             <a:ext cx="410431" cy="144017"/>
           </a:xfrm>
           <a:prstGeom prst="roundRect">
@@ -32459,6 +32054,406 @@
           </a:p>
         </p:txBody>
       </p:sp>
+      <p:grpSp>
+        <p:nvGrpSpPr>
+          <p:cNvPr id="141" name="Group 140"/>
+          <p:cNvGrpSpPr/>
+          <p:nvPr/>
+        </p:nvGrpSpPr>
+        <p:grpSpPr>
+          <a:xfrm>
+            <a:off x="1579032" y="2727506"/>
+            <a:ext cx="216024" cy="382265"/>
+            <a:chOff x="2771800" y="1369443"/>
+            <a:chExt cx="216024" cy="382265"/>
+          </a:xfrm>
+          <a:solidFill>
+            <a:srgbClr val="94C9E4"/>
+          </a:solidFill>
+        </p:grpSpPr>
+        <p:sp>
+          <p:nvSpPr>
+            <p:cNvPr id="142" name="Oval 141"/>
+            <p:cNvSpPr/>
+            <p:nvPr/>
+          </p:nvSpPr>
+          <p:spPr>
+            <a:xfrm>
+              <a:off x="2807804" y="1369443"/>
+              <a:ext cx="144016" cy="144016"/>
+            </a:xfrm>
+            <a:prstGeom prst="ellipse">
+              <a:avLst/>
+            </a:prstGeom>
+            <a:grpFill/>
+            <a:ln>
+              <a:solidFill>
+                <a:srgbClr val="0070C0"/>
+              </a:solidFill>
+            </a:ln>
+          </p:spPr>
+          <p:style>
+            <a:lnRef idx="2">
+              <a:schemeClr val="accent1">
+                <a:shade val="50000"/>
+              </a:schemeClr>
+            </a:lnRef>
+            <a:fillRef idx="1">
+              <a:schemeClr val="accent1"/>
+            </a:fillRef>
+            <a:effectRef idx="0">
+              <a:schemeClr val="accent1"/>
+            </a:effectRef>
+            <a:fontRef idx="minor">
+              <a:schemeClr val="lt1"/>
+            </a:fontRef>
+          </p:style>
+          <p:txBody>
+            <a:bodyPr rtlCol="0" anchor="ctr"/>
+            <a:lstStyle/>
+            <a:p>
+              <a:pPr algn="ctr"/>
+              <a:endParaRPr lang="en-GB"/>
+            </a:p>
+          </p:txBody>
+        </p:sp>
+        <p:sp>
+          <p:nvSpPr>
+            <p:cNvPr id="143" name="Oval 142"/>
+            <p:cNvSpPr/>
+            <p:nvPr/>
+          </p:nvSpPr>
+          <p:spPr>
+            <a:xfrm>
+              <a:off x="2771800" y="1535684"/>
+              <a:ext cx="216024" cy="144016"/>
+            </a:xfrm>
+            <a:prstGeom prst="ellipse">
+              <a:avLst/>
+            </a:prstGeom>
+            <a:grpFill/>
+            <a:ln>
+              <a:solidFill>
+                <a:srgbClr val="0070C0"/>
+              </a:solidFill>
+            </a:ln>
+          </p:spPr>
+          <p:style>
+            <a:lnRef idx="2">
+              <a:schemeClr val="accent1">
+                <a:shade val="50000"/>
+              </a:schemeClr>
+            </a:lnRef>
+            <a:fillRef idx="1">
+              <a:schemeClr val="accent1"/>
+            </a:fillRef>
+            <a:effectRef idx="0">
+              <a:schemeClr val="accent1"/>
+            </a:effectRef>
+            <a:fontRef idx="minor">
+              <a:schemeClr val="lt1"/>
+            </a:fontRef>
+          </p:style>
+          <p:txBody>
+            <a:bodyPr rtlCol="0" anchor="ctr"/>
+            <a:lstStyle/>
+            <a:p>
+              <a:pPr algn="ctr"/>
+              <a:endParaRPr lang="en-GB"/>
+            </a:p>
+          </p:txBody>
+        </p:sp>
+        <p:sp>
+          <p:nvSpPr>
+            <p:cNvPr id="144" name="Rectangle 143"/>
+            <p:cNvSpPr/>
+            <p:nvPr/>
+          </p:nvSpPr>
+          <p:spPr>
+            <a:xfrm>
+              <a:off x="2771800" y="1607692"/>
+              <a:ext cx="216024" cy="144016"/>
+            </a:xfrm>
+            <a:prstGeom prst="rect">
+              <a:avLst/>
+            </a:prstGeom>
+            <a:grpFill/>
+            <a:ln>
+              <a:solidFill>
+                <a:srgbClr val="0070C0"/>
+              </a:solidFill>
+            </a:ln>
+          </p:spPr>
+          <p:style>
+            <a:lnRef idx="2">
+              <a:schemeClr val="accent1">
+                <a:shade val="50000"/>
+              </a:schemeClr>
+            </a:lnRef>
+            <a:fillRef idx="1">
+              <a:schemeClr val="accent1"/>
+            </a:fillRef>
+            <a:effectRef idx="0">
+              <a:schemeClr val="accent1"/>
+            </a:effectRef>
+            <a:fontRef idx="minor">
+              <a:schemeClr val="lt1"/>
+            </a:fontRef>
+          </p:style>
+          <p:txBody>
+            <a:bodyPr rtlCol="0" anchor="ctr"/>
+            <a:lstStyle/>
+            <a:p>
+              <a:pPr algn="ctr"/>
+              <a:endParaRPr lang="en-GB"/>
+            </a:p>
+          </p:txBody>
+        </p:sp>
+        <p:sp>
+          <p:nvSpPr>
+            <p:cNvPr id="145" name="Rectangle 144"/>
+            <p:cNvSpPr/>
+            <p:nvPr/>
+          </p:nvSpPr>
+          <p:spPr>
+            <a:xfrm>
+              <a:off x="2788948" y="1591577"/>
+              <a:ext cx="183641" cy="45719"/>
+            </a:xfrm>
+            <a:prstGeom prst="rect">
+              <a:avLst/>
+            </a:prstGeom>
+            <a:grpFill/>
+            <a:ln>
+              <a:noFill/>
+            </a:ln>
+          </p:spPr>
+          <p:style>
+            <a:lnRef idx="2">
+              <a:schemeClr val="accent1">
+                <a:shade val="50000"/>
+              </a:schemeClr>
+            </a:lnRef>
+            <a:fillRef idx="1">
+              <a:schemeClr val="accent1"/>
+            </a:fillRef>
+            <a:effectRef idx="0">
+              <a:schemeClr val="accent1"/>
+            </a:effectRef>
+            <a:fontRef idx="minor">
+              <a:schemeClr val="lt1"/>
+            </a:fontRef>
+          </p:style>
+          <p:txBody>
+            <a:bodyPr rtlCol="0" anchor="ctr"/>
+            <a:lstStyle/>
+            <a:p>
+              <a:pPr algn="ctr"/>
+              <a:endParaRPr lang="en-GB"/>
+            </a:p>
+          </p:txBody>
+        </p:sp>
+      </p:grpSp>
+      <p:grpSp>
+        <p:nvGrpSpPr>
+          <p:cNvPr id="146" name="Group 145"/>
+          <p:cNvGrpSpPr/>
+          <p:nvPr/>
+        </p:nvGrpSpPr>
+        <p:grpSpPr>
+          <a:xfrm>
+            <a:off x="1283686" y="2716896"/>
+            <a:ext cx="216024" cy="382265"/>
+            <a:chOff x="2771800" y="1369443"/>
+            <a:chExt cx="216024" cy="382265"/>
+          </a:xfrm>
+          <a:solidFill>
+            <a:srgbClr val="94C9E4"/>
+          </a:solidFill>
+        </p:grpSpPr>
+        <p:sp>
+          <p:nvSpPr>
+            <p:cNvPr id="147" name="Oval 146"/>
+            <p:cNvSpPr/>
+            <p:nvPr/>
+          </p:nvSpPr>
+          <p:spPr>
+            <a:xfrm>
+              <a:off x="2807804" y="1369443"/>
+              <a:ext cx="144016" cy="144016"/>
+            </a:xfrm>
+            <a:prstGeom prst="ellipse">
+              <a:avLst/>
+            </a:prstGeom>
+            <a:grpFill/>
+            <a:ln>
+              <a:solidFill>
+                <a:srgbClr val="0070C0"/>
+              </a:solidFill>
+            </a:ln>
+          </p:spPr>
+          <p:style>
+            <a:lnRef idx="2">
+              <a:schemeClr val="accent1">
+                <a:shade val="50000"/>
+              </a:schemeClr>
+            </a:lnRef>
+            <a:fillRef idx="1">
+              <a:schemeClr val="accent1"/>
+            </a:fillRef>
+            <a:effectRef idx="0">
+              <a:schemeClr val="accent1"/>
+            </a:effectRef>
+            <a:fontRef idx="minor">
+              <a:schemeClr val="lt1"/>
+            </a:fontRef>
+          </p:style>
+          <p:txBody>
+            <a:bodyPr rtlCol="0" anchor="ctr"/>
+            <a:lstStyle/>
+            <a:p>
+              <a:pPr algn="ctr"/>
+              <a:endParaRPr lang="en-GB"/>
+            </a:p>
+          </p:txBody>
+        </p:sp>
+        <p:sp>
+          <p:nvSpPr>
+            <p:cNvPr id="148" name="Oval 147"/>
+            <p:cNvSpPr/>
+            <p:nvPr/>
+          </p:nvSpPr>
+          <p:spPr>
+            <a:xfrm>
+              <a:off x="2771800" y="1535684"/>
+              <a:ext cx="216024" cy="144016"/>
+            </a:xfrm>
+            <a:prstGeom prst="ellipse">
+              <a:avLst/>
+            </a:prstGeom>
+            <a:grpFill/>
+            <a:ln>
+              <a:solidFill>
+                <a:srgbClr val="0070C0"/>
+              </a:solidFill>
+            </a:ln>
+          </p:spPr>
+          <p:style>
+            <a:lnRef idx="2">
+              <a:schemeClr val="accent1">
+                <a:shade val="50000"/>
+              </a:schemeClr>
+            </a:lnRef>
+            <a:fillRef idx="1">
+              <a:schemeClr val="accent1"/>
+            </a:fillRef>
+            <a:effectRef idx="0">
+              <a:schemeClr val="accent1"/>
+            </a:effectRef>
+            <a:fontRef idx="minor">
+              <a:schemeClr val="lt1"/>
+            </a:fontRef>
+          </p:style>
+          <p:txBody>
+            <a:bodyPr rtlCol="0" anchor="ctr"/>
+            <a:lstStyle/>
+            <a:p>
+              <a:pPr algn="ctr"/>
+              <a:endParaRPr lang="en-GB"/>
+            </a:p>
+          </p:txBody>
+        </p:sp>
+        <p:sp>
+          <p:nvSpPr>
+            <p:cNvPr id="149" name="Rectangle 148"/>
+            <p:cNvSpPr/>
+            <p:nvPr/>
+          </p:nvSpPr>
+          <p:spPr>
+            <a:xfrm>
+              <a:off x="2771800" y="1607692"/>
+              <a:ext cx="216024" cy="144016"/>
+            </a:xfrm>
+            <a:prstGeom prst="rect">
+              <a:avLst/>
+            </a:prstGeom>
+            <a:grpFill/>
+            <a:ln>
+              <a:solidFill>
+                <a:srgbClr val="0070C0"/>
+              </a:solidFill>
+            </a:ln>
+          </p:spPr>
+          <p:style>
+            <a:lnRef idx="2">
+              <a:schemeClr val="accent1">
+                <a:shade val="50000"/>
+              </a:schemeClr>
+            </a:lnRef>
+            <a:fillRef idx="1">
+              <a:schemeClr val="accent1"/>
+            </a:fillRef>
+            <a:effectRef idx="0">
+              <a:schemeClr val="accent1"/>
+            </a:effectRef>
+            <a:fontRef idx="minor">
+              <a:schemeClr val="lt1"/>
+            </a:fontRef>
+          </p:style>
+          <p:txBody>
+            <a:bodyPr rtlCol="0" anchor="ctr"/>
+            <a:lstStyle/>
+            <a:p>
+              <a:pPr algn="ctr"/>
+              <a:endParaRPr lang="en-GB"/>
+            </a:p>
+          </p:txBody>
+        </p:sp>
+        <p:sp>
+          <p:nvSpPr>
+            <p:cNvPr id="150" name="Rectangle 149"/>
+            <p:cNvSpPr/>
+            <p:nvPr/>
+          </p:nvSpPr>
+          <p:spPr>
+            <a:xfrm>
+              <a:off x="2788948" y="1591577"/>
+              <a:ext cx="183641" cy="45719"/>
+            </a:xfrm>
+            <a:prstGeom prst="rect">
+              <a:avLst/>
+            </a:prstGeom>
+            <a:grpFill/>
+            <a:ln>
+              <a:noFill/>
+            </a:ln>
+          </p:spPr>
+          <p:style>
+            <a:lnRef idx="2">
+              <a:schemeClr val="accent1">
+                <a:shade val="50000"/>
+              </a:schemeClr>
+            </a:lnRef>
+            <a:fillRef idx="1">
+              <a:schemeClr val="accent1"/>
+            </a:fillRef>
+            <a:effectRef idx="0">
+              <a:schemeClr val="accent1"/>
+            </a:effectRef>
+            <a:fontRef idx="minor">
+              <a:schemeClr val="lt1"/>
+            </a:fontRef>
+          </p:style>
+          <p:txBody>
+            <a:bodyPr rtlCol="0" anchor="ctr"/>
+            <a:lstStyle/>
+            <a:p>
+              <a:pPr algn="ctr"/>
+              <a:endParaRPr lang="en-GB"/>
+            </a:p>
+          </p:txBody>
+        </p:sp>
+      </p:grpSp>
     </p:spTree>
     <p:extLst>
       <p:ext uri="{BB962C8B-B14F-4D97-AF65-F5344CB8AC3E}">

</xml_diff>

<commit_message>
Further updates to specifications programme governance
</commit_message>
<xml_diff>
--- a/files/openEHR_diagrams_sources.pptx
+++ b/files/openEHR_diagrams_sources.pptx
@@ -26675,8 +26675,8 @@
         </p:nvSpPr>
         <p:spPr>
           <a:xfrm>
-            <a:off x="417052" y="1182076"/>
-            <a:ext cx="1985008" cy="4590083"/>
+            <a:off x="377936" y="935009"/>
+            <a:ext cx="2754446" cy="5472608"/>
           </a:xfrm>
           <a:prstGeom prst="roundRect">
             <a:avLst/>
@@ -26752,22 +26752,7 @@
                   <a:srgbClr val="00335F"/>
                 </a:solidFill>
               </a:rPr>
-              <a:t/>
-            </a:r>
-            <a:br>
-              <a:rPr lang="en-US" b="1" dirty="0" smtClean="0">
-                <a:solidFill>
-                  <a:srgbClr val="00335F"/>
-                </a:solidFill>
-              </a:rPr>
-            </a:br>
-            <a:r>
-              <a:rPr lang="en-US" b="1" dirty="0" smtClean="0">
-                <a:solidFill>
-                  <a:srgbClr val="00335F"/>
-                </a:solidFill>
-              </a:rPr>
-              <a:t>(</a:t>
+              <a:t> (</a:t>
             </a:r>
             <a:r>
               <a:rPr lang="en-US" b="1" dirty="0" smtClean="0">
@@ -26788,7 +26773,7 @@
         </p:nvSpPr>
         <p:spPr>
           <a:xfrm>
-            <a:off x="3200182" y="5214282"/>
+            <a:off x="3278672" y="5672619"/>
             <a:ext cx="2016224" cy="468052"/>
           </a:xfrm>
           <a:prstGeom prst="roundRect">
@@ -26878,11 +26863,7 @@
             <a:pPr algn="ctr"/>
             <a:r>
               <a:rPr lang="en-US" sz="2400" dirty="0" smtClean="0"/>
-              <a:t>Specification </a:t>
-            </a:r>
-            <a:r>
-              <a:rPr lang="en-US" sz="2400" dirty="0" smtClean="0"/>
-              <a:t>Program</a:t>
+              <a:t>Specification Program</a:t>
             </a:r>
             <a:endParaRPr lang="en-US" sz="2400" dirty="0"/>
           </a:p>
@@ -26897,7 +26878,7 @@
         <p:spPr>
           <a:xfrm>
             <a:off x="6325462" y="4909698"/>
-            <a:ext cx="2507882" cy="1762021"/>
+            <a:ext cx="2639026" cy="1762021"/>
           </a:xfrm>
           <a:prstGeom prst="rect">
             <a:avLst/>
@@ -26917,7 +26898,15 @@
             </a:pPr>
             <a:r>
               <a:rPr lang="en-US" sz="1600" dirty="0" smtClean="0"/>
-              <a:t>= Elected co-chair</a:t>
+              <a:t>= </a:t>
+            </a:r>
+            <a:r>
+              <a:rPr lang="en-US" sz="1600" dirty="0" smtClean="0"/>
+              <a:t>SEC elected </a:t>
+            </a:r>
+            <a:r>
+              <a:rPr lang="en-US" sz="1600" dirty="0" smtClean="0"/>
+              <a:t>co-chair</a:t>
             </a:r>
           </a:p>
           <a:p>
@@ -26928,8 +26917,13 @@
             </a:pPr>
             <a:r>
               <a:rPr lang="en-US" sz="1600" dirty="0" smtClean="0"/>
-              <a:t>= Component maintainer</a:t>
-            </a:r>
+              <a:t>= </a:t>
+            </a:r>
+            <a:r>
+              <a:rPr lang="en-US" sz="1600" dirty="0"/>
+              <a:t>SEC member</a:t>
+            </a:r>
+            <a:endParaRPr lang="en-US" sz="1600" dirty="0" smtClean="0"/>
           </a:p>
           <a:p>
             <a:pPr>
@@ -26939,8 +26933,13 @@
             </a:pPr>
             <a:r>
               <a:rPr lang="en-US" sz="1600" dirty="0" smtClean="0"/>
-              <a:t>= Other member</a:t>
-            </a:r>
+              <a:t>= </a:t>
+            </a:r>
+            <a:r>
+              <a:rPr lang="en-US" sz="1600" dirty="0" smtClean="0"/>
+              <a:t>SEC Component Maintainer</a:t>
+            </a:r>
+            <a:endParaRPr lang="en-US" sz="1600" dirty="0" smtClean="0"/>
           </a:p>
           <a:p>
             <a:pPr>
@@ -26985,7 +26984,7 @@
         </p:nvSpPr>
         <p:spPr>
           <a:xfrm>
-            <a:off x="3200182" y="4656220"/>
+            <a:off x="3278672" y="5114557"/>
             <a:ext cx="2016224" cy="468052"/>
           </a:xfrm>
           <a:prstGeom prst="roundRect">
@@ -27058,7 +27057,7 @@
         </p:nvSpPr>
         <p:spPr>
           <a:xfrm>
-            <a:off x="3200182" y="4095127"/>
+            <a:off x="3278672" y="4553464"/>
             <a:ext cx="2016224" cy="468052"/>
           </a:xfrm>
           <a:prstGeom prst="roundRect">
@@ -27131,7 +27130,7 @@
         </p:nvSpPr>
         <p:spPr>
           <a:xfrm>
-            <a:off x="3200182" y="2962542"/>
+            <a:off x="3278672" y="3420879"/>
             <a:ext cx="2016224" cy="468052"/>
           </a:xfrm>
           <a:prstGeom prst="roundRect">
@@ -27204,7 +27203,7 @@
         </p:nvSpPr>
         <p:spPr>
           <a:xfrm>
-            <a:off x="3200182" y="2404480"/>
+            <a:off x="3278672" y="2862817"/>
             <a:ext cx="2016224" cy="468052"/>
           </a:xfrm>
           <a:prstGeom prst="roundRect">
@@ -27277,7 +27276,7 @@
         </p:nvSpPr>
         <p:spPr>
           <a:xfrm>
-            <a:off x="3200182" y="3537066"/>
+            <a:off x="3278672" y="3995403"/>
             <a:ext cx="2016224" cy="468052"/>
           </a:xfrm>
           <a:prstGeom prst="roundRect">
@@ -27350,7 +27349,7 @@
         </p:nvSpPr>
         <p:spPr>
           <a:xfrm>
-            <a:off x="3200182" y="1285326"/>
+            <a:off x="3278672" y="1743663"/>
             <a:ext cx="2016224" cy="468052"/>
           </a:xfrm>
           <a:prstGeom prst="roundRect">
@@ -27423,7 +27422,7 @@
         </p:nvSpPr>
         <p:spPr>
           <a:xfrm>
-            <a:off x="3200182" y="1844903"/>
+            <a:off x="3278672" y="2303240"/>
             <a:ext cx="2016224" cy="468052"/>
           </a:xfrm>
           <a:prstGeom prst="roundRect">
@@ -27496,7 +27495,7 @@
         </p:nvGrpSpPr>
         <p:grpSpPr>
           <a:xfrm>
-            <a:off x="771409" y="3579140"/>
+            <a:off x="732293" y="3649088"/>
             <a:ext cx="216024" cy="382265"/>
             <a:chOff x="2771800" y="1369443"/>
             <a:chExt cx="216024" cy="382265"/>
@@ -27696,7 +27695,7 @@
         </p:nvGrpSpPr>
         <p:grpSpPr>
           <a:xfrm>
-            <a:off x="783797" y="3037763"/>
+            <a:off x="744681" y="3107711"/>
             <a:ext cx="216024" cy="382265"/>
             <a:chOff x="2771800" y="1369443"/>
             <a:chExt cx="216024" cy="382265"/>
@@ -27896,7 +27895,7 @@
         </p:nvGrpSpPr>
         <p:grpSpPr>
           <a:xfrm>
-            <a:off x="2121445" y="3587873"/>
+            <a:off x="2082329" y="4046210"/>
             <a:ext cx="216024" cy="382265"/>
             <a:chOff x="2771800" y="1369443"/>
             <a:chExt cx="216024" cy="382265"/>
@@ -28096,7 +28095,7 @@
         </p:nvGrpSpPr>
         <p:grpSpPr>
           <a:xfrm>
-            <a:off x="2121445" y="4103041"/>
+            <a:off x="2082329" y="4561378"/>
             <a:ext cx="216024" cy="382265"/>
             <a:chOff x="2771800" y="1369443"/>
             <a:chExt cx="216024" cy="382265"/>
@@ -28296,7 +28295,7 @@
         </p:nvGrpSpPr>
         <p:grpSpPr>
           <a:xfrm>
-            <a:off x="2121445" y="4692032"/>
+            <a:off x="2082329" y="5150369"/>
             <a:ext cx="216024" cy="382265"/>
             <a:chOff x="2771800" y="1369443"/>
             <a:chExt cx="216024" cy="382265"/>
@@ -28496,7 +28495,7 @@
         </p:nvGrpSpPr>
         <p:grpSpPr>
           <a:xfrm>
-            <a:off x="2121445" y="5207200"/>
+            <a:off x="2082329" y="5665537"/>
             <a:ext cx="216024" cy="382265"/>
             <a:chOff x="2771800" y="1369443"/>
             <a:chExt cx="216024" cy="382265"/>
@@ -28696,7 +28695,7 @@
         </p:nvGrpSpPr>
         <p:grpSpPr>
           <a:xfrm>
-            <a:off x="2127682" y="1359145"/>
+            <a:off x="2088566" y="1817482"/>
             <a:ext cx="216024" cy="382265"/>
             <a:chOff x="2771800" y="1369443"/>
             <a:chExt cx="216024" cy="382265"/>
@@ -28896,7 +28895,7 @@
         </p:nvGrpSpPr>
         <p:grpSpPr>
           <a:xfrm>
-            <a:off x="2127682" y="1874313"/>
+            <a:off x="2088566" y="2332650"/>
             <a:ext cx="216024" cy="382265"/>
             <a:chOff x="2771800" y="1369443"/>
             <a:chExt cx="216024" cy="382265"/>
@@ -29096,7 +29095,7 @@
         </p:nvGrpSpPr>
         <p:grpSpPr>
           <a:xfrm>
-            <a:off x="2127682" y="2463304"/>
+            <a:off x="2088566" y="2921641"/>
             <a:ext cx="216024" cy="382265"/>
             <a:chOff x="2771800" y="1369443"/>
             <a:chExt cx="216024" cy="382265"/>
@@ -29296,7 +29295,7 @@
         </p:nvGrpSpPr>
         <p:grpSpPr>
           <a:xfrm>
-            <a:off x="2127682" y="2978472"/>
+            <a:off x="2088566" y="3436809"/>
             <a:ext cx="216024" cy="382265"/>
             <a:chOff x="2771800" y="1369443"/>
             <a:chExt cx="216024" cy="382265"/>
@@ -29496,7 +29495,7 @@
         </p:nvGrpSpPr>
         <p:grpSpPr>
           <a:xfrm>
-            <a:off x="1554157" y="3351213"/>
+            <a:off x="1515041" y="3233486"/>
             <a:ext cx="216024" cy="382265"/>
             <a:chOff x="2771800" y="1369443"/>
             <a:chExt cx="216024" cy="382265"/>
@@ -29696,7 +29695,7 @@
         </p:nvGrpSpPr>
         <p:grpSpPr>
           <a:xfrm>
-            <a:off x="1550462" y="3823488"/>
+            <a:off x="1511346" y="3705761"/>
             <a:ext cx="216024" cy="382265"/>
             <a:chOff x="2771800" y="1369443"/>
             <a:chExt cx="216024" cy="382265"/>
@@ -29896,7 +29895,7 @@
         </p:nvGrpSpPr>
         <p:grpSpPr>
           <a:xfrm>
-            <a:off x="1279578" y="3356114"/>
+            <a:off x="1240462" y="3238387"/>
             <a:ext cx="216024" cy="382265"/>
             <a:chOff x="2771800" y="1369443"/>
             <a:chExt cx="216024" cy="382265"/>
@@ -30096,7 +30095,7 @@
         </p:nvGrpSpPr>
         <p:grpSpPr>
           <a:xfrm>
-            <a:off x="1275883" y="3828389"/>
+            <a:off x="1236767" y="3710662"/>
             <a:ext cx="216024" cy="382265"/>
             <a:chOff x="2771800" y="1369443"/>
             <a:chExt cx="216024" cy="382265"/>
@@ -30296,7 +30295,7 @@
         </p:nvGrpSpPr>
         <p:grpSpPr>
           <a:xfrm>
-            <a:off x="1583341" y="4414887"/>
+            <a:off x="1544225" y="4297160"/>
             <a:ext cx="216024" cy="382265"/>
             <a:chOff x="2771800" y="1369443"/>
             <a:chExt cx="216024" cy="382265"/>
@@ -30496,7 +30495,7 @@
         </p:nvGrpSpPr>
         <p:grpSpPr>
           <a:xfrm>
-            <a:off x="1287995" y="4404277"/>
+            <a:off x="1248879" y="4286550"/>
             <a:ext cx="216024" cy="382265"/>
             <a:chOff x="2771800" y="1369443"/>
             <a:chExt cx="216024" cy="382265"/>
@@ -30896,7 +30895,7 @@
         </p:nvGrpSpPr>
         <p:grpSpPr>
           <a:xfrm>
-            <a:off x="6191863" y="5218525"/>
+            <a:off x="6214563" y="5508487"/>
             <a:ext cx="125898" cy="272533"/>
             <a:chOff x="2771800" y="1369443"/>
             <a:chExt cx="216024" cy="382265"/>
@@ -31096,7 +31095,7 @@
         </p:nvGrpSpPr>
         <p:grpSpPr>
           <a:xfrm>
-            <a:off x="6185671" y="5517718"/>
+            <a:off x="6202178" y="5234305"/>
             <a:ext cx="138283" cy="244699"/>
             <a:chOff x="2771800" y="1369443"/>
             <a:chExt cx="216024" cy="382265"/>
@@ -31296,7 +31295,7 @@
         </p:nvSpPr>
         <p:spPr>
           <a:xfrm>
-            <a:off x="2490320" y="1284690"/>
+            <a:off x="2451204" y="1743027"/>
             <a:ext cx="562822" cy="468052"/>
           </a:xfrm>
           <a:prstGeom prst="can">
@@ -31356,7 +31355,7 @@
         </p:nvSpPr>
         <p:spPr>
           <a:xfrm>
-            <a:off x="2490320" y="1844903"/>
+            <a:off x="2451204" y="2303240"/>
             <a:ext cx="562822" cy="468052"/>
           </a:xfrm>
           <a:prstGeom prst="can">
@@ -31416,7 +31415,7 @@
         </p:nvSpPr>
         <p:spPr>
           <a:xfrm>
-            <a:off x="2490320" y="2405116"/>
+            <a:off x="2451204" y="2863453"/>
             <a:ext cx="562822" cy="468052"/>
           </a:xfrm>
           <a:prstGeom prst="can">
@@ -31476,7 +31475,7 @@
         </p:nvSpPr>
         <p:spPr>
           <a:xfrm>
-            <a:off x="2490320" y="2965329"/>
+            <a:off x="2451204" y="3423666"/>
             <a:ext cx="562822" cy="468052"/>
           </a:xfrm>
           <a:prstGeom prst="can">
@@ -31536,7 +31535,7 @@
         </p:nvSpPr>
         <p:spPr>
           <a:xfrm>
-            <a:off x="2490320" y="3525542"/>
+            <a:off x="2451204" y="3983879"/>
             <a:ext cx="562822" cy="468052"/>
           </a:xfrm>
           <a:prstGeom prst="can">
@@ -31596,7 +31595,7 @@
         </p:nvSpPr>
         <p:spPr>
           <a:xfrm>
-            <a:off x="2490320" y="4085755"/>
+            <a:off x="2451204" y="4544092"/>
             <a:ext cx="562822" cy="468052"/>
           </a:xfrm>
           <a:prstGeom prst="can">
@@ -31656,7 +31655,7 @@
         </p:nvSpPr>
         <p:spPr>
           <a:xfrm>
-            <a:off x="2490320" y="4645968"/>
+            <a:off x="2451204" y="5104305"/>
             <a:ext cx="562822" cy="468052"/>
           </a:xfrm>
           <a:prstGeom prst="can">
@@ -31716,7 +31715,7 @@
         </p:nvSpPr>
         <p:spPr>
           <a:xfrm>
-            <a:off x="2490320" y="5206178"/>
+            <a:off x="2451204" y="5664515"/>
             <a:ext cx="562822" cy="468052"/>
           </a:xfrm>
           <a:prstGeom prst="can">
@@ -31776,7 +31775,7 @@
         </p:nvSpPr>
         <p:spPr>
           <a:xfrm>
-            <a:off x="5403740" y="3234042"/>
+            <a:off x="5482230" y="3692379"/>
             <a:ext cx="562822" cy="468052"/>
           </a:xfrm>
           <a:prstGeom prst="can">
@@ -32062,7 +32061,7 @@
         </p:nvGrpSpPr>
         <p:grpSpPr>
           <a:xfrm>
-            <a:off x="1579032" y="2727506"/>
+            <a:off x="1539916" y="2609779"/>
             <a:ext cx="216024" cy="382265"/>
             <a:chOff x="2771800" y="1369443"/>
             <a:chExt cx="216024" cy="382265"/>
@@ -32262,7 +32261,7 @@
         </p:nvGrpSpPr>
         <p:grpSpPr>
           <a:xfrm>
-            <a:off x="1283686" y="2716896"/>
+            <a:off x="1244570" y="2599169"/>
             <a:ext cx="216024" cy="382265"/>
             <a:chOff x="2771800" y="1369443"/>
             <a:chExt cx="216024" cy="382265"/>

</xml_diff>

<commit_message>
Point to specifications.openehr.org for specifications.
</commit_message>
<xml_diff>
--- a/files/openEHR_diagrams_sources.pptx
+++ b/files/openEHR_diagrams_sources.pptx
@@ -138,10 +138,6 @@
 </p:presentation>
 </file>
 
-<file path=ppt/revisionInfo.xml><?xml version="1.0" encoding="utf-8"?>
-<p1510:revInfo xmlns:a="http://schemas.openxmlformats.org/drawingml/2006/main" xmlns:r="http://schemas.openxmlformats.org/officeDocument/2006/relationships" xmlns:p1510="http://schemas.microsoft.com/office/powerpoint/2015/10/main"/>
-</file>
-
 <file path=ppt/slideLayouts/slideLayout1.xml><?xml version="1.0" encoding="utf-8"?>
 <p:sldLayout xmlns:a="http://schemas.openxmlformats.org/drawingml/2006/main" xmlns:r="http://schemas.openxmlformats.org/officeDocument/2006/relationships" xmlns:p="http://schemas.openxmlformats.org/presentationml/2006/main" type="title" preserve="1">
   <p:cSld name="Title Slide">
@@ -322,7 +318,7 @@
             <a:fld id="{C17C92CA-27BA-48D5-B9B9-4E9A3862C39B}" type="datetimeFigureOut">
               <a:rPr lang="en-US" smtClean="0"/>
               <a:pPr/>
-              <a:t>10/5/2017</a:t>
+              <a:t>11/13/2018</a:t>
             </a:fld>
             <a:endParaRPr lang="en-US"/>
           </a:p>
@@ -487,7 +483,7 @@
             <a:fld id="{C17C92CA-27BA-48D5-B9B9-4E9A3862C39B}" type="datetimeFigureOut">
               <a:rPr lang="en-US" smtClean="0"/>
               <a:pPr/>
-              <a:t>10/5/2017</a:t>
+              <a:t>11/13/2018</a:t>
             </a:fld>
             <a:endParaRPr lang="en-US"/>
           </a:p>
@@ -662,7 +658,7 @@
             <a:fld id="{C17C92CA-27BA-48D5-B9B9-4E9A3862C39B}" type="datetimeFigureOut">
               <a:rPr lang="en-US" smtClean="0"/>
               <a:pPr/>
-              <a:t>10/5/2017</a:t>
+              <a:t>11/13/2018</a:t>
             </a:fld>
             <a:endParaRPr lang="en-US"/>
           </a:p>
@@ -827,7 +823,7 @@
             <a:fld id="{C17C92CA-27BA-48D5-B9B9-4E9A3862C39B}" type="datetimeFigureOut">
               <a:rPr lang="en-US" smtClean="0"/>
               <a:pPr/>
-              <a:t>10/5/2017</a:t>
+              <a:t>11/13/2018</a:t>
             </a:fld>
             <a:endParaRPr lang="en-US"/>
           </a:p>
@@ -1069,7 +1065,7 @@
             <a:fld id="{C17C92CA-27BA-48D5-B9B9-4E9A3862C39B}" type="datetimeFigureOut">
               <a:rPr lang="en-US" smtClean="0"/>
               <a:pPr/>
-              <a:t>10/5/2017</a:t>
+              <a:t>11/13/2018</a:t>
             </a:fld>
             <a:endParaRPr lang="en-US"/>
           </a:p>
@@ -1351,7 +1347,7 @@
             <a:fld id="{C17C92CA-27BA-48D5-B9B9-4E9A3862C39B}" type="datetimeFigureOut">
               <a:rPr lang="en-US" smtClean="0"/>
               <a:pPr/>
-              <a:t>10/5/2017</a:t>
+              <a:t>11/13/2018</a:t>
             </a:fld>
             <a:endParaRPr lang="en-US"/>
           </a:p>
@@ -1767,7 +1763,7 @@
             <a:fld id="{C17C92CA-27BA-48D5-B9B9-4E9A3862C39B}" type="datetimeFigureOut">
               <a:rPr lang="en-US" smtClean="0"/>
               <a:pPr/>
-              <a:t>10/5/2017</a:t>
+              <a:t>11/13/2018</a:t>
             </a:fld>
             <a:endParaRPr lang="en-US"/>
           </a:p>
@@ -1881,7 +1877,7 @@
             <a:fld id="{C17C92CA-27BA-48D5-B9B9-4E9A3862C39B}" type="datetimeFigureOut">
               <a:rPr lang="en-US" smtClean="0"/>
               <a:pPr/>
-              <a:t>10/5/2017</a:t>
+              <a:t>11/13/2018</a:t>
             </a:fld>
             <a:endParaRPr lang="en-US"/>
           </a:p>
@@ -1973,7 +1969,7 @@
             <a:fld id="{C17C92CA-27BA-48D5-B9B9-4E9A3862C39B}" type="datetimeFigureOut">
               <a:rPr lang="en-US" smtClean="0"/>
               <a:pPr/>
-              <a:t>10/5/2017</a:t>
+              <a:t>11/13/2018</a:t>
             </a:fld>
             <a:endParaRPr lang="en-US"/>
           </a:p>
@@ -2245,7 +2241,7 @@
             <a:fld id="{C17C92CA-27BA-48D5-B9B9-4E9A3862C39B}" type="datetimeFigureOut">
               <a:rPr lang="en-US" smtClean="0"/>
               <a:pPr/>
-              <a:t>10/5/2017</a:t>
+              <a:t>11/13/2018</a:t>
             </a:fld>
             <a:endParaRPr lang="en-US"/>
           </a:p>
@@ -2494,7 +2490,7 @@
             <a:fld id="{C17C92CA-27BA-48D5-B9B9-4E9A3862C39B}" type="datetimeFigureOut">
               <a:rPr lang="en-US" smtClean="0"/>
               <a:pPr/>
-              <a:t>10/5/2017</a:t>
+              <a:t>11/13/2018</a:t>
             </a:fld>
             <a:endParaRPr lang="en-US"/>
           </a:p>
@@ -2702,7 +2698,7 @@
             <a:fld id="{C17C92CA-27BA-48D5-B9B9-4E9A3862C39B}" type="datetimeFigureOut">
               <a:rPr lang="en-US" smtClean="0"/>
               <a:pPr/>
-              <a:t>10/5/2017</a:t>
+              <a:t>11/13/2018</a:t>
             </a:fld>
             <a:endParaRPr lang="en-US"/>
           </a:p>
@@ -36312,8 +36308,8 @@
         </p:nvSpPr>
         <p:spPr>
           <a:xfrm>
-            <a:off x="2288161" y="5002196"/>
-            <a:ext cx="2016224" cy="468052"/>
+            <a:off x="2288161" y="4581128"/>
+            <a:ext cx="2016224" cy="397418"/>
           </a:xfrm>
           <a:prstGeom prst="roundRect">
             <a:avLst/>
@@ -36516,8 +36512,8 @@
         </p:nvSpPr>
         <p:spPr>
           <a:xfrm>
-            <a:off x="2288161" y="4445586"/>
-            <a:ext cx="2016224" cy="468052"/>
+            <a:off x="2288161" y="4097147"/>
+            <a:ext cx="2016224" cy="398711"/>
           </a:xfrm>
           <a:prstGeom prst="roundRect">
             <a:avLst/>
@@ -36595,8 +36591,8 @@
         </p:nvSpPr>
         <p:spPr>
           <a:xfrm>
-            <a:off x="2288161" y="3888976"/>
-            <a:ext cx="2016224" cy="468052"/>
+            <a:off x="2288161" y="3573016"/>
+            <a:ext cx="2016224" cy="384666"/>
           </a:xfrm>
           <a:prstGeom prst="roundRect">
             <a:avLst/>
@@ -36675,7 +36671,7 @@
         <p:spPr>
           <a:xfrm>
             <a:off x="2288161" y="6115418"/>
-            <a:ext cx="2016224" cy="468052"/>
+            <a:ext cx="2016224" cy="398195"/>
           </a:xfrm>
           <a:prstGeom prst="roundRect">
             <a:avLst/>
@@ -36751,8 +36747,8 @@
         </p:nvSpPr>
         <p:spPr>
           <a:xfrm>
-            <a:off x="2288161" y="2775756"/>
-            <a:ext cx="2016224" cy="468052"/>
+            <a:off x="2288161" y="2564904"/>
+            <a:ext cx="2016224" cy="375543"/>
           </a:xfrm>
           <a:prstGeom prst="roundRect">
             <a:avLst/>
@@ -36830,8 +36826,8 @@
         </p:nvSpPr>
         <p:spPr>
           <a:xfrm>
-            <a:off x="2288161" y="3332366"/>
-            <a:ext cx="2016224" cy="468052"/>
+            <a:off x="2288161" y="3068960"/>
+            <a:ext cx="2016224" cy="384666"/>
           </a:xfrm>
           <a:prstGeom prst="roundRect">
             <a:avLst/>
@@ -36909,8 +36905,8 @@
         </p:nvSpPr>
         <p:spPr>
           <a:xfrm>
-            <a:off x="2288161" y="549316"/>
-            <a:ext cx="2016224" cy="468052"/>
+            <a:off x="2288161" y="549317"/>
+            <a:ext cx="2016224" cy="384076"/>
           </a:xfrm>
           <a:prstGeom prst="roundRect">
             <a:avLst/>
@@ -36988,8 +36984,8 @@
         </p:nvSpPr>
         <p:spPr>
           <a:xfrm>
-            <a:off x="2288161" y="1662536"/>
-            <a:ext cx="2016224" cy="468052"/>
+            <a:off x="2288161" y="1556792"/>
+            <a:ext cx="2016224" cy="384076"/>
           </a:xfrm>
           <a:prstGeom prst="roundRect">
             <a:avLst/>
@@ -37067,7 +37063,7 @@
         </p:nvGrpSpPr>
         <p:grpSpPr>
           <a:xfrm>
-            <a:off x="533870" y="3580412"/>
+            <a:off x="533870" y="3317006"/>
             <a:ext cx="216024" cy="382265"/>
             <a:chOff x="2771800" y="1369443"/>
             <a:chExt cx="216024" cy="382265"/>
@@ -37267,7 +37263,7 @@
         </p:nvGrpSpPr>
         <p:grpSpPr>
           <a:xfrm>
-            <a:off x="546258" y="3039035"/>
+            <a:off x="546258" y="2828183"/>
             <a:ext cx="216024" cy="382265"/>
             <a:chOff x="2771800" y="1369443"/>
             <a:chExt cx="216024" cy="382265"/>
@@ -37467,7 +37463,7 @@
         </p:nvGrpSpPr>
         <p:grpSpPr>
           <a:xfrm>
-            <a:off x="1903197" y="3398022"/>
+            <a:off x="1903197" y="3134616"/>
             <a:ext cx="216024" cy="382265"/>
             <a:chOff x="2771800" y="1369443"/>
             <a:chExt cx="216024" cy="382265"/>
@@ -37667,7 +37663,7 @@
         </p:nvGrpSpPr>
         <p:grpSpPr>
           <a:xfrm>
-            <a:off x="1903197" y="3913190"/>
+            <a:off x="1903197" y="3597230"/>
             <a:ext cx="216024" cy="382265"/>
             <a:chOff x="2771800" y="1369443"/>
             <a:chExt cx="216024" cy="382265"/>
@@ -37867,7 +37863,7 @@
         </p:nvGrpSpPr>
         <p:grpSpPr>
           <a:xfrm>
-            <a:off x="1903197" y="4502181"/>
+            <a:off x="1903197" y="4105370"/>
             <a:ext cx="216024" cy="382265"/>
             <a:chOff x="2771800" y="1369443"/>
             <a:chExt cx="216024" cy="382265"/>
@@ -38067,7 +38063,7 @@
         </p:nvGrpSpPr>
         <p:grpSpPr>
           <a:xfrm>
-            <a:off x="1903197" y="5017349"/>
+            <a:off x="1903197" y="4588705"/>
             <a:ext cx="216024" cy="382265"/>
             <a:chOff x="2771800" y="1369443"/>
             <a:chExt cx="216024" cy="382265"/>
@@ -38467,7 +38463,7 @@
         </p:nvGrpSpPr>
         <p:grpSpPr>
           <a:xfrm>
-            <a:off x="1903197" y="1687910"/>
+            <a:off x="1903197" y="1582166"/>
             <a:ext cx="216024" cy="382265"/>
             <a:chOff x="2771800" y="1369443"/>
             <a:chExt cx="216024" cy="382265"/>
@@ -38667,7 +38663,7 @@
         </p:nvGrpSpPr>
         <p:grpSpPr>
           <a:xfrm>
-            <a:off x="1903197" y="2852965"/>
+            <a:off x="1903197" y="2642113"/>
             <a:ext cx="216024" cy="382265"/>
             <a:chOff x="2771800" y="1369443"/>
             <a:chExt cx="216024" cy="382265"/>
@@ -39067,7 +39063,7 @@
         </p:nvGrpSpPr>
         <p:grpSpPr>
           <a:xfrm>
-            <a:off x="1316618" y="3164810"/>
+            <a:off x="1316618" y="2953958"/>
             <a:ext cx="216024" cy="382265"/>
             <a:chOff x="2771800" y="1369443"/>
             <a:chExt cx="216024" cy="382265"/>
@@ -39267,7 +39263,7 @@
         </p:nvGrpSpPr>
         <p:grpSpPr>
           <a:xfrm>
-            <a:off x="1312923" y="3637085"/>
+            <a:off x="1312923" y="3373679"/>
             <a:ext cx="216024" cy="382265"/>
             <a:chOff x="2771800" y="1369443"/>
             <a:chExt cx="216024" cy="382265"/>
@@ -39467,7 +39463,7 @@
         </p:nvGrpSpPr>
         <p:grpSpPr>
           <a:xfrm>
-            <a:off x="1042039" y="3169711"/>
+            <a:off x="1042039" y="2958859"/>
             <a:ext cx="216024" cy="382265"/>
             <a:chOff x="2771800" y="1369443"/>
             <a:chExt cx="216024" cy="382265"/>
@@ -39667,7 +39663,7 @@
         </p:nvGrpSpPr>
         <p:grpSpPr>
           <a:xfrm>
-            <a:off x="1038344" y="3641986"/>
+            <a:off x="1038344" y="3378580"/>
             <a:ext cx="216024" cy="382265"/>
             <a:chOff x="2771800" y="1369443"/>
             <a:chExt cx="216024" cy="382265"/>
@@ -39867,7 +39863,7 @@
         </p:nvGrpSpPr>
         <p:grpSpPr>
           <a:xfrm>
-            <a:off x="1345802" y="4228484"/>
+            <a:off x="1345802" y="3912524"/>
             <a:ext cx="216024" cy="382265"/>
             <a:chOff x="2771800" y="1369443"/>
             <a:chExt cx="216024" cy="382265"/>
@@ -40067,7 +40063,7 @@
         </p:nvGrpSpPr>
         <p:grpSpPr>
           <a:xfrm>
-            <a:off x="1050456" y="4217874"/>
+            <a:off x="1050456" y="3901914"/>
             <a:ext cx="216024" cy="382265"/>
             <a:chOff x="2771800" y="1369443"/>
             <a:chExt cx="216024" cy="382265"/>
@@ -40868,7 +40864,7 @@
         <p:spPr>
           <a:xfrm>
             <a:off x="4458827" y="548680"/>
-            <a:ext cx="562822" cy="468052"/>
+            <a:ext cx="562822" cy="398711"/>
           </a:xfrm>
           <a:prstGeom prst="can">
             <a:avLst/>
@@ -40928,8 +40924,8 @@
         </p:nvSpPr>
         <p:spPr>
           <a:xfrm>
-            <a:off x="4458827" y="1662586"/>
-            <a:ext cx="562822" cy="468052"/>
+            <a:off x="4458827" y="1556842"/>
+            <a:ext cx="562822" cy="407589"/>
           </a:xfrm>
           <a:prstGeom prst="can">
             <a:avLst/>
@@ -40989,8 +40985,8 @@
         </p:nvSpPr>
         <p:spPr>
           <a:xfrm>
-            <a:off x="4458827" y="2776491"/>
-            <a:ext cx="562822" cy="468052"/>
+            <a:off x="4458827" y="2565639"/>
+            <a:ext cx="562822" cy="386731"/>
           </a:xfrm>
           <a:prstGeom prst="can">
             <a:avLst/>
@@ -41051,7 +41047,7 @@
         <p:spPr>
           <a:xfrm>
             <a:off x="4458827" y="6118205"/>
-            <a:ext cx="562822" cy="468052"/>
+            <a:ext cx="562822" cy="407139"/>
           </a:xfrm>
           <a:prstGeom prst="can">
             <a:avLst/>
@@ -41109,8 +41105,8 @@
         </p:nvSpPr>
         <p:spPr>
           <a:xfrm>
-            <a:off x="4458827" y="3333443"/>
-            <a:ext cx="562822" cy="468052"/>
+            <a:off x="4458827" y="3070037"/>
+            <a:ext cx="562822" cy="401840"/>
           </a:xfrm>
           <a:prstGeom prst="can">
             <a:avLst/>
@@ -41170,8 +41166,8 @@
         </p:nvSpPr>
         <p:spPr>
           <a:xfrm>
-            <a:off x="4458827" y="3890395"/>
-            <a:ext cx="562822" cy="468052"/>
+            <a:off x="4458827" y="3574435"/>
+            <a:ext cx="562822" cy="401840"/>
           </a:xfrm>
           <a:prstGeom prst="can">
             <a:avLst/>
@@ -41231,8 +41227,8 @@
         </p:nvSpPr>
         <p:spPr>
           <a:xfrm>
-            <a:off x="4458827" y="4447347"/>
-            <a:ext cx="562822" cy="468052"/>
+            <a:off x="4458827" y="4092934"/>
+            <a:ext cx="562822" cy="407137"/>
           </a:xfrm>
           <a:prstGeom prst="can">
             <a:avLst/>
@@ -41292,8 +41288,8 @@
         </p:nvSpPr>
         <p:spPr>
           <a:xfrm>
-            <a:off x="4458827" y="5004299"/>
-            <a:ext cx="562822" cy="468052"/>
+            <a:off x="4458827" y="4582180"/>
+            <a:ext cx="562822" cy="395315"/>
           </a:xfrm>
           <a:prstGeom prst="can">
             <a:avLst/>
@@ -41608,7 +41604,7 @@
         </p:nvGrpSpPr>
         <p:grpSpPr>
           <a:xfrm>
-            <a:off x="1341493" y="2541103"/>
+            <a:off x="1341493" y="2382805"/>
             <a:ext cx="216024" cy="382265"/>
             <a:chOff x="2771800" y="1369443"/>
             <a:chExt cx="216024" cy="382265"/>
@@ -41808,7 +41804,7 @@
         </p:nvGrpSpPr>
         <p:grpSpPr>
           <a:xfrm>
-            <a:off x="1046147" y="2530493"/>
+            <a:off x="1046147" y="2372195"/>
             <a:ext cx="216024" cy="382265"/>
             <a:chOff x="2771800" y="1369443"/>
             <a:chExt cx="216024" cy="382265"/>
@@ -42008,8 +42004,8 @@
         </p:nvSpPr>
         <p:spPr>
           <a:xfrm>
-            <a:off x="2285345" y="1105926"/>
-            <a:ext cx="2016224" cy="468052"/>
+            <a:off x="2285345" y="1053029"/>
+            <a:ext cx="2016224" cy="398711"/>
           </a:xfrm>
           <a:prstGeom prst="roundRect">
             <a:avLst/>
@@ -42087,7 +42083,7 @@
         </p:nvGrpSpPr>
         <p:grpSpPr>
           <a:xfrm>
-            <a:off x="1903197" y="1146380"/>
+            <a:off x="1903197" y="1093483"/>
             <a:ext cx="216024" cy="382265"/>
             <a:chOff x="2771800" y="1369443"/>
             <a:chExt cx="216024" cy="382265"/>
@@ -42287,8 +42283,8 @@
         </p:nvSpPr>
         <p:spPr>
           <a:xfrm>
-            <a:off x="4456011" y="1105633"/>
-            <a:ext cx="562822" cy="468052"/>
+            <a:off x="4456011" y="1052736"/>
+            <a:ext cx="562822" cy="398711"/>
           </a:xfrm>
           <a:prstGeom prst="can">
             <a:avLst/>
@@ -43796,8 +43792,8 @@
         </p:nvSpPr>
         <p:spPr>
           <a:xfrm>
-            <a:off x="2288161" y="5558806"/>
-            <a:ext cx="2016224" cy="468052"/>
+            <a:off x="2288161" y="5611704"/>
+            <a:ext cx="2016224" cy="398713"/>
           </a:xfrm>
           <a:prstGeom prst="roundRect">
             <a:avLst/>
@@ -43875,7 +43871,7 @@
         </p:nvGrpSpPr>
         <p:grpSpPr>
           <a:xfrm>
-            <a:off x="1903197" y="5568276"/>
+            <a:off x="1903197" y="5621174"/>
             <a:ext cx="216024" cy="382265"/>
             <a:chOff x="2771800" y="1369443"/>
             <a:chExt cx="216024" cy="382265"/>
@@ -44075,8 +44071,8 @@
         </p:nvSpPr>
         <p:spPr>
           <a:xfrm>
-            <a:off x="4458827" y="5561251"/>
-            <a:ext cx="562822" cy="468052"/>
+            <a:off x="4458827" y="5614149"/>
+            <a:ext cx="562822" cy="407139"/>
           </a:xfrm>
           <a:prstGeom prst="can">
             <a:avLst/>
@@ -44142,8 +44138,8 @@
         </p:nvSpPr>
         <p:spPr>
           <a:xfrm>
-            <a:off x="2285345" y="2219146"/>
-            <a:ext cx="2016224" cy="468052"/>
+            <a:off x="2285345" y="2060848"/>
+            <a:ext cx="2016224" cy="384076"/>
           </a:xfrm>
           <a:prstGeom prst="roundRect">
             <a:avLst/>
@@ -44227,8 +44223,8 @@
         </p:nvSpPr>
         <p:spPr>
           <a:xfrm>
-            <a:off x="4456011" y="2219539"/>
-            <a:ext cx="562822" cy="468052"/>
+            <a:off x="4456011" y="2061241"/>
+            <a:ext cx="562822" cy="407589"/>
           </a:xfrm>
           <a:prstGeom prst="can">
             <a:avLst/>
@@ -44294,7 +44290,7 @@
         </p:nvGrpSpPr>
         <p:grpSpPr>
           <a:xfrm>
-            <a:off x="1903197" y="2254647"/>
+            <a:off x="1903197" y="2096349"/>
             <a:ext cx="216024" cy="382265"/>
             <a:chOff x="2771800" y="1369443"/>
             <a:chExt cx="216024" cy="382265"/>
@@ -44510,6 +44506,388 @@
           </p:txBody>
         </p:sp>
       </p:grpSp>
+      <p:sp>
+        <p:nvSpPr>
+          <p:cNvPr id="214" name="Rounded Rectangle 12">
+            <a:extLst>
+              <a:ext uri="{FF2B5EF4-FFF2-40B4-BE49-F238E27FC236}">
+                <a16:creationId xmlns:a16="http://schemas.microsoft.com/office/drawing/2014/main" id="{BE7A8768-B0EA-4EA9-976F-567B770365CE}"/>
+              </a:ext>
+            </a:extLst>
+          </p:cNvPr>
+          <p:cNvSpPr/>
+          <p:nvPr/>
+        </p:nvSpPr>
+        <p:spPr>
+          <a:xfrm>
+            <a:off x="2292668" y="5085184"/>
+            <a:ext cx="2016224" cy="397418"/>
+          </a:xfrm>
+          <a:prstGeom prst="roundRect">
+            <a:avLst/>
+          </a:prstGeom>
+          <a:solidFill>
+            <a:schemeClr val="accent5">
+              <a:lumMod val="60000"/>
+              <a:lumOff val="40000"/>
+            </a:schemeClr>
+          </a:solidFill>
+          <a:ln>
+            <a:solidFill>
+              <a:schemeClr val="accent5">
+                <a:lumMod val="60000"/>
+                <a:lumOff val="40000"/>
+              </a:schemeClr>
+            </a:solidFill>
+          </a:ln>
+          <a:effectLst>
+            <a:outerShdw blurRad="44450" dist="27940" dir="5400000" algn="ctr">
+              <a:srgbClr val="000000">
+                <a:alpha val="32000"/>
+              </a:srgbClr>
+            </a:outerShdw>
+          </a:effectLst>
+          <a:scene3d>
+            <a:camera prst="orthographicFront">
+              <a:rot lat="0" lon="0" rev="0"/>
+            </a:camera>
+            <a:lightRig rig="balanced" dir="t">
+              <a:rot lat="0" lon="0" rev="8700000"/>
+            </a:lightRig>
+          </a:scene3d>
+          <a:sp3d>
+            <a:bevelT w="190500" h="38100"/>
+          </a:sp3d>
+        </p:spPr>
+        <p:style>
+          <a:lnRef idx="2">
+            <a:schemeClr val="accent1">
+              <a:shade val="50000"/>
+            </a:schemeClr>
+          </a:lnRef>
+          <a:fillRef idx="1">
+            <a:schemeClr val="accent1"/>
+          </a:fillRef>
+          <a:effectRef idx="0">
+            <a:schemeClr val="accent1"/>
+          </a:effectRef>
+          <a:fontRef idx="minor">
+            <a:schemeClr val="lt1"/>
+          </a:fontRef>
+        </p:style>
+        <p:txBody>
+          <a:bodyPr lIns="0" rIns="0" rtlCol="0" anchor="ctr"/>
+          <a:lstStyle/>
+          <a:p>
+            <a:pPr algn="ctr"/>
+            <a:r>
+              <a:rPr lang="en-US" sz="1600" b="1" dirty="0">
+                <a:solidFill>
+                  <a:srgbClr val="00335F"/>
+                </a:solidFill>
+              </a:rPr>
+              <a:t>Languages (LANG)</a:t>
+            </a:r>
+          </a:p>
+        </p:txBody>
+      </p:sp>
+      <p:grpSp>
+        <p:nvGrpSpPr>
+          <p:cNvPr id="215" name="Group 214">
+            <a:extLst>
+              <a:ext uri="{FF2B5EF4-FFF2-40B4-BE49-F238E27FC236}">
+                <a16:creationId xmlns:a16="http://schemas.microsoft.com/office/drawing/2014/main" id="{5AD8600D-39EB-4CBE-88EB-754582C96D4A}"/>
+              </a:ext>
+            </a:extLst>
+          </p:cNvPr>
+          <p:cNvGrpSpPr/>
+          <p:nvPr/>
+        </p:nvGrpSpPr>
+        <p:grpSpPr>
+          <a:xfrm>
+            <a:off x="1907704" y="5092761"/>
+            <a:ext cx="216024" cy="382265"/>
+            <a:chOff x="2771800" y="1369443"/>
+            <a:chExt cx="216024" cy="382265"/>
+          </a:xfrm>
+          <a:solidFill>
+            <a:srgbClr val="00B0F0"/>
+          </a:solidFill>
+        </p:grpSpPr>
+        <p:sp>
+          <p:nvSpPr>
+            <p:cNvPr id="216" name="Oval 215">
+              <a:extLst>
+                <a:ext uri="{FF2B5EF4-FFF2-40B4-BE49-F238E27FC236}">
+                  <a16:creationId xmlns:a16="http://schemas.microsoft.com/office/drawing/2014/main" id="{FEA30564-ABCD-434F-B7D9-08C96B95FFBF}"/>
+                </a:ext>
+              </a:extLst>
+            </p:cNvPr>
+            <p:cNvSpPr/>
+            <p:nvPr/>
+          </p:nvSpPr>
+          <p:spPr>
+            <a:xfrm>
+              <a:off x="2807804" y="1369443"/>
+              <a:ext cx="144016" cy="144016"/>
+            </a:xfrm>
+            <a:prstGeom prst="ellipse">
+              <a:avLst/>
+            </a:prstGeom>
+            <a:grpFill/>
+            <a:ln>
+              <a:solidFill>
+                <a:srgbClr val="0070C0"/>
+              </a:solidFill>
+            </a:ln>
+          </p:spPr>
+          <p:style>
+            <a:lnRef idx="2">
+              <a:schemeClr val="accent1">
+                <a:shade val="50000"/>
+              </a:schemeClr>
+            </a:lnRef>
+            <a:fillRef idx="1">
+              <a:schemeClr val="accent1"/>
+            </a:fillRef>
+            <a:effectRef idx="0">
+              <a:schemeClr val="accent1"/>
+            </a:effectRef>
+            <a:fontRef idx="minor">
+              <a:schemeClr val="lt1"/>
+            </a:fontRef>
+          </p:style>
+          <p:txBody>
+            <a:bodyPr rtlCol="0" anchor="ctr"/>
+            <a:lstStyle/>
+            <a:p>
+              <a:pPr algn="ctr"/>
+              <a:endParaRPr lang="en-GB"/>
+            </a:p>
+          </p:txBody>
+        </p:sp>
+        <p:sp>
+          <p:nvSpPr>
+            <p:cNvPr id="217" name="Oval 216">
+              <a:extLst>
+                <a:ext uri="{FF2B5EF4-FFF2-40B4-BE49-F238E27FC236}">
+                  <a16:creationId xmlns:a16="http://schemas.microsoft.com/office/drawing/2014/main" id="{28799F98-54B0-4C22-8D72-A26ADD74DC5E}"/>
+                </a:ext>
+              </a:extLst>
+            </p:cNvPr>
+            <p:cNvSpPr/>
+            <p:nvPr/>
+          </p:nvSpPr>
+          <p:spPr>
+            <a:xfrm>
+              <a:off x="2771800" y="1535684"/>
+              <a:ext cx="216024" cy="144016"/>
+            </a:xfrm>
+            <a:prstGeom prst="ellipse">
+              <a:avLst/>
+            </a:prstGeom>
+            <a:grpFill/>
+            <a:ln>
+              <a:solidFill>
+                <a:srgbClr val="0070C0"/>
+              </a:solidFill>
+            </a:ln>
+          </p:spPr>
+          <p:style>
+            <a:lnRef idx="2">
+              <a:schemeClr val="accent1">
+                <a:shade val="50000"/>
+              </a:schemeClr>
+            </a:lnRef>
+            <a:fillRef idx="1">
+              <a:schemeClr val="accent1"/>
+            </a:fillRef>
+            <a:effectRef idx="0">
+              <a:schemeClr val="accent1"/>
+            </a:effectRef>
+            <a:fontRef idx="minor">
+              <a:schemeClr val="lt1"/>
+            </a:fontRef>
+          </p:style>
+          <p:txBody>
+            <a:bodyPr rtlCol="0" anchor="ctr"/>
+            <a:lstStyle/>
+            <a:p>
+              <a:pPr algn="ctr"/>
+              <a:endParaRPr lang="en-GB"/>
+            </a:p>
+          </p:txBody>
+        </p:sp>
+        <p:sp>
+          <p:nvSpPr>
+            <p:cNvPr id="218" name="Rectangle 217">
+              <a:extLst>
+                <a:ext uri="{FF2B5EF4-FFF2-40B4-BE49-F238E27FC236}">
+                  <a16:creationId xmlns:a16="http://schemas.microsoft.com/office/drawing/2014/main" id="{5CE4A13F-7E84-4475-BACE-EEE81F472BAA}"/>
+                </a:ext>
+              </a:extLst>
+            </p:cNvPr>
+            <p:cNvSpPr/>
+            <p:nvPr/>
+          </p:nvSpPr>
+          <p:spPr>
+            <a:xfrm>
+              <a:off x="2771800" y="1607692"/>
+              <a:ext cx="216024" cy="144016"/>
+            </a:xfrm>
+            <a:prstGeom prst="rect">
+              <a:avLst/>
+            </a:prstGeom>
+            <a:grpFill/>
+            <a:ln>
+              <a:solidFill>
+                <a:srgbClr val="0070C0"/>
+              </a:solidFill>
+            </a:ln>
+          </p:spPr>
+          <p:style>
+            <a:lnRef idx="2">
+              <a:schemeClr val="accent1">
+                <a:shade val="50000"/>
+              </a:schemeClr>
+            </a:lnRef>
+            <a:fillRef idx="1">
+              <a:schemeClr val="accent1"/>
+            </a:fillRef>
+            <a:effectRef idx="0">
+              <a:schemeClr val="accent1"/>
+            </a:effectRef>
+            <a:fontRef idx="minor">
+              <a:schemeClr val="lt1"/>
+            </a:fontRef>
+          </p:style>
+          <p:txBody>
+            <a:bodyPr rtlCol="0" anchor="ctr"/>
+            <a:lstStyle/>
+            <a:p>
+              <a:pPr algn="ctr"/>
+              <a:endParaRPr lang="en-GB"/>
+            </a:p>
+          </p:txBody>
+        </p:sp>
+        <p:sp>
+          <p:nvSpPr>
+            <p:cNvPr id="219" name="Rectangle 218">
+              <a:extLst>
+                <a:ext uri="{FF2B5EF4-FFF2-40B4-BE49-F238E27FC236}">
+                  <a16:creationId xmlns:a16="http://schemas.microsoft.com/office/drawing/2014/main" id="{0292EA18-9834-432A-8443-800EAAFCBA29}"/>
+                </a:ext>
+              </a:extLst>
+            </p:cNvPr>
+            <p:cNvSpPr/>
+            <p:nvPr/>
+          </p:nvSpPr>
+          <p:spPr>
+            <a:xfrm>
+              <a:off x="2788948" y="1591577"/>
+              <a:ext cx="183641" cy="45719"/>
+            </a:xfrm>
+            <a:prstGeom prst="rect">
+              <a:avLst/>
+            </a:prstGeom>
+            <a:grpFill/>
+            <a:ln>
+              <a:noFill/>
+            </a:ln>
+          </p:spPr>
+          <p:style>
+            <a:lnRef idx="2">
+              <a:schemeClr val="accent1">
+                <a:shade val="50000"/>
+              </a:schemeClr>
+            </a:lnRef>
+            <a:fillRef idx="1">
+              <a:schemeClr val="accent1"/>
+            </a:fillRef>
+            <a:effectRef idx="0">
+              <a:schemeClr val="accent1"/>
+            </a:effectRef>
+            <a:fontRef idx="minor">
+              <a:schemeClr val="lt1"/>
+            </a:fontRef>
+          </p:style>
+          <p:txBody>
+            <a:bodyPr rtlCol="0" anchor="ctr"/>
+            <a:lstStyle/>
+            <a:p>
+              <a:pPr algn="ctr"/>
+              <a:endParaRPr lang="en-GB"/>
+            </a:p>
+          </p:txBody>
+        </p:sp>
+      </p:grpSp>
+      <p:sp>
+        <p:nvSpPr>
+          <p:cNvPr id="220" name="Can 135">
+            <a:extLst>
+              <a:ext uri="{FF2B5EF4-FFF2-40B4-BE49-F238E27FC236}">
+                <a16:creationId xmlns:a16="http://schemas.microsoft.com/office/drawing/2014/main" id="{7C365157-AEBF-4695-9403-D65031A55F89}"/>
+              </a:ext>
+            </a:extLst>
+          </p:cNvPr>
+          <p:cNvSpPr/>
+          <p:nvPr/>
+        </p:nvSpPr>
+        <p:spPr>
+          <a:xfrm>
+            <a:off x="4463334" y="5086236"/>
+            <a:ext cx="562822" cy="395315"/>
+          </a:xfrm>
+          <a:prstGeom prst="can">
+            <a:avLst/>
+          </a:prstGeom>
+          <a:solidFill>
+            <a:schemeClr val="accent5">
+              <a:lumMod val="60000"/>
+              <a:lumOff val="40000"/>
+            </a:schemeClr>
+          </a:solidFill>
+          <a:ln>
+            <a:solidFill>
+              <a:schemeClr val="accent5">
+                <a:lumMod val="60000"/>
+                <a:lumOff val="40000"/>
+              </a:schemeClr>
+            </a:solidFill>
+          </a:ln>
+        </p:spPr>
+        <p:style>
+          <a:lnRef idx="2">
+            <a:schemeClr val="accent1">
+              <a:shade val="50000"/>
+            </a:schemeClr>
+          </a:lnRef>
+          <a:fillRef idx="1">
+            <a:schemeClr val="accent1"/>
+          </a:fillRef>
+          <a:effectRef idx="0">
+            <a:schemeClr val="accent1"/>
+          </a:effectRef>
+          <a:fontRef idx="minor">
+            <a:schemeClr val="lt1"/>
+          </a:fontRef>
+        </p:style>
+        <p:txBody>
+          <a:bodyPr rtlCol="0" anchor="ctr"/>
+          <a:lstStyle/>
+          <a:p>
+            <a:pPr algn="ctr"/>
+            <a:r>
+              <a:rPr lang="en-GB" dirty="0">
+                <a:solidFill>
+                  <a:srgbClr val="002060"/>
+                </a:solidFill>
+              </a:rPr>
+              <a:t>CRs</a:t>
+            </a:r>
+          </a:p>
+        </p:txBody>
+      </p:sp>
     </p:spTree>
     <p:extLst>
       <p:ext uri="{BB962C8B-B14F-4D97-AF65-F5344CB8AC3E}">

</xml_diff>